<commit_message>
Work on AWS architecture, AWS Glue Notebook, WTA files fixes
</commit_message>
<xml_diff>
--- a/modern-data-analytics-on-aws.pptx
+++ b/modern-data-analytics-on-aws.pptx
@@ -5,12 +5,13 @@
     <p:sldMasterId id="2147483648" r:id="rId1"/>
   </p:sldMasterIdLst>
   <p:notesMasterIdLst>
-    <p:notesMasterId r:id="rId5"/>
+    <p:notesMasterId r:id="rId6"/>
   </p:notesMasterIdLst>
   <p:sldIdLst>
     <p:sldId id="276" r:id="rId2"/>
-    <p:sldId id="278" r:id="rId3"/>
-    <p:sldId id="277" r:id="rId4"/>
+    <p:sldId id="279" r:id="rId3"/>
+    <p:sldId id="278" r:id="rId4"/>
+    <p:sldId id="277" r:id="rId5"/>
   </p:sldIdLst>
   <p:sldSz cx="12192000" cy="6858000"/>
   <p:notesSz cx="6858000" cy="9144000"/>
@@ -211,7 +212,7 @@
           <a:p>
             <a:fld id="{FDE6B231-60EB-4C49-AAEF-269B5DFF8A47}" type="datetimeFigureOut">
               <a:rPr lang="en-US" smtClean="0"/>
-              <a:t>1/1/24</a:t>
+              <a:t>1/4/24</a:t>
             </a:fld>
             <a:endParaRPr lang="en-US" dirty="0"/>
           </a:p>
@@ -627,7 +628,7 @@
           <a:p>
             <a:fld id="{C353B235-0EC1-A945-8A73-E24DD50E9288}" type="slidenum">
               <a:rPr lang="en-US" smtClean="0"/>
-              <a:t>2</a:t>
+              <a:t>3</a:t>
             </a:fld>
             <a:endParaRPr lang="en-US" dirty="0"/>
           </a:p>
@@ -793,7 +794,7 @@
           <a:p>
             <a:fld id="{9FD802BD-3636-C34F-81A0-C5C670484C61}" type="datetimeFigureOut">
               <a:rPr lang="en-US" smtClean="0"/>
-              <a:t>1/1/24</a:t>
+              <a:t>1/4/24</a:t>
             </a:fld>
             <a:endParaRPr lang="en-US" dirty="0"/>
           </a:p>
@@ -991,7 +992,7 @@
           <a:p>
             <a:fld id="{9FD802BD-3636-C34F-81A0-C5C670484C61}" type="datetimeFigureOut">
               <a:rPr lang="en-US" smtClean="0"/>
-              <a:t>1/1/24</a:t>
+              <a:t>1/4/24</a:t>
             </a:fld>
             <a:endParaRPr lang="en-US" dirty="0"/>
           </a:p>
@@ -1199,7 +1200,7 @@
           <a:p>
             <a:fld id="{9FD802BD-3636-C34F-81A0-C5C670484C61}" type="datetimeFigureOut">
               <a:rPr lang="en-US" smtClean="0"/>
-              <a:t>1/1/24</a:t>
+              <a:t>1/4/24</a:t>
             </a:fld>
             <a:endParaRPr lang="en-US" dirty="0"/>
           </a:p>
@@ -1397,7 +1398,7 @@
           <a:p>
             <a:fld id="{9FD802BD-3636-C34F-81A0-C5C670484C61}" type="datetimeFigureOut">
               <a:rPr lang="en-US" smtClean="0"/>
-              <a:t>1/1/24</a:t>
+              <a:t>1/4/24</a:t>
             </a:fld>
             <a:endParaRPr lang="en-US" dirty="0"/>
           </a:p>
@@ -1672,7 +1673,7 @@
           <a:p>
             <a:fld id="{9FD802BD-3636-C34F-81A0-C5C670484C61}" type="datetimeFigureOut">
               <a:rPr lang="en-US" smtClean="0"/>
-              <a:t>1/1/24</a:t>
+              <a:t>1/4/24</a:t>
             </a:fld>
             <a:endParaRPr lang="en-US" dirty="0"/>
           </a:p>
@@ -1937,7 +1938,7 @@
           <a:p>
             <a:fld id="{9FD802BD-3636-C34F-81A0-C5C670484C61}" type="datetimeFigureOut">
               <a:rPr lang="en-US" smtClean="0"/>
-              <a:t>1/1/24</a:t>
+              <a:t>1/4/24</a:t>
             </a:fld>
             <a:endParaRPr lang="en-US" dirty="0"/>
           </a:p>
@@ -2349,7 +2350,7 @@
           <a:p>
             <a:fld id="{9FD802BD-3636-C34F-81A0-C5C670484C61}" type="datetimeFigureOut">
               <a:rPr lang="en-US" smtClean="0"/>
-              <a:t>1/1/24</a:t>
+              <a:t>1/4/24</a:t>
             </a:fld>
             <a:endParaRPr lang="en-US" dirty="0"/>
           </a:p>
@@ -2490,7 +2491,7 @@
           <a:p>
             <a:fld id="{9FD802BD-3636-C34F-81A0-C5C670484C61}" type="datetimeFigureOut">
               <a:rPr lang="en-US" smtClean="0"/>
-              <a:t>1/1/24</a:t>
+              <a:t>1/4/24</a:t>
             </a:fld>
             <a:endParaRPr lang="en-US" dirty="0"/>
           </a:p>
@@ -2603,7 +2604,7 @@
           <a:p>
             <a:fld id="{9FD802BD-3636-C34F-81A0-C5C670484C61}" type="datetimeFigureOut">
               <a:rPr lang="en-US" smtClean="0"/>
-              <a:t>1/1/24</a:t>
+              <a:t>1/4/24</a:t>
             </a:fld>
             <a:endParaRPr lang="en-US" dirty="0"/>
           </a:p>
@@ -2914,7 +2915,7 @@
           <a:p>
             <a:fld id="{9FD802BD-3636-C34F-81A0-C5C670484C61}" type="datetimeFigureOut">
               <a:rPr lang="en-US" smtClean="0"/>
-              <a:t>1/1/24</a:t>
+              <a:t>1/4/24</a:t>
             </a:fld>
             <a:endParaRPr lang="en-US" dirty="0"/>
           </a:p>
@@ -3202,7 +3203,7 @@
           <a:p>
             <a:fld id="{9FD802BD-3636-C34F-81A0-C5C670484C61}" type="datetimeFigureOut">
               <a:rPr lang="en-US" smtClean="0"/>
-              <a:t>1/1/24</a:t>
+              <a:t>1/4/24</a:t>
             </a:fld>
             <a:endParaRPr lang="en-US" dirty="0"/>
           </a:p>
@@ -3443,7 +3444,7 @@
           <a:p>
             <a:fld id="{9FD802BD-3636-C34F-81A0-C5C670484C61}" type="datetimeFigureOut">
               <a:rPr lang="en-US" smtClean="0"/>
-              <a:t>1/1/24</a:t>
+              <a:t>1/4/24</a:t>
             </a:fld>
             <a:endParaRPr lang="en-US" dirty="0"/>
           </a:p>
@@ -4160,9 +4161,9 @@
         <p:grpSpPr>
           <a:xfrm>
             <a:off x="1520391" y="1334578"/>
-            <a:ext cx="8011306" cy="1820267"/>
+            <a:ext cx="8011306" cy="2521805"/>
             <a:chOff x="114242" y="1047664"/>
-            <a:chExt cx="7577645" cy="1706580"/>
+            <a:chExt cx="7577645" cy="2364303"/>
           </a:xfrm>
         </p:grpSpPr>
         <p:sp>
@@ -4249,8 +4250,8 @@
           </p:nvSpPr>
           <p:spPr>
             <a:xfrm>
-              <a:off x="1798956" y="1405779"/>
-              <a:ext cx="1197076" cy="1100809"/>
+              <a:off x="1574420" y="1405779"/>
+              <a:ext cx="1650421" cy="1847775"/>
             </a:xfrm>
             <a:prstGeom prst="rect">
               <a:avLst/>
@@ -4333,7 +4334,7 @@
           <p:spPr>
             <a:xfrm>
               <a:off x="1430993" y="1047664"/>
-              <a:ext cx="6260894" cy="1706580"/>
+              <a:ext cx="6260894" cy="2364303"/>
             </a:xfrm>
             <a:prstGeom prst="rect">
               <a:avLst/>
@@ -4631,8 +4632,8 @@
           </p:nvSpPr>
           <p:spPr>
             <a:xfrm>
-              <a:off x="5122764" y="1405779"/>
-              <a:ext cx="2449795" cy="1100808"/>
+              <a:off x="5122764" y="1405778"/>
+              <a:ext cx="2449795" cy="1847775"/>
             </a:xfrm>
             <a:prstGeom prst="rect">
               <a:avLst/>
@@ -4685,8 +4686,27 @@
                   <a:ea typeface="Amazon Ember" panose="020B0603020204020204" pitchFamily="34" charset="0"/>
                   <a:cs typeface="Amazon Ember" panose="020B0603020204020204" pitchFamily="34" charset="0"/>
                 </a:rPr>
-                <a:t>     purpose-built analytics and insights</a:t>
+                <a:t>     purpose-built analytics and </a:t>
               </a:r>
+              <a:r>
+                <a:rPr lang="en-US" sz="900" dirty="0" err="1">
+                  <a:solidFill>
+                    <a:schemeClr val="tx1"/>
+                  </a:solidFill>
+                  <a:latin typeface="Amazon Ember" panose="020B0603020204020204" pitchFamily="34" charset="0"/>
+                  <a:ea typeface="Amazon Ember" panose="020B0603020204020204" pitchFamily="34" charset="0"/>
+                  <a:cs typeface="Amazon Ember" panose="020B0603020204020204" pitchFamily="34" charset="0"/>
+                </a:rPr>
+                <a:t>visualisation</a:t>
+              </a:r>
+              <a:endParaRPr lang="en-US" sz="900" dirty="0">
+                <a:solidFill>
+                  <a:schemeClr val="tx1"/>
+                </a:solidFill>
+                <a:latin typeface="Amazon Ember" panose="020B0603020204020204" pitchFamily="34" charset="0"/>
+                <a:ea typeface="Amazon Ember" panose="020B0603020204020204" pitchFamily="34" charset="0"/>
+                <a:cs typeface="Amazon Ember" panose="020B0603020204020204" pitchFamily="34" charset="0"/>
+              </a:endParaRPr>
             </a:p>
           </p:txBody>
         </p:sp>
@@ -4708,8 +4728,8 @@
           </p:nvCxnSpPr>
           <p:spPr>
             <a:xfrm flipV="1">
-              <a:off x="4577758" y="1956183"/>
-              <a:ext cx="545006" cy="1"/>
+              <a:off x="4653351" y="2329665"/>
+              <a:ext cx="469413" cy="1"/>
             </a:xfrm>
             <a:prstGeom prst="straightConnector1">
               <a:avLst/>
@@ -4817,7 +4837,7 @@
           </p:blipFill>
           <p:spPr bwMode="auto">
             <a:xfrm>
-              <a:off x="3983218" y="1876925"/>
+              <a:off x="4030223" y="1876925"/>
               <a:ext cx="274320" cy="274320"/>
             </a:xfrm>
             <a:prstGeom prst="rect">
@@ -4864,7 +4884,7 @@
           </p:nvSpPr>
           <p:spPr bwMode="auto">
             <a:xfrm>
-              <a:off x="3689172" y="2185639"/>
+              <a:off x="3736177" y="2185639"/>
               <a:ext cx="872838" cy="215444"/>
             </a:xfrm>
             <a:prstGeom prst="rect">
@@ -5023,8 +5043,8 @@
           </p:nvSpPr>
           <p:spPr>
             <a:xfrm>
-              <a:off x="3651511" y="1405779"/>
-              <a:ext cx="926248" cy="1100809"/>
+              <a:off x="3688616" y="1405779"/>
+              <a:ext cx="964735" cy="1847775"/>
             </a:xfrm>
             <a:prstGeom prst="rect">
               <a:avLst/>
@@ -5082,227 +5102,6 @@
             </a:p>
           </p:txBody>
         </p:sp>
-        <p:pic>
-          <p:nvPicPr>
-            <p:cNvPr id="67" name="Graphic 22">
-              <a:extLst>
-                <a:ext uri="{FF2B5EF4-FFF2-40B4-BE49-F238E27FC236}">
-                  <a16:creationId xmlns:a16="http://schemas.microsoft.com/office/drawing/2014/main" id="{7A454A00-C52A-EDD8-1401-3979E73F9F82}"/>
-                </a:ext>
-              </a:extLst>
-            </p:cNvPr>
-            <p:cNvPicPr>
-              <a:picLocks noChangeAspect="1" noChangeArrowheads="1"/>
-            </p:cNvPicPr>
-            <p:nvPr/>
-          </p:nvPicPr>
-          <p:blipFill>
-            <a:blip r:embed="rId7" cstate="print">
-              <a:extLst>
-                <a:ext uri="{28A0092B-C50C-407E-A947-70E740481C1C}">
-                  <a14:useLocalDpi xmlns:a14="http://schemas.microsoft.com/office/drawing/2010/main" val="0"/>
-                </a:ext>
-              </a:extLst>
-            </a:blip>
-            <a:srcRect/>
-            <a:stretch>
-              <a:fillRect/>
-            </a:stretch>
-          </p:blipFill>
-          <p:spPr bwMode="auto">
-            <a:xfrm>
-              <a:off x="6160049" y="1750561"/>
-              <a:ext cx="274320" cy="274320"/>
-            </a:xfrm>
-            <a:prstGeom prst="rect">
-              <a:avLst/>
-            </a:prstGeom>
-            <a:noFill/>
-            <a:ln>
-              <a:noFill/>
-            </a:ln>
-            <a:extLst>
-              <a:ext uri="{909E8E84-426E-40DD-AFC4-6F175D3DCCD1}">
-                <a14:hiddenFill xmlns:a14="http://schemas.microsoft.com/office/drawing/2010/main">
-                  <a:solidFill>
-                    <a:srgbClr val="FFFFFF"/>
-                  </a:solidFill>
-                </a14:hiddenFill>
-              </a:ext>
-              <a:ext uri="{91240B29-F687-4F45-9708-019B960494DF}">
-                <a14:hiddenLine xmlns:a14="http://schemas.microsoft.com/office/drawing/2010/main" w="9525">
-                  <a:solidFill>
-                    <a:srgbClr val="000000"/>
-                  </a:solidFill>
-                  <a:miter lim="800000"/>
-                  <a:headEnd/>
-                  <a:tailEnd/>
-                </a14:hiddenLine>
-              </a:ext>
-            </a:extLst>
-          </p:spPr>
-        </p:pic>
-        <p:sp>
-          <p:nvSpPr>
-            <p:cNvPr id="68" name="TextBox 17">
-              <a:extLst>
-                <a:ext uri="{FF2B5EF4-FFF2-40B4-BE49-F238E27FC236}">
-                  <a16:creationId xmlns:a16="http://schemas.microsoft.com/office/drawing/2014/main" id="{CC7F80AC-A21A-3DCE-3F77-31E8A7A28D8B}"/>
-                </a:ext>
-              </a:extLst>
-            </p:cNvPr>
-            <p:cNvSpPr txBox="1">
-              <a:spLocks noChangeArrowheads="1"/>
-            </p:cNvSpPr>
-            <p:nvPr/>
-          </p:nvSpPr>
-          <p:spPr bwMode="auto">
-            <a:xfrm>
-              <a:off x="5654804" y="2018585"/>
-              <a:ext cx="1248189" cy="215444"/>
-            </a:xfrm>
-            <a:prstGeom prst="rect">
-              <a:avLst/>
-            </a:prstGeom>
-            <a:noFill/>
-            <a:ln>
-              <a:noFill/>
-            </a:ln>
-            <a:extLst>
-              <a:ext uri="{909E8E84-426E-40DD-AFC4-6F175D3DCCD1}">
-                <a14:hiddenFill xmlns:a14="http://schemas.microsoft.com/office/drawing/2010/main">
-                  <a:solidFill>
-                    <a:srgbClr val="FFFFFF"/>
-                  </a:solidFill>
-                </a14:hiddenFill>
-              </a:ext>
-              <a:ext uri="{91240B29-F687-4F45-9708-019B960494DF}">
-                <a14:hiddenLine xmlns:a14="http://schemas.microsoft.com/office/drawing/2010/main" w="9525">
-                  <a:solidFill>
-                    <a:srgbClr val="000000"/>
-                  </a:solidFill>
-                  <a:miter lim="800000"/>
-                  <a:headEnd/>
-                  <a:tailEnd/>
-                </a14:hiddenLine>
-              </a:ext>
-            </a:extLst>
-          </p:spPr>
-          <p:txBody>
-            <a:bodyPr wrap="square">
-              <a:spAutoFit/>
-            </a:bodyPr>
-            <a:lstStyle>
-              <a:lvl1pPr>
-                <a:defRPr>
-                  <a:solidFill>
-                    <a:schemeClr val="tx1"/>
-                  </a:solidFill>
-                  <a:latin typeface="Calibri" panose="020F0502020204030204" pitchFamily="34" charset="0"/>
-                </a:defRPr>
-              </a:lvl1pPr>
-              <a:lvl2pPr marL="742950" indent="-285750">
-                <a:defRPr>
-                  <a:solidFill>
-                    <a:schemeClr val="tx1"/>
-                  </a:solidFill>
-                  <a:latin typeface="Calibri" panose="020F0502020204030204" pitchFamily="34" charset="0"/>
-                </a:defRPr>
-              </a:lvl2pPr>
-              <a:lvl3pPr marL="1143000" indent="-228600">
-                <a:defRPr>
-                  <a:solidFill>
-                    <a:schemeClr val="tx1"/>
-                  </a:solidFill>
-                  <a:latin typeface="Calibri" panose="020F0502020204030204" pitchFamily="34" charset="0"/>
-                </a:defRPr>
-              </a:lvl3pPr>
-              <a:lvl4pPr marL="1600200" indent="-228600">
-                <a:defRPr>
-                  <a:solidFill>
-                    <a:schemeClr val="tx1"/>
-                  </a:solidFill>
-                  <a:latin typeface="Calibri" panose="020F0502020204030204" pitchFamily="34" charset="0"/>
-                </a:defRPr>
-              </a:lvl4pPr>
-              <a:lvl5pPr marL="2057400" indent="-228600">
-                <a:defRPr>
-                  <a:solidFill>
-                    <a:schemeClr val="tx1"/>
-                  </a:solidFill>
-                  <a:latin typeface="Calibri" panose="020F0502020204030204" pitchFamily="34" charset="0"/>
-                </a:defRPr>
-              </a:lvl5pPr>
-              <a:lvl6pPr marL="2514600" indent="-228600" eaLnBrk="0" fontAlgn="base" hangingPunct="0">
-                <a:spcBef>
-                  <a:spcPct val="0"/>
-                </a:spcBef>
-                <a:spcAft>
-                  <a:spcPct val="0"/>
-                </a:spcAft>
-                <a:defRPr>
-                  <a:solidFill>
-                    <a:schemeClr val="tx1"/>
-                  </a:solidFill>
-                  <a:latin typeface="Calibri" panose="020F0502020204030204" pitchFamily="34" charset="0"/>
-                </a:defRPr>
-              </a:lvl6pPr>
-              <a:lvl7pPr marL="2971800" indent="-228600" eaLnBrk="0" fontAlgn="base" hangingPunct="0">
-                <a:spcBef>
-                  <a:spcPct val="0"/>
-                </a:spcBef>
-                <a:spcAft>
-                  <a:spcPct val="0"/>
-                </a:spcAft>
-                <a:defRPr>
-                  <a:solidFill>
-                    <a:schemeClr val="tx1"/>
-                  </a:solidFill>
-                  <a:latin typeface="Calibri" panose="020F0502020204030204" pitchFamily="34" charset="0"/>
-                </a:defRPr>
-              </a:lvl7pPr>
-              <a:lvl8pPr marL="3429000" indent="-228600" eaLnBrk="0" fontAlgn="base" hangingPunct="0">
-                <a:spcBef>
-                  <a:spcPct val="0"/>
-                </a:spcBef>
-                <a:spcAft>
-                  <a:spcPct val="0"/>
-                </a:spcAft>
-                <a:defRPr>
-                  <a:solidFill>
-                    <a:schemeClr val="tx1"/>
-                  </a:solidFill>
-                  <a:latin typeface="Calibri" panose="020F0502020204030204" pitchFamily="34" charset="0"/>
-                </a:defRPr>
-              </a:lvl8pPr>
-              <a:lvl9pPr marL="3886200" indent="-228600" eaLnBrk="0" fontAlgn="base" hangingPunct="0">
-                <a:spcBef>
-                  <a:spcPct val="0"/>
-                </a:spcBef>
-                <a:spcAft>
-                  <a:spcPct val="0"/>
-                </a:spcAft>
-                <a:defRPr>
-                  <a:solidFill>
-                    <a:schemeClr val="tx1"/>
-                  </a:solidFill>
-                  <a:latin typeface="Calibri" panose="020F0502020204030204" pitchFamily="34" charset="0"/>
-                </a:defRPr>
-              </a:lvl9pPr>
-            </a:lstStyle>
-            <a:p>
-              <a:pPr algn="ctr" eaLnBrk="1" hangingPunct="1"/>
-              <a:r>
-                <a:rPr lang="en-US" altLang="en-US" sz="800" dirty="0">
-                  <a:latin typeface="Amazon Ember" panose="020B0603020204020204" pitchFamily="34" charset="0"/>
-                  <a:ea typeface="Amazon Ember" panose="020B0603020204020204" pitchFamily="34" charset="0"/>
-                  <a:cs typeface="Amazon Ember" panose="020B0603020204020204" pitchFamily="34" charset="0"/>
-                </a:rPr>
-                <a:t>Amazon EMR</a:t>
-              </a:r>
-            </a:p>
-          </p:txBody>
-        </p:sp>
         <p:cxnSp>
           <p:nvCxnSpPr>
             <p:cNvPr id="88" name="Straight Arrow Connector 87">
@@ -5321,8 +5120,8 @@
           </p:nvCxnSpPr>
           <p:spPr>
             <a:xfrm>
-              <a:off x="2996031" y="1956183"/>
-              <a:ext cx="655480" cy="0"/>
+              <a:off x="3224842" y="2329666"/>
+              <a:ext cx="463775" cy="0"/>
             </a:xfrm>
             <a:prstGeom prst="straightConnector1">
               <a:avLst/>
@@ -5367,13 +5166,13 @@
             <p:nvPr/>
           </p:nvPicPr>
           <p:blipFill>
-            <a:blip r:embed="rId8">
+            <a:blip r:embed="rId7">
               <a:extLst>
                 <a:ext uri="{28A0092B-C50C-407E-A947-70E740481C1C}">
                   <a14:useLocalDpi xmlns:a14="http://schemas.microsoft.com/office/drawing/2010/main" val="0"/>
                 </a:ext>
                 <a:ext uri="{96DAC541-7B7A-43D3-8B79-37D633B846F1}">
-                  <asvg:svgBlip xmlns:asvg="http://schemas.microsoft.com/office/drawing/2016/SVG/main" r:embed="rId9"/>
+                  <asvg:svgBlip xmlns:asvg="http://schemas.microsoft.com/office/drawing/2016/SVG/main" r:embed="rId8"/>
                 </a:ext>
               </a:extLst>
             </a:blip>
@@ -5567,10 +5366,10 @@
             <p:nvPr/>
           </p:nvPicPr>
           <p:blipFill>
-            <a:blip r:embed="rId10">
+            <a:blip r:embed="rId9">
               <a:extLst>
                 <a:ext uri="{96DAC541-7B7A-43D3-8B79-37D633B846F1}">
-                  <asvg:svgBlip xmlns:asvg="http://schemas.microsoft.com/office/drawing/2016/SVG/main" r:embed="rId11"/>
+                  <asvg:svgBlip xmlns:asvg="http://schemas.microsoft.com/office/drawing/2016/SVG/main" r:embed="rId10"/>
                 </a:ext>
               </a:extLst>
             </a:blip>
@@ -5602,10 +5401,10 @@
             <p:nvPr/>
           </p:nvPicPr>
           <p:blipFill>
-            <a:blip r:embed="rId12">
+            <a:blip r:embed="rId11">
               <a:extLst>
                 <a:ext uri="{96DAC541-7B7A-43D3-8B79-37D633B846F1}">
-                  <asvg:svgBlip xmlns:asvg="http://schemas.microsoft.com/office/drawing/2016/SVG/main" r:embed="rId13"/>
+                  <asvg:svgBlip xmlns:asvg="http://schemas.microsoft.com/office/drawing/2016/SVG/main" r:embed="rId12"/>
                 </a:ext>
               </a:extLst>
             </a:blip>
@@ -5646,6 +5445,1495 @@
           </p:spPr>
         </p:pic>
       </p:grpSp>
+      <p:pic>
+        <p:nvPicPr>
+          <p:cNvPr id="6" name="Graphic 9">
+            <a:extLst>
+              <a:ext uri="{FF2B5EF4-FFF2-40B4-BE49-F238E27FC236}">
+                <a16:creationId xmlns:a16="http://schemas.microsoft.com/office/drawing/2014/main" id="{755D08C3-A029-31BE-7FD6-5164C7594F58}"/>
+              </a:ext>
+            </a:extLst>
+          </p:cNvPr>
+          <p:cNvPicPr>
+            <a:picLocks noChangeAspect="1" noChangeArrowheads="1"/>
+          </p:cNvPicPr>
+          <p:nvPr/>
+        </p:nvPicPr>
+        <p:blipFill>
+          <a:blip r:embed="rId13">
+            <a:extLst>
+              <a:ext uri="{28A0092B-C50C-407E-A947-70E740481C1C}">
+                <a14:useLocalDpi xmlns:a14="http://schemas.microsoft.com/office/drawing/2010/main" val="0"/>
+              </a:ext>
+            </a:extLst>
+          </a:blip>
+          <a:srcRect/>
+          <a:stretch>
+            <a:fillRect/>
+          </a:stretch>
+        </p:blipFill>
+        <p:spPr bwMode="auto">
+          <a:xfrm>
+            <a:off x="4187452" y="2965272"/>
+            <a:ext cx="290019" cy="292594"/>
+          </a:xfrm>
+          <a:prstGeom prst="rect">
+            <a:avLst/>
+          </a:prstGeom>
+          <a:noFill/>
+          <a:ln>
+            <a:noFill/>
+          </a:ln>
+          <a:extLst>
+            <a:ext uri="{909E8E84-426E-40DD-AFC4-6F175D3DCCD1}">
+              <a14:hiddenFill xmlns:a14="http://schemas.microsoft.com/office/drawing/2010/main">
+                <a:solidFill>
+                  <a:srgbClr val="FFFFFF"/>
+                </a:solidFill>
+              </a14:hiddenFill>
+            </a:ext>
+            <a:ext uri="{91240B29-F687-4F45-9708-019B960494DF}">
+              <a14:hiddenLine xmlns:a14="http://schemas.microsoft.com/office/drawing/2010/main" w="9525">
+                <a:solidFill>
+                  <a:srgbClr val="000000"/>
+                </a:solidFill>
+                <a:miter lim="800000"/>
+                <a:headEnd/>
+                <a:tailEnd/>
+              </a14:hiddenLine>
+            </a:ext>
+          </a:extLst>
+        </p:spPr>
+      </p:pic>
+      <p:sp>
+        <p:nvSpPr>
+          <p:cNvPr id="8" name="TextBox 17">
+            <a:extLst>
+              <a:ext uri="{FF2B5EF4-FFF2-40B4-BE49-F238E27FC236}">
+                <a16:creationId xmlns:a16="http://schemas.microsoft.com/office/drawing/2014/main" id="{1AED17E9-9DC5-0D3A-50F5-A7F587E951F3}"/>
+              </a:ext>
+            </a:extLst>
+          </p:cNvPr>
+          <p:cNvSpPr txBox="1">
+            <a:spLocks noChangeArrowheads="1"/>
+          </p:cNvSpPr>
+          <p:nvPr/>
+        </p:nvSpPr>
+        <p:spPr bwMode="auto">
+          <a:xfrm>
+            <a:off x="3949865" y="3268321"/>
+            <a:ext cx="765192" cy="338554"/>
+          </a:xfrm>
+          <a:prstGeom prst="rect">
+            <a:avLst/>
+          </a:prstGeom>
+          <a:noFill/>
+          <a:ln>
+            <a:noFill/>
+          </a:ln>
+          <a:extLst>
+            <a:ext uri="{909E8E84-426E-40DD-AFC4-6F175D3DCCD1}">
+              <a14:hiddenFill xmlns:a14="http://schemas.microsoft.com/office/drawing/2010/main">
+                <a:solidFill>
+                  <a:srgbClr val="FFFFFF"/>
+                </a:solidFill>
+              </a14:hiddenFill>
+            </a:ext>
+            <a:ext uri="{91240B29-F687-4F45-9708-019B960494DF}">
+              <a14:hiddenLine xmlns:a14="http://schemas.microsoft.com/office/drawing/2010/main" w="9525">
+                <a:solidFill>
+                  <a:srgbClr val="000000"/>
+                </a:solidFill>
+                <a:miter lim="800000"/>
+                <a:headEnd/>
+                <a:tailEnd/>
+              </a14:hiddenLine>
+            </a:ext>
+          </a:extLst>
+        </p:spPr>
+        <p:txBody>
+          <a:bodyPr wrap="square">
+            <a:spAutoFit/>
+          </a:bodyPr>
+          <a:lstStyle>
+            <a:lvl1pPr>
+              <a:defRPr>
+                <a:solidFill>
+                  <a:schemeClr val="tx1"/>
+                </a:solidFill>
+                <a:latin typeface="Calibri" panose="020F0502020204030204" pitchFamily="34" charset="0"/>
+              </a:defRPr>
+            </a:lvl1pPr>
+            <a:lvl2pPr marL="742950" indent="-285750">
+              <a:defRPr>
+                <a:solidFill>
+                  <a:schemeClr val="tx1"/>
+                </a:solidFill>
+                <a:latin typeface="Calibri" panose="020F0502020204030204" pitchFamily="34" charset="0"/>
+              </a:defRPr>
+            </a:lvl2pPr>
+            <a:lvl3pPr marL="1143000" indent="-228600">
+              <a:defRPr>
+                <a:solidFill>
+                  <a:schemeClr val="tx1"/>
+                </a:solidFill>
+                <a:latin typeface="Calibri" panose="020F0502020204030204" pitchFamily="34" charset="0"/>
+              </a:defRPr>
+            </a:lvl3pPr>
+            <a:lvl4pPr marL="1600200" indent="-228600">
+              <a:defRPr>
+                <a:solidFill>
+                  <a:schemeClr val="tx1"/>
+                </a:solidFill>
+                <a:latin typeface="Calibri" panose="020F0502020204030204" pitchFamily="34" charset="0"/>
+              </a:defRPr>
+            </a:lvl4pPr>
+            <a:lvl5pPr marL="2057400" indent="-228600">
+              <a:defRPr>
+                <a:solidFill>
+                  <a:schemeClr val="tx1"/>
+                </a:solidFill>
+                <a:latin typeface="Calibri" panose="020F0502020204030204" pitchFamily="34" charset="0"/>
+              </a:defRPr>
+            </a:lvl5pPr>
+            <a:lvl6pPr marL="2514600" indent="-228600" eaLnBrk="0" fontAlgn="base" hangingPunct="0">
+              <a:spcBef>
+                <a:spcPct val="0"/>
+              </a:spcBef>
+              <a:spcAft>
+                <a:spcPct val="0"/>
+              </a:spcAft>
+              <a:defRPr>
+                <a:solidFill>
+                  <a:schemeClr val="tx1"/>
+                </a:solidFill>
+                <a:latin typeface="Calibri" panose="020F0502020204030204" pitchFamily="34" charset="0"/>
+              </a:defRPr>
+            </a:lvl6pPr>
+            <a:lvl7pPr marL="2971800" indent="-228600" eaLnBrk="0" fontAlgn="base" hangingPunct="0">
+              <a:spcBef>
+                <a:spcPct val="0"/>
+              </a:spcBef>
+              <a:spcAft>
+                <a:spcPct val="0"/>
+              </a:spcAft>
+              <a:defRPr>
+                <a:solidFill>
+                  <a:schemeClr val="tx1"/>
+                </a:solidFill>
+                <a:latin typeface="Calibri" panose="020F0502020204030204" pitchFamily="34" charset="0"/>
+              </a:defRPr>
+            </a:lvl7pPr>
+            <a:lvl8pPr marL="3429000" indent="-228600" eaLnBrk="0" fontAlgn="base" hangingPunct="0">
+              <a:spcBef>
+                <a:spcPct val="0"/>
+              </a:spcBef>
+              <a:spcAft>
+                <a:spcPct val="0"/>
+              </a:spcAft>
+              <a:defRPr>
+                <a:solidFill>
+                  <a:schemeClr val="tx1"/>
+                </a:solidFill>
+                <a:latin typeface="Calibri" panose="020F0502020204030204" pitchFamily="34" charset="0"/>
+              </a:defRPr>
+            </a:lvl8pPr>
+            <a:lvl9pPr marL="3886200" indent="-228600" eaLnBrk="0" fontAlgn="base" hangingPunct="0">
+              <a:spcBef>
+                <a:spcPct val="0"/>
+              </a:spcBef>
+              <a:spcAft>
+                <a:spcPct val="0"/>
+              </a:spcAft>
+              <a:defRPr>
+                <a:solidFill>
+                  <a:schemeClr val="tx1"/>
+                </a:solidFill>
+                <a:latin typeface="Calibri" panose="020F0502020204030204" pitchFamily="34" charset="0"/>
+              </a:defRPr>
+            </a:lvl9pPr>
+          </a:lstStyle>
+          <a:p>
+            <a:pPr algn="ctr" eaLnBrk="1" hangingPunct="1"/>
+            <a:r>
+              <a:rPr lang="en-US" altLang="en-US" sz="800" dirty="0">
+                <a:latin typeface="Amazon Ember" panose="020B0603020204020204" pitchFamily="34" charset="0"/>
+                <a:ea typeface="Amazon Ember" panose="020B0603020204020204" pitchFamily="34" charset="0"/>
+                <a:cs typeface="Amazon Ember" panose="020B0603020204020204" pitchFamily="34" charset="0"/>
+              </a:rPr>
+              <a:t>AWS Glue</a:t>
+            </a:r>
+          </a:p>
+          <a:p>
+            <a:pPr algn="ctr" eaLnBrk="1" hangingPunct="1"/>
+            <a:r>
+              <a:rPr lang="en-US" altLang="en-US" sz="800" dirty="0">
+                <a:latin typeface="Amazon Ember" panose="020B0603020204020204" pitchFamily="34" charset="0"/>
+                <a:ea typeface="Amazon Ember" panose="020B0603020204020204" pitchFamily="34" charset="0"/>
+                <a:cs typeface="Amazon Ember" panose="020B0603020204020204" pitchFamily="34" charset="0"/>
+              </a:rPr>
+              <a:t>Data Catalog</a:t>
+            </a:r>
+          </a:p>
+        </p:txBody>
+      </p:sp>
+      <p:pic>
+        <p:nvPicPr>
+          <p:cNvPr id="15" name="Graphic 7">
+            <a:extLst>
+              <a:ext uri="{FF2B5EF4-FFF2-40B4-BE49-F238E27FC236}">
+                <a16:creationId xmlns:a16="http://schemas.microsoft.com/office/drawing/2014/main" id="{650B67E2-6F85-B1AD-7898-BF2564EFF900}"/>
+              </a:ext>
+            </a:extLst>
+          </p:cNvPr>
+          <p:cNvPicPr>
+            <a:picLocks noChangeAspect="1" noChangeArrowheads="1"/>
+          </p:cNvPicPr>
+          <p:nvPr/>
+        </p:nvPicPr>
+        <p:blipFill>
+          <a:blip r:embed="rId14" cstate="print">
+            <a:extLst>
+              <a:ext uri="{28A0092B-C50C-407E-A947-70E740481C1C}">
+                <a14:useLocalDpi xmlns:a14="http://schemas.microsoft.com/office/drawing/2010/main" val="0"/>
+              </a:ext>
+            </a:extLst>
+          </a:blip>
+          <a:srcRect/>
+          <a:stretch>
+            <a:fillRect/>
+          </a:stretch>
+        </p:blipFill>
+        <p:spPr bwMode="auto">
+          <a:xfrm>
+            <a:off x="7873377" y="2119650"/>
+            <a:ext cx="290019" cy="292594"/>
+          </a:xfrm>
+          <a:prstGeom prst="rect">
+            <a:avLst/>
+          </a:prstGeom>
+          <a:noFill/>
+          <a:ln>
+            <a:noFill/>
+          </a:ln>
+          <a:extLst>
+            <a:ext uri="{909E8E84-426E-40DD-AFC4-6F175D3DCCD1}">
+              <a14:hiddenFill xmlns:a14="http://schemas.microsoft.com/office/drawing/2010/main">
+                <a:solidFill>
+                  <a:srgbClr val="FFFFFF"/>
+                </a:solidFill>
+              </a14:hiddenFill>
+            </a:ext>
+            <a:ext uri="{91240B29-F687-4F45-9708-019B960494DF}">
+              <a14:hiddenLine xmlns:a14="http://schemas.microsoft.com/office/drawing/2010/main" w="9525">
+                <a:solidFill>
+                  <a:srgbClr val="000000"/>
+                </a:solidFill>
+                <a:miter lim="800000"/>
+                <a:headEnd/>
+                <a:tailEnd/>
+              </a14:hiddenLine>
+            </a:ext>
+          </a:extLst>
+        </p:spPr>
+      </p:pic>
+      <p:sp>
+        <p:nvSpPr>
+          <p:cNvPr id="16" name="TextBox 10">
+            <a:extLst>
+              <a:ext uri="{FF2B5EF4-FFF2-40B4-BE49-F238E27FC236}">
+                <a16:creationId xmlns:a16="http://schemas.microsoft.com/office/drawing/2014/main" id="{AC7B3EDE-A20B-2433-761A-9B839B4B1AFC}"/>
+              </a:ext>
+            </a:extLst>
+          </p:cNvPr>
+          <p:cNvSpPr txBox="1">
+            <a:spLocks noChangeArrowheads="1"/>
+          </p:cNvSpPr>
+          <p:nvPr/>
+        </p:nvSpPr>
+        <p:spPr bwMode="auto">
+          <a:xfrm>
+            <a:off x="7457554" y="2392133"/>
+            <a:ext cx="1194981" cy="229796"/>
+          </a:xfrm>
+          <a:prstGeom prst="rect">
+            <a:avLst/>
+          </a:prstGeom>
+          <a:noFill/>
+          <a:ln>
+            <a:noFill/>
+          </a:ln>
+          <a:extLst>
+            <a:ext uri="{909E8E84-426E-40DD-AFC4-6F175D3DCCD1}">
+              <a14:hiddenFill xmlns:a14="http://schemas.microsoft.com/office/drawing/2010/main">
+                <a:solidFill>
+                  <a:srgbClr val="FFFFFF"/>
+                </a:solidFill>
+              </a14:hiddenFill>
+            </a:ext>
+            <a:ext uri="{91240B29-F687-4F45-9708-019B960494DF}">
+              <a14:hiddenLine xmlns:a14="http://schemas.microsoft.com/office/drawing/2010/main" w="9525">
+                <a:solidFill>
+                  <a:srgbClr val="000000"/>
+                </a:solidFill>
+                <a:miter lim="800000"/>
+                <a:headEnd/>
+                <a:tailEnd/>
+              </a14:hiddenLine>
+            </a:ext>
+          </a:extLst>
+        </p:spPr>
+        <p:txBody>
+          <a:bodyPr wrap="square">
+            <a:spAutoFit/>
+          </a:bodyPr>
+          <a:lstStyle>
+            <a:lvl1pPr>
+              <a:defRPr>
+                <a:solidFill>
+                  <a:schemeClr val="tx1"/>
+                </a:solidFill>
+                <a:latin typeface="Calibri" panose="020F0502020204030204" pitchFamily="34" charset="0"/>
+              </a:defRPr>
+            </a:lvl1pPr>
+            <a:lvl2pPr marL="742950" indent="-285750">
+              <a:defRPr>
+                <a:solidFill>
+                  <a:schemeClr val="tx1"/>
+                </a:solidFill>
+                <a:latin typeface="Calibri" panose="020F0502020204030204" pitchFamily="34" charset="0"/>
+              </a:defRPr>
+            </a:lvl2pPr>
+            <a:lvl3pPr marL="1143000" indent="-228600">
+              <a:defRPr>
+                <a:solidFill>
+                  <a:schemeClr val="tx1"/>
+                </a:solidFill>
+                <a:latin typeface="Calibri" panose="020F0502020204030204" pitchFamily="34" charset="0"/>
+              </a:defRPr>
+            </a:lvl3pPr>
+            <a:lvl4pPr marL="1600200" indent="-228600">
+              <a:defRPr>
+                <a:solidFill>
+                  <a:schemeClr val="tx1"/>
+                </a:solidFill>
+                <a:latin typeface="Calibri" panose="020F0502020204030204" pitchFamily="34" charset="0"/>
+              </a:defRPr>
+            </a:lvl4pPr>
+            <a:lvl5pPr marL="2057400" indent="-228600">
+              <a:defRPr>
+                <a:solidFill>
+                  <a:schemeClr val="tx1"/>
+                </a:solidFill>
+                <a:latin typeface="Calibri" panose="020F0502020204030204" pitchFamily="34" charset="0"/>
+              </a:defRPr>
+            </a:lvl5pPr>
+            <a:lvl6pPr marL="2514600" indent="-228600" eaLnBrk="0" fontAlgn="base" hangingPunct="0">
+              <a:spcBef>
+                <a:spcPct val="0"/>
+              </a:spcBef>
+              <a:spcAft>
+                <a:spcPct val="0"/>
+              </a:spcAft>
+              <a:defRPr>
+                <a:solidFill>
+                  <a:schemeClr val="tx1"/>
+                </a:solidFill>
+                <a:latin typeface="Calibri" panose="020F0502020204030204" pitchFamily="34" charset="0"/>
+              </a:defRPr>
+            </a:lvl6pPr>
+            <a:lvl7pPr marL="2971800" indent="-228600" eaLnBrk="0" fontAlgn="base" hangingPunct="0">
+              <a:spcBef>
+                <a:spcPct val="0"/>
+              </a:spcBef>
+              <a:spcAft>
+                <a:spcPct val="0"/>
+              </a:spcAft>
+              <a:defRPr>
+                <a:solidFill>
+                  <a:schemeClr val="tx1"/>
+                </a:solidFill>
+                <a:latin typeface="Calibri" panose="020F0502020204030204" pitchFamily="34" charset="0"/>
+              </a:defRPr>
+            </a:lvl7pPr>
+            <a:lvl8pPr marL="3429000" indent="-228600" eaLnBrk="0" fontAlgn="base" hangingPunct="0">
+              <a:spcBef>
+                <a:spcPct val="0"/>
+              </a:spcBef>
+              <a:spcAft>
+                <a:spcPct val="0"/>
+              </a:spcAft>
+              <a:defRPr>
+                <a:solidFill>
+                  <a:schemeClr val="tx1"/>
+                </a:solidFill>
+                <a:latin typeface="Calibri" panose="020F0502020204030204" pitchFamily="34" charset="0"/>
+              </a:defRPr>
+            </a:lvl8pPr>
+            <a:lvl9pPr marL="3886200" indent="-228600" eaLnBrk="0" fontAlgn="base" hangingPunct="0">
+              <a:spcBef>
+                <a:spcPct val="0"/>
+              </a:spcBef>
+              <a:spcAft>
+                <a:spcPct val="0"/>
+              </a:spcAft>
+              <a:defRPr>
+                <a:solidFill>
+                  <a:schemeClr val="tx1"/>
+                </a:solidFill>
+                <a:latin typeface="Calibri" panose="020F0502020204030204" pitchFamily="34" charset="0"/>
+              </a:defRPr>
+            </a:lvl9pPr>
+          </a:lstStyle>
+          <a:p>
+            <a:pPr algn="ctr" eaLnBrk="1" hangingPunct="1"/>
+            <a:r>
+              <a:rPr lang="en-US" altLang="en-US" sz="800" dirty="0">
+                <a:latin typeface="Amazon Ember" panose="020B0603020204020204" pitchFamily="34" charset="0"/>
+                <a:ea typeface="Amazon Ember" panose="020B0603020204020204" pitchFamily="34" charset="0"/>
+                <a:cs typeface="Amazon Ember" panose="020B0603020204020204" pitchFamily="34" charset="0"/>
+              </a:rPr>
+              <a:t>Amazon QuickSight</a:t>
+            </a:r>
+          </a:p>
+        </p:txBody>
+      </p:sp>
+      <p:pic>
+        <p:nvPicPr>
+          <p:cNvPr id="17" name="Graphic 16" descr="Crawler resource icon for the AWS Glue service.">
+            <a:extLst>
+              <a:ext uri="{FF2B5EF4-FFF2-40B4-BE49-F238E27FC236}">
+                <a16:creationId xmlns:a16="http://schemas.microsoft.com/office/drawing/2014/main" id="{D9D7BDF0-825F-36E4-DA09-B493708AB1B4}"/>
+              </a:ext>
+            </a:extLst>
+          </p:cNvPr>
+          <p:cNvPicPr>
+            <a:picLocks noChangeAspect="1"/>
+          </p:cNvPicPr>
+          <p:nvPr/>
+        </p:nvPicPr>
+        <p:blipFill>
+          <a:blip r:embed="rId15">
+            <a:extLst>
+              <a:ext uri="{96DAC541-7B7A-43D3-8B79-37D633B846F1}">
+                <asvg:svgBlip xmlns:asvg="http://schemas.microsoft.com/office/drawing/2016/SVG/main" r:embed="rId16"/>
+              </a:ext>
+            </a:extLst>
+          </a:blip>
+          <a:stretch>
+            <a:fillRect/>
+          </a:stretch>
+        </p:blipFill>
+        <p:spPr>
+          <a:xfrm>
+            <a:off x="3389740" y="2956408"/>
+            <a:ext cx="303049" cy="303049"/>
+          </a:xfrm>
+          <a:prstGeom prst="rect">
+            <a:avLst/>
+          </a:prstGeom>
+        </p:spPr>
+      </p:pic>
+      <p:sp>
+        <p:nvSpPr>
+          <p:cNvPr id="23" name="TextBox 17">
+            <a:extLst>
+              <a:ext uri="{FF2B5EF4-FFF2-40B4-BE49-F238E27FC236}">
+                <a16:creationId xmlns:a16="http://schemas.microsoft.com/office/drawing/2014/main" id="{6E383336-8FD8-4BE7-06CB-59C79F503947}"/>
+              </a:ext>
+            </a:extLst>
+          </p:cNvPr>
+          <p:cNvSpPr txBox="1">
+            <a:spLocks noChangeArrowheads="1"/>
+          </p:cNvSpPr>
+          <p:nvPr/>
+        </p:nvSpPr>
+        <p:spPr bwMode="auto">
+          <a:xfrm>
+            <a:off x="3158668" y="3268321"/>
+            <a:ext cx="765192" cy="215444"/>
+          </a:xfrm>
+          <a:prstGeom prst="rect">
+            <a:avLst/>
+          </a:prstGeom>
+          <a:noFill/>
+          <a:ln>
+            <a:noFill/>
+          </a:ln>
+          <a:extLst>
+            <a:ext uri="{909E8E84-426E-40DD-AFC4-6F175D3DCCD1}">
+              <a14:hiddenFill xmlns:a14="http://schemas.microsoft.com/office/drawing/2010/main">
+                <a:solidFill>
+                  <a:srgbClr val="FFFFFF"/>
+                </a:solidFill>
+              </a14:hiddenFill>
+            </a:ext>
+            <a:ext uri="{91240B29-F687-4F45-9708-019B960494DF}">
+              <a14:hiddenLine xmlns:a14="http://schemas.microsoft.com/office/drawing/2010/main" w="9525">
+                <a:solidFill>
+                  <a:srgbClr val="000000"/>
+                </a:solidFill>
+                <a:miter lim="800000"/>
+                <a:headEnd/>
+                <a:tailEnd/>
+              </a14:hiddenLine>
+            </a:ext>
+          </a:extLst>
+        </p:spPr>
+        <p:txBody>
+          <a:bodyPr wrap="square">
+            <a:spAutoFit/>
+          </a:bodyPr>
+          <a:lstStyle>
+            <a:lvl1pPr>
+              <a:defRPr>
+                <a:solidFill>
+                  <a:schemeClr val="tx1"/>
+                </a:solidFill>
+                <a:latin typeface="Calibri" panose="020F0502020204030204" pitchFamily="34" charset="0"/>
+              </a:defRPr>
+            </a:lvl1pPr>
+            <a:lvl2pPr marL="742950" indent="-285750">
+              <a:defRPr>
+                <a:solidFill>
+                  <a:schemeClr val="tx1"/>
+                </a:solidFill>
+                <a:latin typeface="Calibri" panose="020F0502020204030204" pitchFamily="34" charset="0"/>
+              </a:defRPr>
+            </a:lvl2pPr>
+            <a:lvl3pPr marL="1143000" indent="-228600">
+              <a:defRPr>
+                <a:solidFill>
+                  <a:schemeClr val="tx1"/>
+                </a:solidFill>
+                <a:latin typeface="Calibri" panose="020F0502020204030204" pitchFamily="34" charset="0"/>
+              </a:defRPr>
+            </a:lvl3pPr>
+            <a:lvl4pPr marL="1600200" indent="-228600">
+              <a:defRPr>
+                <a:solidFill>
+                  <a:schemeClr val="tx1"/>
+                </a:solidFill>
+                <a:latin typeface="Calibri" panose="020F0502020204030204" pitchFamily="34" charset="0"/>
+              </a:defRPr>
+            </a:lvl4pPr>
+            <a:lvl5pPr marL="2057400" indent="-228600">
+              <a:defRPr>
+                <a:solidFill>
+                  <a:schemeClr val="tx1"/>
+                </a:solidFill>
+                <a:latin typeface="Calibri" panose="020F0502020204030204" pitchFamily="34" charset="0"/>
+              </a:defRPr>
+            </a:lvl5pPr>
+            <a:lvl6pPr marL="2514600" indent="-228600" eaLnBrk="0" fontAlgn="base" hangingPunct="0">
+              <a:spcBef>
+                <a:spcPct val="0"/>
+              </a:spcBef>
+              <a:spcAft>
+                <a:spcPct val="0"/>
+              </a:spcAft>
+              <a:defRPr>
+                <a:solidFill>
+                  <a:schemeClr val="tx1"/>
+                </a:solidFill>
+                <a:latin typeface="Calibri" panose="020F0502020204030204" pitchFamily="34" charset="0"/>
+              </a:defRPr>
+            </a:lvl6pPr>
+            <a:lvl7pPr marL="2971800" indent="-228600" eaLnBrk="0" fontAlgn="base" hangingPunct="0">
+              <a:spcBef>
+                <a:spcPct val="0"/>
+              </a:spcBef>
+              <a:spcAft>
+                <a:spcPct val="0"/>
+              </a:spcAft>
+              <a:defRPr>
+                <a:solidFill>
+                  <a:schemeClr val="tx1"/>
+                </a:solidFill>
+                <a:latin typeface="Calibri" panose="020F0502020204030204" pitchFamily="34" charset="0"/>
+              </a:defRPr>
+            </a:lvl7pPr>
+            <a:lvl8pPr marL="3429000" indent="-228600" eaLnBrk="0" fontAlgn="base" hangingPunct="0">
+              <a:spcBef>
+                <a:spcPct val="0"/>
+              </a:spcBef>
+              <a:spcAft>
+                <a:spcPct val="0"/>
+              </a:spcAft>
+              <a:defRPr>
+                <a:solidFill>
+                  <a:schemeClr val="tx1"/>
+                </a:solidFill>
+                <a:latin typeface="Calibri" panose="020F0502020204030204" pitchFamily="34" charset="0"/>
+              </a:defRPr>
+            </a:lvl8pPr>
+            <a:lvl9pPr marL="3886200" indent="-228600" eaLnBrk="0" fontAlgn="base" hangingPunct="0">
+              <a:spcBef>
+                <a:spcPct val="0"/>
+              </a:spcBef>
+              <a:spcAft>
+                <a:spcPct val="0"/>
+              </a:spcAft>
+              <a:defRPr>
+                <a:solidFill>
+                  <a:schemeClr val="tx1"/>
+                </a:solidFill>
+                <a:latin typeface="Calibri" panose="020F0502020204030204" pitchFamily="34" charset="0"/>
+              </a:defRPr>
+            </a:lvl9pPr>
+          </a:lstStyle>
+          <a:p>
+            <a:pPr algn="ctr" eaLnBrk="1" hangingPunct="1"/>
+            <a:r>
+              <a:rPr lang="en-US" altLang="en-US" sz="800" dirty="0">
+                <a:latin typeface="Amazon Ember" panose="020B0603020204020204" pitchFamily="34" charset="0"/>
+                <a:ea typeface="Amazon Ember" panose="020B0603020204020204" pitchFamily="34" charset="0"/>
+                <a:cs typeface="Amazon Ember" panose="020B0603020204020204" pitchFamily="34" charset="0"/>
+              </a:rPr>
+              <a:t>Crawler</a:t>
+            </a:r>
+          </a:p>
+        </p:txBody>
+      </p:sp>
+      <p:sp>
+        <p:nvSpPr>
+          <p:cNvPr id="37" name="Rectangle 36">
+            <a:extLst>
+              <a:ext uri="{FF2B5EF4-FFF2-40B4-BE49-F238E27FC236}">
+                <a16:creationId xmlns:a16="http://schemas.microsoft.com/office/drawing/2014/main" id="{279D3019-BF3E-E056-5F33-94D98AEBFE25}"/>
+              </a:ext>
+            </a:extLst>
+          </p:cNvPr>
+          <p:cNvSpPr/>
+          <p:nvPr/>
+        </p:nvSpPr>
+        <p:spPr>
+          <a:xfrm>
+            <a:off x="6967238" y="2914888"/>
+            <a:ext cx="2207494" cy="571217"/>
+          </a:xfrm>
+          <a:prstGeom prst="rect">
+            <a:avLst/>
+          </a:prstGeom>
+          <a:solidFill>
+            <a:srgbClr val="5A6B86">
+              <a:alpha val="9804"/>
+            </a:srgbClr>
+          </a:solidFill>
+          <a:ln w="12700">
+            <a:noFill/>
+            <a:prstDash val="dash"/>
+          </a:ln>
+        </p:spPr>
+        <p:style>
+          <a:lnRef idx="2">
+            <a:schemeClr val="accent1">
+              <a:shade val="50000"/>
+            </a:schemeClr>
+          </a:lnRef>
+          <a:fillRef idx="1">
+            <a:schemeClr val="accent1"/>
+          </a:fillRef>
+          <a:effectRef idx="0">
+            <a:schemeClr val="accent1"/>
+          </a:effectRef>
+          <a:fontRef idx="minor">
+            <a:schemeClr val="lt1"/>
+          </a:fontRef>
+        </p:style>
+        <p:txBody>
+          <a:bodyPr tIns="45720"/>
+          <a:lstStyle/>
+          <a:p>
+            <a:pPr algn="ctr" eaLnBrk="1" fontAlgn="auto" hangingPunct="1">
+              <a:spcBef>
+                <a:spcPts val="0"/>
+              </a:spcBef>
+              <a:spcAft>
+                <a:spcPts val="0"/>
+              </a:spcAft>
+              <a:defRPr/>
+            </a:pPr>
+            <a:endParaRPr lang="en-US" sz="1000" dirty="0">
+              <a:solidFill>
+                <a:schemeClr val="tx1"/>
+              </a:solidFill>
+              <a:latin typeface="Amazon Ember" panose="020B0603020204020204" pitchFamily="34" charset="0"/>
+              <a:ea typeface="Amazon Ember" panose="020B0603020204020204" pitchFamily="34" charset="0"/>
+              <a:cs typeface="Amazon Ember" panose="020B0603020204020204" pitchFamily="34" charset="0"/>
+            </a:endParaRPr>
+          </a:p>
+        </p:txBody>
+      </p:sp>
+      <p:pic>
+        <p:nvPicPr>
+          <p:cNvPr id="38" name="Graphic 22">
+            <a:extLst>
+              <a:ext uri="{FF2B5EF4-FFF2-40B4-BE49-F238E27FC236}">
+                <a16:creationId xmlns:a16="http://schemas.microsoft.com/office/drawing/2014/main" id="{9CB8F985-5376-7143-E4FC-1277FDF88A9C}"/>
+              </a:ext>
+            </a:extLst>
+          </p:cNvPr>
+          <p:cNvPicPr>
+            <a:picLocks noChangeAspect="1" noChangeArrowheads="1"/>
+          </p:cNvPicPr>
+          <p:nvPr/>
+        </p:nvPicPr>
+        <p:blipFill>
+          <a:blip r:embed="rId17" cstate="print">
+            <a:extLst>
+              <a:ext uri="{28A0092B-C50C-407E-A947-70E740481C1C}">
+                <a14:useLocalDpi xmlns:a14="http://schemas.microsoft.com/office/drawing/2010/main" val="0"/>
+              </a:ext>
+            </a:extLst>
+          </a:blip>
+          <a:srcRect/>
+          <a:stretch>
+            <a:fillRect/>
+          </a:stretch>
+        </p:blipFill>
+        <p:spPr bwMode="auto">
+          <a:xfrm>
+            <a:off x="7867072" y="2980065"/>
+            <a:ext cx="290019" cy="292594"/>
+          </a:xfrm>
+          <a:prstGeom prst="rect">
+            <a:avLst/>
+          </a:prstGeom>
+          <a:noFill/>
+          <a:ln>
+            <a:noFill/>
+          </a:ln>
+          <a:extLst>
+            <a:ext uri="{909E8E84-426E-40DD-AFC4-6F175D3DCCD1}">
+              <a14:hiddenFill xmlns:a14="http://schemas.microsoft.com/office/drawing/2010/main">
+                <a:solidFill>
+                  <a:srgbClr val="FFFFFF"/>
+                </a:solidFill>
+              </a14:hiddenFill>
+            </a:ext>
+            <a:ext uri="{91240B29-F687-4F45-9708-019B960494DF}">
+              <a14:hiddenLine xmlns:a14="http://schemas.microsoft.com/office/drawing/2010/main" w="9525">
+                <a:solidFill>
+                  <a:srgbClr val="000000"/>
+                </a:solidFill>
+                <a:miter lim="800000"/>
+                <a:headEnd/>
+                <a:tailEnd/>
+              </a14:hiddenLine>
+            </a:ext>
+          </a:extLst>
+        </p:spPr>
+      </p:pic>
+      <p:sp>
+        <p:nvSpPr>
+          <p:cNvPr id="39" name="TextBox 17">
+            <a:extLst>
+              <a:ext uri="{FF2B5EF4-FFF2-40B4-BE49-F238E27FC236}">
+                <a16:creationId xmlns:a16="http://schemas.microsoft.com/office/drawing/2014/main" id="{5A64AAD5-DF93-3536-F4FD-8787412A0A2A}"/>
+              </a:ext>
+            </a:extLst>
+          </p:cNvPr>
+          <p:cNvSpPr txBox="1">
+            <a:spLocks noChangeArrowheads="1"/>
+          </p:cNvSpPr>
+          <p:nvPr/>
+        </p:nvSpPr>
+        <p:spPr bwMode="auto">
+          <a:xfrm>
+            <a:off x="7358833" y="3272659"/>
+            <a:ext cx="1319622" cy="229796"/>
+          </a:xfrm>
+          <a:prstGeom prst="rect">
+            <a:avLst/>
+          </a:prstGeom>
+          <a:noFill/>
+          <a:ln>
+            <a:noFill/>
+          </a:ln>
+          <a:extLst>
+            <a:ext uri="{909E8E84-426E-40DD-AFC4-6F175D3DCCD1}">
+              <a14:hiddenFill xmlns:a14="http://schemas.microsoft.com/office/drawing/2010/main">
+                <a:solidFill>
+                  <a:srgbClr val="FFFFFF"/>
+                </a:solidFill>
+              </a14:hiddenFill>
+            </a:ext>
+            <a:ext uri="{91240B29-F687-4F45-9708-019B960494DF}">
+              <a14:hiddenLine xmlns:a14="http://schemas.microsoft.com/office/drawing/2010/main" w="9525">
+                <a:solidFill>
+                  <a:srgbClr val="000000"/>
+                </a:solidFill>
+                <a:miter lim="800000"/>
+                <a:headEnd/>
+                <a:tailEnd/>
+              </a14:hiddenLine>
+            </a:ext>
+          </a:extLst>
+        </p:spPr>
+        <p:txBody>
+          <a:bodyPr wrap="square">
+            <a:spAutoFit/>
+          </a:bodyPr>
+          <a:lstStyle>
+            <a:lvl1pPr>
+              <a:defRPr>
+                <a:solidFill>
+                  <a:schemeClr val="tx1"/>
+                </a:solidFill>
+                <a:latin typeface="Calibri" panose="020F0502020204030204" pitchFamily="34" charset="0"/>
+              </a:defRPr>
+            </a:lvl1pPr>
+            <a:lvl2pPr marL="742950" indent="-285750">
+              <a:defRPr>
+                <a:solidFill>
+                  <a:schemeClr val="tx1"/>
+                </a:solidFill>
+                <a:latin typeface="Calibri" panose="020F0502020204030204" pitchFamily="34" charset="0"/>
+              </a:defRPr>
+            </a:lvl2pPr>
+            <a:lvl3pPr marL="1143000" indent="-228600">
+              <a:defRPr>
+                <a:solidFill>
+                  <a:schemeClr val="tx1"/>
+                </a:solidFill>
+                <a:latin typeface="Calibri" panose="020F0502020204030204" pitchFamily="34" charset="0"/>
+              </a:defRPr>
+            </a:lvl3pPr>
+            <a:lvl4pPr marL="1600200" indent="-228600">
+              <a:defRPr>
+                <a:solidFill>
+                  <a:schemeClr val="tx1"/>
+                </a:solidFill>
+                <a:latin typeface="Calibri" panose="020F0502020204030204" pitchFamily="34" charset="0"/>
+              </a:defRPr>
+            </a:lvl4pPr>
+            <a:lvl5pPr marL="2057400" indent="-228600">
+              <a:defRPr>
+                <a:solidFill>
+                  <a:schemeClr val="tx1"/>
+                </a:solidFill>
+                <a:latin typeface="Calibri" panose="020F0502020204030204" pitchFamily="34" charset="0"/>
+              </a:defRPr>
+            </a:lvl5pPr>
+            <a:lvl6pPr marL="2514600" indent="-228600" eaLnBrk="0" fontAlgn="base" hangingPunct="0">
+              <a:spcBef>
+                <a:spcPct val="0"/>
+              </a:spcBef>
+              <a:spcAft>
+                <a:spcPct val="0"/>
+              </a:spcAft>
+              <a:defRPr>
+                <a:solidFill>
+                  <a:schemeClr val="tx1"/>
+                </a:solidFill>
+                <a:latin typeface="Calibri" panose="020F0502020204030204" pitchFamily="34" charset="0"/>
+              </a:defRPr>
+            </a:lvl6pPr>
+            <a:lvl7pPr marL="2971800" indent="-228600" eaLnBrk="0" fontAlgn="base" hangingPunct="0">
+              <a:spcBef>
+                <a:spcPct val="0"/>
+              </a:spcBef>
+              <a:spcAft>
+                <a:spcPct val="0"/>
+              </a:spcAft>
+              <a:defRPr>
+                <a:solidFill>
+                  <a:schemeClr val="tx1"/>
+                </a:solidFill>
+                <a:latin typeface="Calibri" panose="020F0502020204030204" pitchFamily="34" charset="0"/>
+              </a:defRPr>
+            </a:lvl7pPr>
+            <a:lvl8pPr marL="3429000" indent="-228600" eaLnBrk="0" fontAlgn="base" hangingPunct="0">
+              <a:spcBef>
+                <a:spcPct val="0"/>
+              </a:spcBef>
+              <a:spcAft>
+                <a:spcPct val="0"/>
+              </a:spcAft>
+              <a:defRPr>
+                <a:solidFill>
+                  <a:schemeClr val="tx1"/>
+                </a:solidFill>
+                <a:latin typeface="Calibri" panose="020F0502020204030204" pitchFamily="34" charset="0"/>
+              </a:defRPr>
+            </a:lvl8pPr>
+            <a:lvl9pPr marL="3886200" indent="-228600" eaLnBrk="0" fontAlgn="base" hangingPunct="0">
+              <a:spcBef>
+                <a:spcPct val="0"/>
+              </a:spcBef>
+              <a:spcAft>
+                <a:spcPct val="0"/>
+              </a:spcAft>
+              <a:defRPr>
+                <a:solidFill>
+                  <a:schemeClr val="tx1"/>
+                </a:solidFill>
+                <a:latin typeface="Calibri" panose="020F0502020204030204" pitchFamily="34" charset="0"/>
+              </a:defRPr>
+            </a:lvl9pPr>
+          </a:lstStyle>
+          <a:p>
+            <a:pPr algn="ctr" eaLnBrk="1" hangingPunct="1"/>
+            <a:r>
+              <a:rPr lang="en-US" altLang="en-US" sz="800" dirty="0">
+                <a:latin typeface="Amazon Ember" panose="020B0603020204020204" pitchFamily="34" charset="0"/>
+                <a:ea typeface="Amazon Ember" panose="020B0603020204020204" pitchFamily="34" charset="0"/>
+                <a:cs typeface="Amazon Ember" panose="020B0603020204020204" pitchFamily="34" charset="0"/>
+              </a:rPr>
+              <a:t>Amazon EMR</a:t>
+            </a:r>
+          </a:p>
+        </p:txBody>
+      </p:sp>
+      <p:sp>
+        <p:nvSpPr>
+          <p:cNvPr id="53" name="Rectangle 52">
+            <a:extLst>
+              <a:ext uri="{FF2B5EF4-FFF2-40B4-BE49-F238E27FC236}">
+                <a16:creationId xmlns:a16="http://schemas.microsoft.com/office/drawing/2014/main" id="{7211DBF9-67B7-C975-D75F-8AD6987D4B8C}"/>
+              </a:ext>
+            </a:extLst>
+          </p:cNvPr>
+          <p:cNvSpPr/>
+          <p:nvPr/>
+        </p:nvSpPr>
+        <p:spPr>
+          <a:xfrm>
+            <a:off x="6473802" y="4185634"/>
+            <a:ext cx="1019946" cy="1970868"/>
+          </a:xfrm>
+          <a:prstGeom prst="rect">
+            <a:avLst/>
+          </a:prstGeom>
+          <a:noFill/>
+          <a:ln w="12700">
+            <a:solidFill>
+              <a:schemeClr val="accent3">
+                <a:lumMod val="75000"/>
+              </a:schemeClr>
+            </a:solidFill>
+            <a:prstDash val="dash"/>
+          </a:ln>
+        </p:spPr>
+        <p:style>
+          <a:lnRef idx="2">
+            <a:schemeClr val="accent1">
+              <a:shade val="50000"/>
+            </a:schemeClr>
+          </a:lnRef>
+          <a:fillRef idx="1">
+            <a:schemeClr val="accent1"/>
+          </a:fillRef>
+          <a:effectRef idx="0">
+            <a:schemeClr val="accent1"/>
+          </a:effectRef>
+          <a:fontRef idx="minor">
+            <a:schemeClr val="lt1"/>
+          </a:fontRef>
+        </p:style>
+        <p:txBody>
+          <a:bodyPr tIns="91440"/>
+          <a:lstStyle/>
+          <a:p>
+            <a:pPr algn="ctr" eaLnBrk="1" fontAlgn="auto" hangingPunct="1">
+              <a:spcBef>
+                <a:spcPts val="0"/>
+              </a:spcBef>
+              <a:spcAft>
+                <a:spcPts val="0"/>
+              </a:spcAft>
+              <a:defRPr/>
+            </a:pPr>
+            <a:r>
+              <a:rPr lang="en-US" sz="900" dirty="0">
+                <a:solidFill>
+                  <a:schemeClr val="tx1"/>
+                </a:solidFill>
+                <a:latin typeface="Amazon Ember" panose="020B0603020204020204" pitchFamily="34" charset="0"/>
+                <a:ea typeface="Amazon Ember" panose="020B0603020204020204" pitchFamily="34" charset="0"/>
+                <a:cs typeface="Amazon Ember" panose="020B0603020204020204" pitchFamily="34" charset="0"/>
+              </a:rPr>
+              <a:t>logs</a:t>
+            </a:r>
+          </a:p>
+        </p:txBody>
+      </p:sp>
+      <p:pic>
+        <p:nvPicPr>
+          <p:cNvPr id="55" name="Graphic 17" descr="Amazon CloudWatch service icon.">
+            <a:extLst>
+              <a:ext uri="{FF2B5EF4-FFF2-40B4-BE49-F238E27FC236}">
+                <a16:creationId xmlns:a16="http://schemas.microsoft.com/office/drawing/2014/main" id="{625DDFA7-5E30-E5A9-BDDE-B56D11001AB3}"/>
+              </a:ext>
+            </a:extLst>
+          </p:cNvPr>
+          <p:cNvPicPr>
+            <a:picLocks noChangeAspect="1" noChangeArrowheads="1"/>
+          </p:cNvPicPr>
+          <p:nvPr/>
+        </p:nvPicPr>
+        <p:blipFill>
+          <a:blip r:embed="rId18">
+            <a:extLst>
+              <a:ext uri="{96DAC541-7B7A-43D3-8B79-37D633B846F1}">
+                <asvg:svgBlip xmlns:asvg="http://schemas.microsoft.com/office/drawing/2016/SVG/main" r:embed="rId19"/>
+              </a:ext>
+            </a:extLst>
+          </a:blip>
+          <a:srcRect/>
+          <a:stretch/>
+        </p:blipFill>
+        <p:spPr bwMode="auto">
+          <a:xfrm>
+            <a:off x="6837478" y="4588753"/>
+            <a:ext cx="292594" cy="292594"/>
+          </a:xfrm>
+          <a:prstGeom prst="rect">
+            <a:avLst/>
+          </a:prstGeom>
+          <a:noFill/>
+          <a:ln>
+            <a:noFill/>
+          </a:ln>
+          <a:extLst>
+            <a:ext uri="{909E8E84-426E-40DD-AFC4-6F175D3DCCD1}">
+              <a14:hiddenFill xmlns:a14="http://schemas.microsoft.com/office/drawing/2010/main">
+                <a:solidFill>
+                  <a:srgbClr val="FFFFFF"/>
+                </a:solidFill>
+              </a14:hiddenFill>
+            </a:ext>
+            <a:ext uri="{91240B29-F687-4F45-9708-019B960494DF}">
+              <a14:hiddenLine xmlns:a14="http://schemas.microsoft.com/office/drawing/2010/main" w="9525">
+                <a:solidFill>
+                  <a:srgbClr val="000000"/>
+                </a:solidFill>
+                <a:miter lim="800000"/>
+                <a:headEnd/>
+                <a:tailEnd/>
+              </a14:hiddenLine>
+            </a:ext>
+          </a:extLst>
+        </p:spPr>
+      </p:pic>
+      <p:sp>
+        <p:nvSpPr>
+          <p:cNvPr id="56" name="TextBox 17">
+            <a:extLst>
+              <a:ext uri="{FF2B5EF4-FFF2-40B4-BE49-F238E27FC236}">
+                <a16:creationId xmlns:a16="http://schemas.microsoft.com/office/drawing/2014/main" id="{D08B7E41-4018-3847-FAA3-1B2E817E4D55}"/>
+              </a:ext>
+            </a:extLst>
+          </p:cNvPr>
+          <p:cNvSpPr txBox="1">
+            <a:spLocks noChangeArrowheads="1"/>
+          </p:cNvSpPr>
+          <p:nvPr/>
+        </p:nvSpPr>
+        <p:spPr bwMode="auto">
+          <a:xfrm>
+            <a:off x="6601179" y="4872044"/>
+            <a:ext cx="765192" cy="338554"/>
+          </a:xfrm>
+          <a:prstGeom prst="rect">
+            <a:avLst/>
+          </a:prstGeom>
+          <a:noFill/>
+          <a:ln>
+            <a:noFill/>
+          </a:ln>
+          <a:extLst>
+            <a:ext uri="{909E8E84-426E-40DD-AFC4-6F175D3DCCD1}">
+              <a14:hiddenFill xmlns:a14="http://schemas.microsoft.com/office/drawing/2010/main">
+                <a:solidFill>
+                  <a:srgbClr val="FFFFFF"/>
+                </a:solidFill>
+              </a14:hiddenFill>
+            </a:ext>
+            <a:ext uri="{91240B29-F687-4F45-9708-019B960494DF}">
+              <a14:hiddenLine xmlns:a14="http://schemas.microsoft.com/office/drawing/2010/main" w="9525">
+                <a:solidFill>
+                  <a:srgbClr val="000000"/>
+                </a:solidFill>
+                <a:miter lim="800000"/>
+                <a:headEnd/>
+                <a:tailEnd/>
+              </a14:hiddenLine>
+            </a:ext>
+          </a:extLst>
+        </p:spPr>
+        <p:txBody>
+          <a:bodyPr wrap="square">
+            <a:spAutoFit/>
+          </a:bodyPr>
+          <a:lstStyle>
+            <a:lvl1pPr>
+              <a:defRPr>
+                <a:solidFill>
+                  <a:schemeClr val="tx1"/>
+                </a:solidFill>
+                <a:latin typeface="Calibri" panose="020F0502020204030204" pitchFamily="34" charset="0"/>
+              </a:defRPr>
+            </a:lvl1pPr>
+            <a:lvl2pPr marL="742950" indent="-285750">
+              <a:defRPr>
+                <a:solidFill>
+                  <a:schemeClr val="tx1"/>
+                </a:solidFill>
+                <a:latin typeface="Calibri" panose="020F0502020204030204" pitchFamily="34" charset="0"/>
+              </a:defRPr>
+            </a:lvl2pPr>
+            <a:lvl3pPr marL="1143000" indent="-228600">
+              <a:defRPr>
+                <a:solidFill>
+                  <a:schemeClr val="tx1"/>
+                </a:solidFill>
+                <a:latin typeface="Calibri" panose="020F0502020204030204" pitchFamily="34" charset="0"/>
+              </a:defRPr>
+            </a:lvl3pPr>
+            <a:lvl4pPr marL="1600200" indent="-228600">
+              <a:defRPr>
+                <a:solidFill>
+                  <a:schemeClr val="tx1"/>
+                </a:solidFill>
+                <a:latin typeface="Calibri" panose="020F0502020204030204" pitchFamily="34" charset="0"/>
+              </a:defRPr>
+            </a:lvl4pPr>
+            <a:lvl5pPr marL="2057400" indent="-228600">
+              <a:defRPr>
+                <a:solidFill>
+                  <a:schemeClr val="tx1"/>
+                </a:solidFill>
+                <a:latin typeface="Calibri" panose="020F0502020204030204" pitchFamily="34" charset="0"/>
+              </a:defRPr>
+            </a:lvl5pPr>
+            <a:lvl6pPr marL="2514600" indent="-228600" eaLnBrk="0" fontAlgn="base" hangingPunct="0">
+              <a:spcBef>
+                <a:spcPct val="0"/>
+              </a:spcBef>
+              <a:spcAft>
+                <a:spcPct val="0"/>
+              </a:spcAft>
+              <a:defRPr>
+                <a:solidFill>
+                  <a:schemeClr val="tx1"/>
+                </a:solidFill>
+                <a:latin typeface="Calibri" panose="020F0502020204030204" pitchFamily="34" charset="0"/>
+              </a:defRPr>
+            </a:lvl6pPr>
+            <a:lvl7pPr marL="2971800" indent="-228600" eaLnBrk="0" fontAlgn="base" hangingPunct="0">
+              <a:spcBef>
+                <a:spcPct val="0"/>
+              </a:spcBef>
+              <a:spcAft>
+                <a:spcPct val="0"/>
+              </a:spcAft>
+              <a:defRPr>
+                <a:solidFill>
+                  <a:schemeClr val="tx1"/>
+                </a:solidFill>
+                <a:latin typeface="Calibri" panose="020F0502020204030204" pitchFamily="34" charset="0"/>
+              </a:defRPr>
+            </a:lvl7pPr>
+            <a:lvl8pPr marL="3429000" indent="-228600" eaLnBrk="0" fontAlgn="base" hangingPunct="0">
+              <a:spcBef>
+                <a:spcPct val="0"/>
+              </a:spcBef>
+              <a:spcAft>
+                <a:spcPct val="0"/>
+              </a:spcAft>
+              <a:defRPr>
+                <a:solidFill>
+                  <a:schemeClr val="tx1"/>
+                </a:solidFill>
+                <a:latin typeface="Calibri" panose="020F0502020204030204" pitchFamily="34" charset="0"/>
+              </a:defRPr>
+            </a:lvl8pPr>
+            <a:lvl9pPr marL="3886200" indent="-228600" eaLnBrk="0" fontAlgn="base" hangingPunct="0">
+              <a:spcBef>
+                <a:spcPct val="0"/>
+              </a:spcBef>
+              <a:spcAft>
+                <a:spcPct val="0"/>
+              </a:spcAft>
+              <a:defRPr>
+                <a:solidFill>
+                  <a:schemeClr val="tx1"/>
+                </a:solidFill>
+                <a:latin typeface="Calibri" panose="020F0502020204030204" pitchFamily="34" charset="0"/>
+              </a:defRPr>
+            </a:lvl9pPr>
+          </a:lstStyle>
+          <a:p>
+            <a:pPr algn="ctr" eaLnBrk="1" hangingPunct="1"/>
+            <a:r>
+              <a:rPr lang="en-US" altLang="en-US" sz="800" dirty="0">
+                <a:latin typeface="Amazon Ember" panose="020B0603020204020204" pitchFamily="34" charset="0"/>
+                <a:ea typeface="Amazon Ember" panose="020B0603020204020204" pitchFamily="34" charset="0"/>
+                <a:cs typeface="Amazon Ember" panose="020B0603020204020204" pitchFamily="34" charset="0"/>
+              </a:rPr>
+              <a:t>Amazon CloudWatch</a:t>
+            </a:r>
+          </a:p>
+        </p:txBody>
+      </p:sp>
+      <p:pic>
+        <p:nvPicPr>
+          <p:cNvPr id="57" name="Graphic 14">
+            <a:extLst>
+              <a:ext uri="{FF2B5EF4-FFF2-40B4-BE49-F238E27FC236}">
+                <a16:creationId xmlns:a16="http://schemas.microsoft.com/office/drawing/2014/main" id="{BF25C720-9123-D82B-1F38-7BB21D83B437}"/>
+              </a:ext>
+            </a:extLst>
+          </p:cNvPr>
+          <p:cNvPicPr>
+            <a:picLocks noChangeAspect="1" noChangeArrowheads="1"/>
+          </p:cNvPicPr>
+          <p:nvPr/>
+        </p:nvPicPr>
+        <p:blipFill>
+          <a:blip r:embed="rId20" cstate="print">
+            <a:extLst>
+              <a:ext uri="{28A0092B-C50C-407E-A947-70E740481C1C}">
+                <a14:useLocalDpi xmlns:a14="http://schemas.microsoft.com/office/drawing/2010/main" val="0"/>
+              </a:ext>
+            </a:extLst>
+          </a:blip>
+          <a:srcRect/>
+          <a:stretch>
+            <a:fillRect/>
+          </a:stretch>
+        </p:blipFill>
+        <p:spPr bwMode="auto">
+          <a:xfrm>
+            <a:off x="9126694" y="4007010"/>
+            <a:ext cx="290019" cy="292594"/>
+          </a:xfrm>
+          <a:prstGeom prst="rect">
+            <a:avLst/>
+          </a:prstGeom>
+          <a:noFill/>
+          <a:ln>
+            <a:noFill/>
+          </a:ln>
+          <a:extLst>
+            <a:ext uri="{909E8E84-426E-40DD-AFC4-6F175D3DCCD1}">
+              <a14:hiddenFill xmlns:a14="http://schemas.microsoft.com/office/drawing/2010/main">
+                <a:solidFill>
+                  <a:srgbClr val="FFFFFF"/>
+                </a:solidFill>
+              </a14:hiddenFill>
+            </a:ext>
+            <a:ext uri="{91240B29-F687-4F45-9708-019B960494DF}">
+              <a14:hiddenLine xmlns:a14="http://schemas.microsoft.com/office/drawing/2010/main" w="9525">
+                <a:solidFill>
+                  <a:srgbClr val="000000"/>
+                </a:solidFill>
+                <a:miter lim="800000"/>
+                <a:headEnd/>
+                <a:tailEnd/>
+              </a14:hiddenLine>
+            </a:ext>
+          </a:extLst>
+        </p:spPr>
+      </p:pic>
+      <p:sp>
+        <p:nvSpPr>
+          <p:cNvPr id="58" name="TextBox 17">
+            <a:extLst>
+              <a:ext uri="{FF2B5EF4-FFF2-40B4-BE49-F238E27FC236}">
+                <a16:creationId xmlns:a16="http://schemas.microsoft.com/office/drawing/2014/main" id="{42B1068D-FD98-313D-B414-7BA93173ED0E}"/>
+              </a:ext>
+            </a:extLst>
+          </p:cNvPr>
+          <p:cNvSpPr txBox="1">
+            <a:spLocks noChangeArrowheads="1"/>
+          </p:cNvSpPr>
+          <p:nvPr/>
+        </p:nvSpPr>
+        <p:spPr bwMode="auto">
+          <a:xfrm>
+            <a:off x="8765022" y="4309306"/>
+            <a:ext cx="1097447" cy="229796"/>
+          </a:xfrm>
+          <a:prstGeom prst="rect">
+            <a:avLst/>
+          </a:prstGeom>
+          <a:noFill/>
+          <a:ln>
+            <a:noFill/>
+          </a:ln>
+          <a:extLst>
+            <a:ext uri="{909E8E84-426E-40DD-AFC4-6F175D3DCCD1}">
+              <a14:hiddenFill xmlns:a14="http://schemas.microsoft.com/office/drawing/2010/main">
+                <a:solidFill>
+                  <a:srgbClr val="FFFFFF"/>
+                </a:solidFill>
+              </a14:hiddenFill>
+            </a:ext>
+            <a:ext uri="{91240B29-F687-4F45-9708-019B960494DF}">
+              <a14:hiddenLine xmlns:a14="http://schemas.microsoft.com/office/drawing/2010/main" w="9525">
+                <a:solidFill>
+                  <a:srgbClr val="000000"/>
+                </a:solidFill>
+                <a:miter lim="800000"/>
+                <a:headEnd/>
+                <a:tailEnd/>
+              </a14:hiddenLine>
+            </a:ext>
+          </a:extLst>
+        </p:spPr>
+        <p:txBody>
+          <a:bodyPr wrap="square">
+            <a:spAutoFit/>
+          </a:bodyPr>
+          <a:lstStyle>
+            <a:lvl1pPr>
+              <a:defRPr>
+                <a:solidFill>
+                  <a:schemeClr val="tx1"/>
+                </a:solidFill>
+                <a:latin typeface="Calibri" panose="020F0502020204030204" pitchFamily="34" charset="0"/>
+              </a:defRPr>
+            </a:lvl1pPr>
+            <a:lvl2pPr marL="742950" indent="-285750">
+              <a:defRPr>
+                <a:solidFill>
+                  <a:schemeClr val="tx1"/>
+                </a:solidFill>
+                <a:latin typeface="Calibri" panose="020F0502020204030204" pitchFamily="34" charset="0"/>
+              </a:defRPr>
+            </a:lvl2pPr>
+            <a:lvl3pPr marL="1143000" indent="-228600">
+              <a:defRPr>
+                <a:solidFill>
+                  <a:schemeClr val="tx1"/>
+                </a:solidFill>
+                <a:latin typeface="Calibri" panose="020F0502020204030204" pitchFamily="34" charset="0"/>
+              </a:defRPr>
+            </a:lvl3pPr>
+            <a:lvl4pPr marL="1600200" indent="-228600">
+              <a:defRPr>
+                <a:solidFill>
+                  <a:schemeClr val="tx1"/>
+                </a:solidFill>
+                <a:latin typeface="Calibri" panose="020F0502020204030204" pitchFamily="34" charset="0"/>
+              </a:defRPr>
+            </a:lvl4pPr>
+            <a:lvl5pPr marL="2057400" indent="-228600">
+              <a:defRPr>
+                <a:solidFill>
+                  <a:schemeClr val="tx1"/>
+                </a:solidFill>
+                <a:latin typeface="Calibri" panose="020F0502020204030204" pitchFamily="34" charset="0"/>
+              </a:defRPr>
+            </a:lvl5pPr>
+            <a:lvl6pPr marL="2514600" indent="-228600" eaLnBrk="0" fontAlgn="base" hangingPunct="0">
+              <a:spcBef>
+                <a:spcPct val="0"/>
+              </a:spcBef>
+              <a:spcAft>
+                <a:spcPct val="0"/>
+              </a:spcAft>
+              <a:defRPr>
+                <a:solidFill>
+                  <a:schemeClr val="tx1"/>
+                </a:solidFill>
+                <a:latin typeface="Calibri" panose="020F0502020204030204" pitchFamily="34" charset="0"/>
+              </a:defRPr>
+            </a:lvl6pPr>
+            <a:lvl7pPr marL="2971800" indent="-228600" eaLnBrk="0" fontAlgn="base" hangingPunct="0">
+              <a:spcBef>
+                <a:spcPct val="0"/>
+              </a:spcBef>
+              <a:spcAft>
+                <a:spcPct val="0"/>
+              </a:spcAft>
+              <a:defRPr>
+                <a:solidFill>
+                  <a:schemeClr val="tx1"/>
+                </a:solidFill>
+                <a:latin typeface="Calibri" panose="020F0502020204030204" pitchFamily="34" charset="0"/>
+              </a:defRPr>
+            </a:lvl7pPr>
+            <a:lvl8pPr marL="3429000" indent="-228600" eaLnBrk="0" fontAlgn="base" hangingPunct="0">
+              <a:spcBef>
+                <a:spcPct val="0"/>
+              </a:spcBef>
+              <a:spcAft>
+                <a:spcPct val="0"/>
+              </a:spcAft>
+              <a:defRPr>
+                <a:solidFill>
+                  <a:schemeClr val="tx1"/>
+                </a:solidFill>
+                <a:latin typeface="Calibri" panose="020F0502020204030204" pitchFamily="34" charset="0"/>
+              </a:defRPr>
+            </a:lvl8pPr>
+            <a:lvl9pPr marL="3886200" indent="-228600" eaLnBrk="0" fontAlgn="base" hangingPunct="0">
+              <a:spcBef>
+                <a:spcPct val="0"/>
+              </a:spcBef>
+              <a:spcAft>
+                <a:spcPct val="0"/>
+              </a:spcAft>
+              <a:defRPr>
+                <a:solidFill>
+                  <a:schemeClr val="tx1"/>
+                </a:solidFill>
+                <a:latin typeface="Calibri" panose="020F0502020204030204" pitchFamily="34" charset="0"/>
+              </a:defRPr>
+            </a:lvl9pPr>
+          </a:lstStyle>
+          <a:p>
+            <a:pPr algn="ctr" eaLnBrk="1" hangingPunct="1"/>
+            <a:r>
+              <a:rPr lang="en-US" altLang="en-US" sz="800" dirty="0">
+                <a:latin typeface="Amazon Ember" panose="020B0603020204020204" pitchFamily="34" charset="0"/>
+                <a:ea typeface="Amazon Ember" panose="020B0603020204020204" pitchFamily="34" charset="0"/>
+                <a:cs typeface="Amazon Ember" panose="020B0603020204020204" pitchFamily="34" charset="0"/>
+              </a:rPr>
+              <a:t>Amazon Athena</a:t>
+            </a:r>
+          </a:p>
+        </p:txBody>
+      </p:sp>
+      <p:sp>
+        <p:nvSpPr>
+          <p:cNvPr id="59" name="TextBox 58">
+            <a:extLst>
+              <a:ext uri="{FF2B5EF4-FFF2-40B4-BE49-F238E27FC236}">
+                <a16:creationId xmlns:a16="http://schemas.microsoft.com/office/drawing/2014/main" id="{282417E8-1FA8-A95E-1CB6-603C8BBC3BC1}"/>
+              </a:ext>
+            </a:extLst>
+          </p:cNvPr>
+          <p:cNvSpPr txBox="1"/>
+          <p:nvPr/>
+        </p:nvSpPr>
+        <p:spPr>
+          <a:xfrm>
+            <a:off x="9862801" y="3993317"/>
+            <a:ext cx="1289786" cy="430887"/>
+          </a:xfrm>
+          <a:prstGeom prst="rect">
+            <a:avLst/>
+          </a:prstGeom>
+          <a:noFill/>
+        </p:spPr>
+        <p:txBody>
+          <a:bodyPr wrap="square" rtlCol="0">
+            <a:spAutoFit/>
+          </a:bodyPr>
+          <a:lstStyle/>
+          <a:p>
+            <a:r>
+              <a:rPr lang="en-GB" sz="1050" dirty="0"/>
+              <a:t>For SQL data exploration</a:t>
+            </a:r>
+          </a:p>
+        </p:txBody>
+      </p:sp>
     </p:spTree>
     <p:extLst>
       <p:ext uri="{BB962C8B-B14F-4D97-AF65-F5344CB8AC3E}">
@@ -5660,6 +6948,86 @@
 </file>
 
 <file path=ppt/slides/slide2.xml><?xml version="1.0" encoding="utf-8"?>
+<p:sld xmlns:a="http://schemas.openxmlformats.org/drawingml/2006/main" xmlns:r="http://schemas.openxmlformats.org/officeDocument/2006/relationships" xmlns:p="http://schemas.openxmlformats.org/presentationml/2006/main">
+  <p:cSld>
+    <p:spTree>
+      <p:nvGrpSpPr>
+        <p:cNvPr id="1" name=""/>
+        <p:cNvGrpSpPr/>
+        <p:nvPr/>
+      </p:nvGrpSpPr>
+      <p:grpSpPr>
+        <a:xfrm>
+          <a:off x="0" y="0"/>
+          <a:ext cx="0" cy="0"/>
+          <a:chOff x="0" y="0"/>
+          <a:chExt cx="0" cy="0"/>
+        </a:xfrm>
+      </p:grpSpPr>
+      <p:sp>
+        <p:nvSpPr>
+          <p:cNvPr id="2" name="Title 1">
+            <a:extLst>
+              <a:ext uri="{FF2B5EF4-FFF2-40B4-BE49-F238E27FC236}">
+                <a16:creationId xmlns:a16="http://schemas.microsoft.com/office/drawing/2014/main" id="{38DFF2C3-50DD-C033-AB59-0DF78DAC25DE}"/>
+              </a:ext>
+            </a:extLst>
+          </p:cNvPr>
+          <p:cNvSpPr>
+            <a:spLocks noGrp="1"/>
+          </p:cNvSpPr>
+          <p:nvPr>
+            <p:ph type="title"/>
+          </p:nvPr>
+        </p:nvSpPr>
+        <p:spPr/>
+        <p:txBody>
+          <a:bodyPr/>
+          <a:lstStyle/>
+          <a:p>
+            <a:endParaRPr lang="en-GB"/>
+          </a:p>
+        </p:txBody>
+      </p:sp>
+      <p:sp>
+        <p:nvSpPr>
+          <p:cNvPr id="3" name="Content Placeholder 2">
+            <a:extLst>
+              <a:ext uri="{FF2B5EF4-FFF2-40B4-BE49-F238E27FC236}">
+                <a16:creationId xmlns:a16="http://schemas.microsoft.com/office/drawing/2014/main" id="{232CD70E-B29B-DA97-7A44-F75343EFF565}"/>
+              </a:ext>
+            </a:extLst>
+          </p:cNvPr>
+          <p:cNvSpPr>
+            <a:spLocks noGrp="1"/>
+          </p:cNvSpPr>
+          <p:nvPr>
+            <p:ph idx="1"/>
+          </p:nvPr>
+        </p:nvSpPr>
+        <p:spPr/>
+        <p:txBody>
+          <a:bodyPr/>
+          <a:lstStyle/>
+          <a:p>
+            <a:endParaRPr lang="en-GB"/>
+          </a:p>
+        </p:txBody>
+      </p:sp>
+    </p:spTree>
+    <p:extLst>
+      <p:ext uri="{BB962C8B-B14F-4D97-AF65-F5344CB8AC3E}">
+        <p14:creationId xmlns:p14="http://schemas.microsoft.com/office/powerpoint/2010/main" val="1387548981"/>
+      </p:ext>
+    </p:extLst>
+  </p:cSld>
+  <p:clrMapOvr>
+    <a:masterClrMapping/>
+  </p:clrMapOvr>
+</p:sld>
+</file>
+
+<file path=ppt/slides/slide3.xml><?xml version="1.0" encoding="utf-8"?>
 <p:sld xmlns:a="http://schemas.openxmlformats.org/drawingml/2006/main" xmlns:r="http://schemas.openxmlformats.org/officeDocument/2006/relationships" xmlns:p="http://schemas.openxmlformats.org/presentationml/2006/main">
   <p:cSld>
     <p:spTree>
@@ -15321,7 +16689,7 @@
 </p:sld>
 </file>
 
-<file path=ppt/slides/slide3.xml><?xml version="1.0" encoding="utf-8"?>
+<file path=ppt/slides/slide4.xml><?xml version="1.0" encoding="utf-8"?>
 <p:sld xmlns:a="http://schemas.openxmlformats.org/drawingml/2006/main" xmlns:r="http://schemas.openxmlformats.org/officeDocument/2006/relationships" xmlns:p="http://schemas.openxmlformats.org/presentationml/2006/main">
   <p:cSld>
     <p:spTree>

</xml_diff>

<commit_message>
Finished EMR notebook and cleaned up documents - ready for final write-up
</commit_message>
<xml_diff>
--- a/modern-data-analytics-on-aws.pptx
+++ b/modern-data-analytics-on-aws.pptx
@@ -5,13 +5,12 @@
     <p:sldMasterId id="2147483648" r:id="rId1"/>
   </p:sldMasterIdLst>
   <p:notesMasterIdLst>
-    <p:notesMasterId r:id="rId6"/>
+    <p:notesMasterId r:id="rId5"/>
   </p:notesMasterIdLst>
   <p:sldIdLst>
     <p:sldId id="276" r:id="rId2"/>
-    <p:sldId id="279" r:id="rId3"/>
-    <p:sldId id="278" r:id="rId4"/>
-    <p:sldId id="277" r:id="rId5"/>
+    <p:sldId id="278" r:id="rId3"/>
+    <p:sldId id="277" r:id="rId4"/>
   </p:sldIdLst>
   <p:sldSz cx="12192000" cy="6858000"/>
   <p:notesSz cx="6858000" cy="9144000"/>
@@ -628,7 +627,7 @@
           <a:p>
             <a:fld id="{C353B235-0EC1-A945-8A73-E24DD50E9288}" type="slidenum">
               <a:rPr lang="en-US" smtClean="0"/>
-              <a:t>3</a:t>
+              <a:t>2</a:t>
             </a:fld>
             <a:endParaRPr lang="en-US" dirty="0"/>
           </a:p>
@@ -4146,1311 +4145,12 @@
           </a:p>
         </p:txBody>
       </p:sp>
-      <p:grpSp>
-        <p:nvGrpSpPr>
-          <p:cNvPr id="2" name="Group 1">
+      <p:pic>
+        <p:nvPicPr>
+          <p:cNvPr id="15" name="Graphic 7">
             <a:extLst>
               <a:ext uri="{FF2B5EF4-FFF2-40B4-BE49-F238E27FC236}">
-                <a16:creationId xmlns:a16="http://schemas.microsoft.com/office/drawing/2014/main" id="{D1EE61CE-CEE3-DFD6-E702-E2F65B242AE3}"/>
-              </a:ext>
-            </a:extLst>
-          </p:cNvPr>
-          <p:cNvGrpSpPr/>
-          <p:nvPr/>
-        </p:nvGrpSpPr>
-        <p:grpSpPr>
-          <a:xfrm>
-            <a:off x="1520391" y="1334578"/>
-            <a:ext cx="8011306" cy="2521805"/>
-            <a:chOff x="114242" y="1047664"/>
-            <a:chExt cx="7577645" cy="2364303"/>
-          </a:xfrm>
-        </p:grpSpPr>
-        <p:sp>
-          <p:nvSpPr>
-            <p:cNvPr id="7" name="Rectangle 6">
-              <a:extLst>
-                <a:ext uri="{FF2B5EF4-FFF2-40B4-BE49-F238E27FC236}">
-                  <a16:creationId xmlns:a16="http://schemas.microsoft.com/office/drawing/2014/main" id="{4CC87B67-2A9E-7596-176A-7404DCA59507}"/>
-                </a:ext>
-              </a:extLst>
-            </p:cNvPr>
-            <p:cNvSpPr/>
-            <p:nvPr/>
-          </p:nvSpPr>
-          <p:spPr>
-            <a:xfrm>
-              <a:off x="5266245" y="1715944"/>
-              <a:ext cx="2088000" cy="535541"/>
-            </a:xfrm>
-            <a:prstGeom prst="rect">
-              <a:avLst/>
-            </a:prstGeom>
-            <a:solidFill>
-              <a:srgbClr val="5A6B86">
-                <a:alpha val="9804"/>
-              </a:srgbClr>
-            </a:solidFill>
-            <a:ln w="12700">
-              <a:noFill/>
-              <a:prstDash val="dash"/>
-            </a:ln>
-          </p:spPr>
-          <p:style>
-            <a:lnRef idx="2">
-              <a:schemeClr val="accent1">
-                <a:shade val="50000"/>
-              </a:schemeClr>
-            </a:lnRef>
-            <a:fillRef idx="1">
-              <a:schemeClr val="accent1"/>
-            </a:fillRef>
-            <a:effectRef idx="0">
-              <a:schemeClr val="accent1"/>
-            </a:effectRef>
-            <a:fontRef idx="minor">
-              <a:schemeClr val="lt1"/>
-            </a:fontRef>
-          </p:style>
-          <p:txBody>
-            <a:bodyPr tIns="45720"/>
-            <a:lstStyle/>
-            <a:p>
-              <a:pPr algn="ctr" eaLnBrk="1" fontAlgn="auto" hangingPunct="1">
-                <a:spcBef>
-                  <a:spcPts val="0"/>
-                </a:spcBef>
-                <a:spcAft>
-                  <a:spcPts val="0"/>
-                </a:spcAft>
-                <a:defRPr/>
-              </a:pPr>
-              <a:endParaRPr lang="en-US" sz="1000" dirty="0">
-                <a:solidFill>
-                  <a:schemeClr val="tx1"/>
-                </a:solidFill>
-                <a:latin typeface="Amazon Ember" panose="020B0603020204020204" pitchFamily="34" charset="0"/>
-                <a:ea typeface="Amazon Ember" panose="020B0603020204020204" pitchFamily="34" charset="0"/>
-                <a:cs typeface="Amazon Ember" panose="020B0603020204020204" pitchFamily="34" charset="0"/>
-              </a:endParaRPr>
-            </a:p>
-          </p:txBody>
-        </p:sp>
-        <p:sp>
-          <p:nvSpPr>
-            <p:cNvPr id="13" name="Rectangle 12">
-              <a:extLst>
-                <a:ext uri="{FF2B5EF4-FFF2-40B4-BE49-F238E27FC236}">
-                  <a16:creationId xmlns:a16="http://schemas.microsoft.com/office/drawing/2014/main" id="{A04280E4-1B7C-58FB-54D7-DED6762DBC62}"/>
-                </a:ext>
-              </a:extLst>
-            </p:cNvPr>
-            <p:cNvSpPr/>
-            <p:nvPr/>
-          </p:nvSpPr>
-          <p:spPr>
-            <a:xfrm>
-              <a:off x="1574420" y="1405779"/>
-              <a:ext cx="1650421" cy="1847775"/>
-            </a:xfrm>
-            <a:prstGeom prst="rect">
-              <a:avLst/>
-            </a:prstGeom>
-            <a:noFill/>
-            <a:ln w="12700">
-              <a:solidFill>
-                <a:schemeClr val="accent3">
-                  <a:lumMod val="75000"/>
-                </a:schemeClr>
-              </a:solidFill>
-              <a:prstDash val="dash"/>
-            </a:ln>
-          </p:spPr>
-          <p:style>
-            <a:lnRef idx="2">
-              <a:schemeClr val="accent1">
-                <a:shade val="50000"/>
-              </a:schemeClr>
-            </a:lnRef>
-            <a:fillRef idx="1">
-              <a:schemeClr val="accent1"/>
-            </a:fillRef>
-            <a:effectRef idx="0">
-              <a:schemeClr val="accent1"/>
-            </a:effectRef>
-            <a:fontRef idx="minor">
-              <a:schemeClr val="lt1"/>
-            </a:fontRef>
-          </p:style>
-          <p:txBody>
-            <a:bodyPr tIns="91440"/>
-            <a:lstStyle/>
-            <a:p>
-              <a:pPr algn="ctr">
-                <a:defRPr/>
-              </a:pPr>
-              <a:r>
-                <a:rPr lang="en-US" sz="900" dirty="0">
-                  <a:solidFill>
-                    <a:schemeClr val="tx1"/>
-                  </a:solidFill>
-                  <a:latin typeface="Amazon Ember" panose="020B0603020204020204" pitchFamily="34" charset="0"/>
-                  <a:ea typeface="Amazon Ember" panose="020B0603020204020204" pitchFamily="34" charset="0"/>
-                  <a:cs typeface="Amazon Ember" panose="020B0603020204020204" pitchFamily="34" charset="0"/>
-                </a:rPr>
-                <a:t>scalable </a:t>
-              </a:r>
-            </a:p>
-            <a:p>
-              <a:pPr algn="ctr">
-                <a:defRPr/>
-              </a:pPr>
-              <a:r>
-                <a:rPr lang="en-US" sz="900" dirty="0">
-                  <a:solidFill>
-                    <a:schemeClr val="tx1"/>
-                  </a:solidFill>
-                  <a:latin typeface="Amazon Ember" panose="020B0603020204020204" pitchFamily="34" charset="0"/>
-                  <a:ea typeface="Amazon Ember" panose="020B0603020204020204" pitchFamily="34" charset="0"/>
-                  <a:cs typeface="Amazon Ember" panose="020B0603020204020204" pitchFamily="34" charset="0"/>
-                </a:rPr>
-                <a:t>data lake</a:t>
-              </a:r>
-            </a:p>
-          </p:txBody>
-        </p:sp>
-        <p:sp>
-          <p:nvSpPr>
-            <p:cNvPr id="14" name="Rectangle 13">
-              <a:extLst>
-                <a:ext uri="{FF2B5EF4-FFF2-40B4-BE49-F238E27FC236}">
-                  <a16:creationId xmlns:a16="http://schemas.microsoft.com/office/drawing/2014/main" id="{37B57971-04E0-4589-AAFC-18A1E49CAA0E}"/>
-                </a:ext>
-              </a:extLst>
-            </p:cNvPr>
-            <p:cNvSpPr/>
-            <p:nvPr/>
-          </p:nvSpPr>
-          <p:spPr>
-            <a:xfrm>
-              <a:off x="1430993" y="1047664"/>
-              <a:ext cx="6260894" cy="2364303"/>
-            </a:xfrm>
-            <a:prstGeom prst="rect">
-              <a:avLst/>
-            </a:prstGeom>
-            <a:noFill/>
-            <a:ln w="12700">
-              <a:solidFill>
-                <a:srgbClr val="141B23"/>
-              </a:solidFill>
-            </a:ln>
-          </p:spPr>
-          <p:style>
-            <a:lnRef idx="2">
-              <a:schemeClr val="accent1">
-                <a:shade val="50000"/>
-              </a:schemeClr>
-            </a:lnRef>
-            <a:fillRef idx="1">
-              <a:schemeClr val="accent1"/>
-            </a:fillRef>
-            <a:effectRef idx="0">
-              <a:schemeClr val="accent1"/>
-            </a:effectRef>
-            <a:fontRef idx="minor">
-              <a:schemeClr val="lt1"/>
-            </a:fontRef>
-          </p:style>
-          <p:txBody>
-            <a:bodyPr rot="0" spcFirstLastPara="0" vertOverflow="overflow" horzOverflow="overflow" vert="horz" wrap="square" lIns="457200" tIns="91440" rIns="91440" bIns="45720" numCol="1" spcCol="0" rtlCol="0" fromWordArt="0" anchor="t" anchorCtr="0" forceAA="0" compatLnSpc="1">
-              <a:prstTxWarp prst="textNoShape">
-                <a:avLst/>
-              </a:prstTxWarp>
-              <a:noAutofit/>
-            </a:bodyPr>
-            <a:lstStyle/>
-            <a:p>
-              <a:pPr algn="l"/>
-              <a:r>
-                <a:rPr lang="en-US" sz="900" dirty="0">
-                  <a:solidFill>
-                    <a:schemeClr val="tx1"/>
-                  </a:solidFill>
-                  <a:latin typeface="Amazon Ember" panose="020B0603020204020204" pitchFamily="34" charset="0"/>
-                  <a:ea typeface="Amazon Ember" panose="020B0603020204020204" pitchFamily="34" charset="0"/>
-                  <a:cs typeface="Amazon Ember" panose="020B0603020204020204" pitchFamily="34" charset="0"/>
-                </a:rPr>
-                <a:t>AWS Cloud</a:t>
-              </a:r>
-            </a:p>
-          </p:txBody>
-        </p:sp>
-        <p:sp>
-          <p:nvSpPr>
-            <p:cNvPr id="33" name="Rectangle 32">
-              <a:extLst>
-                <a:ext uri="{FF2B5EF4-FFF2-40B4-BE49-F238E27FC236}">
-                  <a16:creationId xmlns:a16="http://schemas.microsoft.com/office/drawing/2014/main" id="{327F8349-42CA-3946-16D2-0C29B797B554}"/>
-                </a:ext>
-              </a:extLst>
-            </p:cNvPr>
-            <p:cNvSpPr/>
-            <p:nvPr/>
-          </p:nvSpPr>
-          <p:spPr>
-            <a:xfrm>
-              <a:off x="114242" y="1405780"/>
-              <a:ext cx="1144796" cy="1100809"/>
-            </a:xfrm>
-            <a:prstGeom prst="rect">
-              <a:avLst/>
-            </a:prstGeom>
-            <a:noFill/>
-            <a:ln w="12700">
-              <a:solidFill>
-                <a:srgbClr val="8FA7C4"/>
-              </a:solidFill>
-              <a:prstDash val="dash"/>
-            </a:ln>
-          </p:spPr>
-          <p:style>
-            <a:lnRef idx="2">
-              <a:schemeClr val="accent1">
-                <a:shade val="50000"/>
-              </a:schemeClr>
-            </a:lnRef>
-            <a:fillRef idx="1">
-              <a:schemeClr val="accent1"/>
-            </a:fillRef>
-            <a:effectRef idx="0">
-              <a:schemeClr val="accent1"/>
-            </a:effectRef>
-            <a:fontRef idx="minor">
-              <a:schemeClr val="lt1"/>
-            </a:fontRef>
-          </p:style>
-          <p:txBody>
-            <a:bodyPr tIns="91440"/>
-            <a:lstStyle/>
-            <a:p>
-              <a:pPr algn="ctr" eaLnBrk="1" fontAlgn="auto" hangingPunct="1">
-                <a:spcBef>
-                  <a:spcPts val="0"/>
-                </a:spcBef>
-                <a:spcAft>
-                  <a:spcPts val="0"/>
-                </a:spcAft>
-                <a:defRPr/>
-              </a:pPr>
-              <a:r>
-                <a:rPr lang="en-US" sz="900" dirty="0">
-                  <a:solidFill>
-                    <a:schemeClr val="tx1"/>
-                  </a:solidFill>
-                  <a:latin typeface="Amazon Ember" panose="020B0603020204020204" pitchFamily="34" charset="0"/>
-                  <a:ea typeface="Amazon Ember" panose="020B0603020204020204" pitchFamily="34" charset="0"/>
-                  <a:cs typeface="Amazon Ember" panose="020B0603020204020204" pitchFamily="34" charset="0"/>
-                </a:rPr>
-                <a:t>data sources</a:t>
-              </a:r>
-            </a:p>
-          </p:txBody>
-        </p:sp>
-        <p:sp>
-          <p:nvSpPr>
-            <p:cNvPr id="43" name="TextBox 9">
-              <a:extLst>
-                <a:ext uri="{FF2B5EF4-FFF2-40B4-BE49-F238E27FC236}">
-                  <a16:creationId xmlns:a16="http://schemas.microsoft.com/office/drawing/2014/main" id="{A4ABF5A5-07FD-B70E-628F-E29BDAAC2BAA}"/>
-                </a:ext>
-              </a:extLst>
-            </p:cNvPr>
-            <p:cNvSpPr txBox="1">
-              <a:spLocks noChangeArrowheads="1"/>
-            </p:cNvSpPr>
-            <p:nvPr/>
-          </p:nvSpPr>
-          <p:spPr bwMode="auto">
-            <a:xfrm>
-              <a:off x="1759601" y="2149769"/>
-              <a:ext cx="1275784" cy="317409"/>
-            </a:xfrm>
-            <a:prstGeom prst="rect">
-              <a:avLst/>
-            </a:prstGeom>
-            <a:noFill/>
-            <a:ln>
-              <a:noFill/>
-            </a:ln>
-            <a:extLst>
-              <a:ext uri="{909E8E84-426E-40DD-AFC4-6F175D3DCCD1}">
-                <a14:hiddenFill xmlns:a14="http://schemas.microsoft.com/office/drawing/2010/main">
-                  <a:solidFill>
-                    <a:srgbClr val="FFFFFF"/>
-                  </a:solidFill>
-                </a14:hiddenFill>
-              </a:ext>
-              <a:ext uri="{91240B29-F687-4F45-9708-019B960494DF}">
-                <a14:hiddenLine xmlns:a14="http://schemas.microsoft.com/office/drawing/2010/main" w="9525">
-                  <a:solidFill>
-                    <a:srgbClr val="000000"/>
-                  </a:solidFill>
-                  <a:miter lim="800000"/>
-                  <a:headEnd/>
-                  <a:tailEnd/>
-                </a14:hiddenLine>
-              </a:ext>
-            </a:extLst>
-          </p:spPr>
-          <p:txBody>
-            <a:bodyPr wrap="square">
-              <a:spAutoFit/>
-            </a:bodyPr>
-            <a:lstStyle>
-              <a:lvl1pPr>
-                <a:defRPr>
-                  <a:solidFill>
-                    <a:schemeClr val="tx1"/>
-                  </a:solidFill>
-                  <a:latin typeface="Calibri" panose="020F0502020204030204" pitchFamily="34" charset="0"/>
-                </a:defRPr>
-              </a:lvl1pPr>
-              <a:lvl2pPr marL="742950" indent="-285750">
-                <a:defRPr>
-                  <a:solidFill>
-                    <a:schemeClr val="tx1"/>
-                  </a:solidFill>
-                  <a:latin typeface="Calibri" panose="020F0502020204030204" pitchFamily="34" charset="0"/>
-                </a:defRPr>
-              </a:lvl2pPr>
-              <a:lvl3pPr marL="1143000" indent="-228600">
-                <a:defRPr>
-                  <a:solidFill>
-                    <a:schemeClr val="tx1"/>
-                  </a:solidFill>
-                  <a:latin typeface="Calibri" panose="020F0502020204030204" pitchFamily="34" charset="0"/>
-                </a:defRPr>
-              </a:lvl3pPr>
-              <a:lvl4pPr marL="1600200" indent="-228600">
-                <a:defRPr>
-                  <a:solidFill>
-                    <a:schemeClr val="tx1"/>
-                  </a:solidFill>
-                  <a:latin typeface="Calibri" panose="020F0502020204030204" pitchFamily="34" charset="0"/>
-                </a:defRPr>
-              </a:lvl4pPr>
-              <a:lvl5pPr marL="2057400" indent="-228600">
-                <a:defRPr>
-                  <a:solidFill>
-                    <a:schemeClr val="tx1"/>
-                  </a:solidFill>
-                  <a:latin typeface="Calibri" panose="020F0502020204030204" pitchFamily="34" charset="0"/>
-                </a:defRPr>
-              </a:lvl5pPr>
-              <a:lvl6pPr marL="2514600" indent="-228600" eaLnBrk="0" fontAlgn="base" hangingPunct="0">
-                <a:spcBef>
-                  <a:spcPct val="0"/>
-                </a:spcBef>
-                <a:spcAft>
-                  <a:spcPct val="0"/>
-                </a:spcAft>
-                <a:defRPr>
-                  <a:solidFill>
-                    <a:schemeClr val="tx1"/>
-                  </a:solidFill>
-                  <a:latin typeface="Calibri" panose="020F0502020204030204" pitchFamily="34" charset="0"/>
-                </a:defRPr>
-              </a:lvl6pPr>
-              <a:lvl7pPr marL="2971800" indent="-228600" eaLnBrk="0" fontAlgn="base" hangingPunct="0">
-                <a:spcBef>
-                  <a:spcPct val="0"/>
-                </a:spcBef>
-                <a:spcAft>
-                  <a:spcPct val="0"/>
-                </a:spcAft>
-                <a:defRPr>
-                  <a:solidFill>
-                    <a:schemeClr val="tx1"/>
-                  </a:solidFill>
-                  <a:latin typeface="Calibri" panose="020F0502020204030204" pitchFamily="34" charset="0"/>
-                </a:defRPr>
-              </a:lvl7pPr>
-              <a:lvl8pPr marL="3429000" indent="-228600" eaLnBrk="0" fontAlgn="base" hangingPunct="0">
-                <a:spcBef>
-                  <a:spcPct val="0"/>
-                </a:spcBef>
-                <a:spcAft>
-                  <a:spcPct val="0"/>
-                </a:spcAft>
-                <a:defRPr>
-                  <a:solidFill>
-                    <a:schemeClr val="tx1"/>
-                  </a:solidFill>
-                  <a:latin typeface="Calibri" panose="020F0502020204030204" pitchFamily="34" charset="0"/>
-                </a:defRPr>
-              </a:lvl8pPr>
-              <a:lvl9pPr marL="3886200" indent="-228600" eaLnBrk="0" fontAlgn="base" hangingPunct="0">
-                <a:spcBef>
-                  <a:spcPct val="0"/>
-                </a:spcBef>
-                <a:spcAft>
-                  <a:spcPct val="0"/>
-                </a:spcAft>
-                <a:defRPr>
-                  <a:solidFill>
-                    <a:schemeClr val="tx1"/>
-                  </a:solidFill>
-                  <a:latin typeface="Calibri" panose="020F0502020204030204" pitchFamily="34" charset="0"/>
-                </a:defRPr>
-              </a:lvl9pPr>
-            </a:lstStyle>
-            <a:p>
-              <a:pPr algn="ctr" eaLnBrk="1" hangingPunct="1"/>
-              <a:r>
-                <a:rPr lang="en-US" altLang="en-US" sz="800" dirty="0">
-                  <a:latin typeface="Amazon Ember" panose="020B0603020204020204" pitchFamily="34" charset="0"/>
-                  <a:ea typeface="Amazon Ember" panose="020B0603020204020204" pitchFamily="34" charset="0"/>
-                  <a:cs typeface="Amazon Ember" panose="020B0603020204020204" pitchFamily="34" charset="0"/>
-                </a:rPr>
-                <a:t>Amazon Simple Storage Service (Amazon S3)</a:t>
-              </a:r>
-            </a:p>
-          </p:txBody>
-        </p:sp>
-        <p:sp>
-          <p:nvSpPr>
-            <p:cNvPr id="49" name="Rectangle 48">
-              <a:extLst>
-                <a:ext uri="{FF2B5EF4-FFF2-40B4-BE49-F238E27FC236}">
-                  <a16:creationId xmlns:a16="http://schemas.microsoft.com/office/drawing/2014/main" id="{83715A85-D193-DFF0-4F16-1C08AB61D9EA}"/>
-                </a:ext>
-              </a:extLst>
-            </p:cNvPr>
-            <p:cNvSpPr/>
-            <p:nvPr/>
-          </p:nvSpPr>
-          <p:spPr>
-            <a:xfrm>
-              <a:off x="5122764" y="1405778"/>
-              <a:ext cx="2449795" cy="1847775"/>
-            </a:xfrm>
-            <a:prstGeom prst="rect">
-              <a:avLst/>
-            </a:prstGeom>
-            <a:noFill/>
-            <a:ln w="12700">
-              <a:solidFill>
-                <a:schemeClr val="accent3">
-                  <a:lumMod val="75000"/>
-                </a:schemeClr>
-              </a:solidFill>
-              <a:prstDash val="dash"/>
-            </a:ln>
-          </p:spPr>
-          <p:style>
-            <a:lnRef idx="2">
-              <a:schemeClr val="accent1">
-                <a:shade val="50000"/>
-              </a:schemeClr>
-            </a:lnRef>
-            <a:fillRef idx="1">
-              <a:schemeClr val="accent1"/>
-            </a:fillRef>
-            <a:effectRef idx="0">
-              <a:schemeClr val="accent1"/>
-            </a:effectRef>
-            <a:fontRef idx="minor">
-              <a:schemeClr val="lt1"/>
-            </a:fontRef>
-          </p:style>
-          <p:txBody>
-            <a:bodyPr tIns="91440"/>
-            <a:lstStyle/>
-            <a:p>
-              <a:pPr eaLnBrk="1" fontAlgn="auto" hangingPunct="1">
-                <a:spcBef>
-                  <a:spcPts val="0"/>
-                </a:spcBef>
-                <a:spcAft>
-                  <a:spcPts val="0"/>
-                </a:spcAft>
-                <a:defRPr/>
-              </a:pPr>
-              <a:r>
-                <a:rPr lang="en-US" sz="900" dirty="0">
-                  <a:solidFill>
-                    <a:schemeClr val="tx1"/>
-                  </a:solidFill>
-                  <a:latin typeface="Amazon Ember" panose="020B0603020204020204" pitchFamily="34" charset="0"/>
-                  <a:ea typeface="Amazon Ember" panose="020B0603020204020204" pitchFamily="34" charset="0"/>
-                  <a:cs typeface="Amazon Ember" panose="020B0603020204020204" pitchFamily="34" charset="0"/>
-                </a:rPr>
-                <a:t>     purpose-built analytics and </a:t>
-              </a:r>
-              <a:r>
-                <a:rPr lang="en-US" sz="900" dirty="0" err="1">
-                  <a:solidFill>
-                    <a:schemeClr val="tx1"/>
-                  </a:solidFill>
-                  <a:latin typeface="Amazon Ember" panose="020B0603020204020204" pitchFamily="34" charset="0"/>
-                  <a:ea typeface="Amazon Ember" panose="020B0603020204020204" pitchFamily="34" charset="0"/>
-                  <a:cs typeface="Amazon Ember" panose="020B0603020204020204" pitchFamily="34" charset="0"/>
-                </a:rPr>
-                <a:t>visualisation</a:t>
-              </a:r>
-              <a:endParaRPr lang="en-US" sz="900" dirty="0">
-                <a:solidFill>
-                  <a:schemeClr val="tx1"/>
-                </a:solidFill>
-                <a:latin typeface="Amazon Ember" panose="020B0603020204020204" pitchFamily="34" charset="0"/>
-                <a:ea typeface="Amazon Ember" panose="020B0603020204020204" pitchFamily="34" charset="0"/>
-                <a:cs typeface="Amazon Ember" panose="020B0603020204020204" pitchFamily="34" charset="0"/>
-              </a:endParaRPr>
-            </a:p>
-          </p:txBody>
-        </p:sp>
-        <p:cxnSp>
-          <p:nvCxnSpPr>
-            <p:cNvPr id="52" name="Straight Arrow Connector 51">
-              <a:extLst>
-                <a:ext uri="{FF2B5EF4-FFF2-40B4-BE49-F238E27FC236}">
-                  <a16:creationId xmlns:a16="http://schemas.microsoft.com/office/drawing/2014/main" id="{C7AD2974-66CC-6B4C-35C0-B9330367E896}"/>
-                </a:ext>
-              </a:extLst>
-            </p:cNvPr>
-            <p:cNvCxnSpPr>
-              <a:cxnSpLocks/>
-              <a:stCxn id="63" idx="3"/>
-              <a:endCxn id="49" idx="1"/>
-            </p:cNvCxnSpPr>
-            <p:nvPr/>
-          </p:nvCxnSpPr>
-          <p:spPr>
-            <a:xfrm flipV="1">
-              <a:off x="4653351" y="2329665"/>
-              <a:ext cx="469413" cy="1"/>
-            </a:xfrm>
-            <a:prstGeom prst="straightConnector1">
-              <a:avLst/>
-            </a:prstGeom>
-            <a:ln w="12700" cap="flat" cmpd="sng" algn="ctr">
-              <a:solidFill>
-                <a:schemeClr val="dk1"/>
-              </a:solidFill>
-              <a:prstDash val="solid"/>
-              <a:round/>
-              <a:headEnd type="arrow" w="med" len="med"/>
-              <a:tailEnd type="arrow" w="med" len="med"/>
-            </a:ln>
-          </p:spPr>
-          <p:style>
-            <a:lnRef idx="0">
-              <a:scrgbClr r="0" g="0" b="0"/>
-            </a:lnRef>
-            <a:fillRef idx="0">
-              <a:scrgbClr r="0" g="0" b="0"/>
-            </a:fillRef>
-            <a:effectRef idx="0">
-              <a:scrgbClr r="0" g="0" b="0"/>
-            </a:effectRef>
-            <a:fontRef idx="minor">
-              <a:schemeClr val="tx1"/>
-            </a:fontRef>
-          </p:style>
-        </p:cxnSp>
-        <p:cxnSp>
-          <p:nvCxnSpPr>
-            <p:cNvPr id="60" name="Straight Arrow Connector 59">
-              <a:extLst>
-                <a:ext uri="{FF2B5EF4-FFF2-40B4-BE49-F238E27FC236}">
-                  <a16:creationId xmlns:a16="http://schemas.microsoft.com/office/drawing/2014/main" id="{D2482826-1086-33CB-8C2A-019A61D1D4BB}"/>
-                </a:ext>
-              </a:extLst>
-            </p:cNvPr>
-            <p:cNvCxnSpPr>
-              <a:cxnSpLocks/>
-              <a:stCxn id="89" idx="3"/>
-              <a:endCxn id="109" idx="1"/>
-            </p:cNvCxnSpPr>
-            <p:nvPr/>
-          </p:nvCxnSpPr>
-          <p:spPr>
-            <a:xfrm>
-              <a:off x="807773" y="2007040"/>
-              <a:ext cx="1452560" cy="3873"/>
-            </a:xfrm>
-            <a:prstGeom prst="straightConnector1">
-              <a:avLst/>
-            </a:prstGeom>
-            <a:ln w="12700" cap="flat" cmpd="sng" algn="ctr">
-              <a:solidFill>
-                <a:schemeClr val="dk1"/>
-              </a:solidFill>
-              <a:prstDash val="solid"/>
-              <a:round/>
-              <a:headEnd type="none" w="med" len="med"/>
-              <a:tailEnd type="arrow" w="med" len="med"/>
-            </a:ln>
-          </p:spPr>
-          <p:style>
-            <a:lnRef idx="0">
-              <a:scrgbClr r="0" g="0" b="0"/>
-            </a:lnRef>
-            <a:fillRef idx="0">
-              <a:scrgbClr r="0" g="0" b="0"/>
-            </a:fillRef>
-            <a:effectRef idx="0">
-              <a:scrgbClr r="0" g="0" b="0"/>
-            </a:effectRef>
-            <a:fontRef idx="minor">
-              <a:schemeClr val="tx1"/>
-            </a:fontRef>
-          </p:style>
-        </p:cxnSp>
-        <p:pic>
-          <p:nvPicPr>
-            <p:cNvPr id="61" name="Graphic 6">
-              <a:extLst>
-                <a:ext uri="{FF2B5EF4-FFF2-40B4-BE49-F238E27FC236}">
-                  <a16:creationId xmlns:a16="http://schemas.microsoft.com/office/drawing/2014/main" id="{FA1705E6-6CB0-C057-9709-08D4E7AF513B}"/>
-                </a:ext>
-              </a:extLst>
-            </p:cNvPr>
-            <p:cNvPicPr>
-              <a:picLocks noChangeAspect="1" noChangeArrowheads="1"/>
-            </p:cNvPicPr>
-            <p:nvPr/>
-          </p:nvPicPr>
-          <p:blipFill>
-            <a:blip r:embed="rId6" cstate="print">
-              <a:extLst>
-                <a:ext uri="{28A0092B-C50C-407E-A947-70E740481C1C}">
-                  <a14:useLocalDpi xmlns:a14="http://schemas.microsoft.com/office/drawing/2010/main" val="0"/>
-                </a:ext>
-              </a:extLst>
-            </a:blip>
-            <a:srcRect/>
-            <a:stretch>
-              <a:fillRect/>
-            </a:stretch>
-          </p:blipFill>
-          <p:spPr bwMode="auto">
-            <a:xfrm>
-              <a:off x="4030223" y="1876925"/>
-              <a:ext cx="274320" cy="274320"/>
-            </a:xfrm>
-            <a:prstGeom prst="rect">
-              <a:avLst/>
-            </a:prstGeom>
-            <a:noFill/>
-            <a:ln>
-              <a:noFill/>
-            </a:ln>
-            <a:extLst>
-              <a:ext uri="{909E8E84-426E-40DD-AFC4-6F175D3DCCD1}">
-                <a14:hiddenFill xmlns:a14="http://schemas.microsoft.com/office/drawing/2010/main">
-                  <a:solidFill>
-                    <a:srgbClr val="FFFFFF"/>
-                  </a:solidFill>
-                </a14:hiddenFill>
-              </a:ext>
-              <a:ext uri="{91240B29-F687-4F45-9708-019B960494DF}">
-                <a14:hiddenLine xmlns:a14="http://schemas.microsoft.com/office/drawing/2010/main" w="9525">
-                  <a:solidFill>
-                    <a:srgbClr val="000000"/>
-                  </a:solidFill>
-                  <a:miter lim="800000"/>
-                  <a:headEnd/>
-                  <a:tailEnd/>
-                </a14:hiddenLine>
-              </a:ext>
-            </a:extLst>
-          </p:spPr>
-        </p:pic>
-        <p:sp>
-          <p:nvSpPr>
-            <p:cNvPr id="62" name="TextBox 10">
-              <a:extLst>
-                <a:ext uri="{FF2B5EF4-FFF2-40B4-BE49-F238E27FC236}">
-                  <a16:creationId xmlns:a16="http://schemas.microsoft.com/office/drawing/2014/main" id="{C5D98B8D-10A1-7DCA-38BB-B22989A9FCA8}"/>
-                </a:ext>
-              </a:extLst>
-            </p:cNvPr>
-            <p:cNvSpPr txBox="1">
-              <a:spLocks noChangeArrowheads="1"/>
-            </p:cNvSpPr>
-            <p:nvPr/>
-          </p:nvSpPr>
-          <p:spPr bwMode="auto">
-            <a:xfrm>
-              <a:off x="3736177" y="2185639"/>
-              <a:ext cx="872838" cy="215444"/>
-            </a:xfrm>
-            <a:prstGeom prst="rect">
-              <a:avLst/>
-            </a:prstGeom>
-            <a:noFill/>
-            <a:ln>
-              <a:noFill/>
-            </a:ln>
-            <a:extLst>
-              <a:ext uri="{909E8E84-426E-40DD-AFC4-6F175D3DCCD1}">
-                <a14:hiddenFill xmlns:a14="http://schemas.microsoft.com/office/drawing/2010/main">
-                  <a:solidFill>
-                    <a:srgbClr val="FFFFFF"/>
-                  </a:solidFill>
-                </a14:hiddenFill>
-              </a:ext>
-              <a:ext uri="{91240B29-F687-4F45-9708-019B960494DF}">
-                <a14:hiddenLine xmlns:a14="http://schemas.microsoft.com/office/drawing/2010/main" w="9525">
-                  <a:solidFill>
-                    <a:srgbClr val="000000"/>
-                  </a:solidFill>
-                  <a:miter lim="800000"/>
-                  <a:headEnd/>
-                  <a:tailEnd/>
-                </a14:hiddenLine>
-              </a:ext>
-            </a:extLst>
-          </p:spPr>
-          <p:txBody>
-            <a:bodyPr wrap="square">
-              <a:spAutoFit/>
-            </a:bodyPr>
-            <a:lstStyle>
-              <a:lvl1pPr>
-                <a:defRPr>
-                  <a:solidFill>
-                    <a:schemeClr val="tx1"/>
-                  </a:solidFill>
-                  <a:latin typeface="Calibri" panose="020F0502020204030204" pitchFamily="34" charset="0"/>
-                </a:defRPr>
-              </a:lvl1pPr>
-              <a:lvl2pPr marL="742950" indent="-285750">
-                <a:defRPr>
-                  <a:solidFill>
-                    <a:schemeClr val="tx1"/>
-                  </a:solidFill>
-                  <a:latin typeface="Calibri" panose="020F0502020204030204" pitchFamily="34" charset="0"/>
-                </a:defRPr>
-              </a:lvl2pPr>
-              <a:lvl3pPr marL="1143000" indent="-228600">
-                <a:defRPr>
-                  <a:solidFill>
-                    <a:schemeClr val="tx1"/>
-                  </a:solidFill>
-                  <a:latin typeface="Calibri" panose="020F0502020204030204" pitchFamily="34" charset="0"/>
-                </a:defRPr>
-              </a:lvl3pPr>
-              <a:lvl4pPr marL="1600200" indent="-228600">
-                <a:defRPr>
-                  <a:solidFill>
-                    <a:schemeClr val="tx1"/>
-                  </a:solidFill>
-                  <a:latin typeface="Calibri" panose="020F0502020204030204" pitchFamily="34" charset="0"/>
-                </a:defRPr>
-              </a:lvl4pPr>
-              <a:lvl5pPr marL="2057400" indent="-228600">
-                <a:defRPr>
-                  <a:solidFill>
-                    <a:schemeClr val="tx1"/>
-                  </a:solidFill>
-                  <a:latin typeface="Calibri" panose="020F0502020204030204" pitchFamily="34" charset="0"/>
-                </a:defRPr>
-              </a:lvl5pPr>
-              <a:lvl6pPr marL="2514600" indent="-228600" eaLnBrk="0" fontAlgn="base" hangingPunct="0">
-                <a:spcBef>
-                  <a:spcPct val="0"/>
-                </a:spcBef>
-                <a:spcAft>
-                  <a:spcPct val="0"/>
-                </a:spcAft>
-                <a:defRPr>
-                  <a:solidFill>
-                    <a:schemeClr val="tx1"/>
-                  </a:solidFill>
-                  <a:latin typeface="Calibri" panose="020F0502020204030204" pitchFamily="34" charset="0"/>
-                </a:defRPr>
-              </a:lvl6pPr>
-              <a:lvl7pPr marL="2971800" indent="-228600" eaLnBrk="0" fontAlgn="base" hangingPunct="0">
-                <a:spcBef>
-                  <a:spcPct val="0"/>
-                </a:spcBef>
-                <a:spcAft>
-                  <a:spcPct val="0"/>
-                </a:spcAft>
-                <a:defRPr>
-                  <a:solidFill>
-                    <a:schemeClr val="tx1"/>
-                  </a:solidFill>
-                  <a:latin typeface="Calibri" panose="020F0502020204030204" pitchFamily="34" charset="0"/>
-                </a:defRPr>
-              </a:lvl7pPr>
-              <a:lvl8pPr marL="3429000" indent="-228600" eaLnBrk="0" fontAlgn="base" hangingPunct="0">
-                <a:spcBef>
-                  <a:spcPct val="0"/>
-                </a:spcBef>
-                <a:spcAft>
-                  <a:spcPct val="0"/>
-                </a:spcAft>
-                <a:defRPr>
-                  <a:solidFill>
-                    <a:schemeClr val="tx1"/>
-                  </a:solidFill>
-                  <a:latin typeface="Calibri" panose="020F0502020204030204" pitchFamily="34" charset="0"/>
-                </a:defRPr>
-              </a:lvl8pPr>
-              <a:lvl9pPr marL="3886200" indent="-228600" eaLnBrk="0" fontAlgn="base" hangingPunct="0">
-                <a:spcBef>
-                  <a:spcPct val="0"/>
-                </a:spcBef>
-                <a:spcAft>
-                  <a:spcPct val="0"/>
-                </a:spcAft>
-                <a:defRPr>
-                  <a:solidFill>
-                    <a:schemeClr val="tx1"/>
-                  </a:solidFill>
-                  <a:latin typeface="Calibri" panose="020F0502020204030204" pitchFamily="34" charset="0"/>
-                </a:defRPr>
-              </a:lvl9pPr>
-            </a:lstStyle>
-            <a:p>
-              <a:pPr algn="ctr" eaLnBrk="1" hangingPunct="1"/>
-              <a:r>
-                <a:rPr lang="en-US" altLang="en-US" sz="800" dirty="0">
-                  <a:latin typeface="Amazon Ember" panose="020B0603020204020204" pitchFamily="34" charset="0"/>
-                  <a:ea typeface="Amazon Ember" panose="020B0603020204020204" pitchFamily="34" charset="0"/>
-                  <a:cs typeface="Amazon Ember" panose="020B0603020204020204" pitchFamily="34" charset="0"/>
-                </a:rPr>
-                <a:t>AWS Glue</a:t>
-              </a:r>
-            </a:p>
-          </p:txBody>
-        </p:sp>
-        <p:sp>
-          <p:nvSpPr>
-            <p:cNvPr id="63" name="Rectangle 62">
-              <a:extLst>
-                <a:ext uri="{FF2B5EF4-FFF2-40B4-BE49-F238E27FC236}">
-                  <a16:creationId xmlns:a16="http://schemas.microsoft.com/office/drawing/2014/main" id="{FBA1EA38-0E44-CCFD-3F57-100384F93C01}"/>
-                </a:ext>
-              </a:extLst>
-            </p:cNvPr>
-            <p:cNvSpPr/>
-            <p:nvPr/>
-          </p:nvSpPr>
-          <p:spPr>
-            <a:xfrm>
-              <a:off x="3688616" y="1405779"/>
-              <a:ext cx="964735" cy="1847775"/>
-            </a:xfrm>
-            <a:prstGeom prst="rect">
-              <a:avLst/>
-            </a:prstGeom>
-            <a:noFill/>
-            <a:ln w="12700">
-              <a:solidFill>
-                <a:schemeClr val="accent3">
-                  <a:lumMod val="75000"/>
-                </a:schemeClr>
-              </a:solidFill>
-              <a:prstDash val="dash"/>
-            </a:ln>
-          </p:spPr>
-          <p:style>
-            <a:lnRef idx="2">
-              <a:schemeClr val="accent1">
-                <a:shade val="50000"/>
-              </a:schemeClr>
-            </a:lnRef>
-            <a:fillRef idx="1">
-              <a:schemeClr val="accent1"/>
-            </a:fillRef>
-            <a:effectRef idx="0">
-              <a:schemeClr val="accent1"/>
-            </a:effectRef>
-            <a:fontRef idx="minor">
-              <a:schemeClr val="lt1"/>
-            </a:fontRef>
-          </p:style>
-          <p:txBody>
-            <a:bodyPr tIns="91440"/>
-            <a:lstStyle/>
-            <a:p>
-              <a:pPr algn="ctr" eaLnBrk="1" fontAlgn="auto" hangingPunct="1">
-                <a:spcBef>
-                  <a:spcPts val="0"/>
-                </a:spcBef>
-                <a:spcAft>
-                  <a:spcPts val="0"/>
-                </a:spcAft>
-                <a:defRPr/>
-              </a:pPr>
-              <a:r>
-                <a:rPr lang="en-US" sz="900" dirty="0">
-                  <a:solidFill>
-                    <a:schemeClr val="tx1"/>
-                  </a:solidFill>
-                  <a:latin typeface="Amazon Ember" panose="020B0603020204020204" pitchFamily="34" charset="0"/>
-                  <a:ea typeface="Amazon Ember" panose="020B0603020204020204" pitchFamily="34" charset="0"/>
-                  <a:cs typeface="Amazon Ember" panose="020B0603020204020204" pitchFamily="34" charset="0"/>
-                </a:rPr>
-                <a:t>seamless data movement</a:t>
-              </a:r>
-            </a:p>
-          </p:txBody>
-        </p:sp>
-        <p:cxnSp>
-          <p:nvCxnSpPr>
-            <p:cNvPr id="88" name="Straight Arrow Connector 87">
-              <a:extLst>
-                <a:ext uri="{FF2B5EF4-FFF2-40B4-BE49-F238E27FC236}">
-                  <a16:creationId xmlns:a16="http://schemas.microsoft.com/office/drawing/2014/main" id="{9DBE6A20-92E5-5285-C66F-B0ED51ADA7E0}"/>
-                </a:ext>
-              </a:extLst>
-            </p:cNvPr>
-            <p:cNvCxnSpPr>
-              <a:cxnSpLocks/>
-              <a:stCxn id="13" idx="3"/>
-              <a:endCxn id="63" idx="1"/>
-            </p:cNvCxnSpPr>
-            <p:nvPr/>
-          </p:nvCxnSpPr>
-          <p:spPr>
-            <a:xfrm>
-              <a:off x="3224842" y="2329666"/>
-              <a:ext cx="463775" cy="0"/>
-            </a:xfrm>
-            <a:prstGeom prst="straightConnector1">
-              <a:avLst/>
-            </a:prstGeom>
-            <a:ln w="12700" cap="flat" cmpd="sng" algn="ctr">
-              <a:solidFill>
-                <a:schemeClr val="dk1"/>
-              </a:solidFill>
-              <a:prstDash val="solid"/>
-              <a:round/>
-              <a:headEnd type="arrow" w="med" len="med"/>
-              <a:tailEnd type="arrow" w="med" len="med"/>
-            </a:ln>
-          </p:spPr>
-          <p:style>
-            <a:lnRef idx="0">
-              <a:scrgbClr r="0" g="0" b="0"/>
-            </a:lnRef>
-            <a:fillRef idx="0">
-              <a:scrgbClr r="0" g="0" b="0"/>
-            </a:fillRef>
-            <a:effectRef idx="0">
-              <a:scrgbClr r="0" g="0" b="0"/>
-            </a:effectRef>
-            <a:fontRef idx="minor">
-              <a:schemeClr val="tx1"/>
-            </a:fontRef>
-          </p:style>
-        </p:cxnSp>
-        <p:pic>
-          <p:nvPicPr>
-            <p:cNvPr id="89" name="Graphic 88" descr="Document">
-              <a:extLst>
-                <a:ext uri="{FF2B5EF4-FFF2-40B4-BE49-F238E27FC236}">
-                  <a16:creationId xmlns:a16="http://schemas.microsoft.com/office/drawing/2014/main" id="{B2B4B710-8B4C-A073-9822-A887B633A992}"/>
-                </a:ext>
-              </a:extLst>
-            </p:cNvPr>
-            <p:cNvPicPr>
-              <a:picLocks noChangeAspect="1"/>
-            </p:cNvPicPr>
-            <p:nvPr/>
-          </p:nvPicPr>
-          <p:blipFill>
-            <a:blip r:embed="rId7">
-              <a:extLst>
-                <a:ext uri="{28A0092B-C50C-407E-A947-70E740481C1C}">
-                  <a14:useLocalDpi xmlns:a14="http://schemas.microsoft.com/office/drawing/2010/main" val="0"/>
-                </a:ext>
-                <a:ext uri="{96DAC541-7B7A-43D3-8B79-37D633B846F1}">
-                  <asvg:svgBlip xmlns:asvg="http://schemas.microsoft.com/office/drawing/2016/SVG/main" r:embed="rId8"/>
-                </a:ext>
-              </a:extLst>
-            </a:blip>
-            <a:stretch>
-              <a:fillRect/>
-            </a:stretch>
-          </p:blipFill>
-          <p:spPr>
-            <a:xfrm>
-              <a:off x="533453" y="1869881"/>
-              <a:ext cx="274320" cy="274320"/>
-            </a:xfrm>
-            <a:prstGeom prst="rect">
-              <a:avLst/>
-            </a:prstGeom>
-          </p:spPr>
-        </p:pic>
-        <p:sp>
-          <p:nvSpPr>
-            <p:cNvPr id="90" name="TextBox 30">
-              <a:extLst>
-                <a:ext uri="{FF2B5EF4-FFF2-40B4-BE49-F238E27FC236}">
-                  <a16:creationId xmlns:a16="http://schemas.microsoft.com/office/drawing/2014/main" id="{D03C1D07-EF7D-8B98-DBF7-9757331F7AC9}"/>
-                </a:ext>
-              </a:extLst>
-            </p:cNvPr>
-            <p:cNvSpPr txBox="1">
-              <a:spLocks noChangeArrowheads="1"/>
-            </p:cNvSpPr>
-            <p:nvPr/>
-          </p:nvSpPr>
-          <p:spPr bwMode="auto">
-            <a:xfrm>
-              <a:off x="260736" y="2130318"/>
-              <a:ext cx="819755" cy="216415"/>
-            </a:xfrm>
-            <a:prstGeom prst="rect">
-              <a:avLst/>
-            </a:prstGeom>
-            <a:noFill/>
-            <a:ln>
-              <a:noFill/>
-            </a:ln>
-            <a:extLst>
-              <a:ext uri="{909E8E84-426E-40DD-AFC4-6F175D3DCCD1}">
-                <a14:hiddenFill xmlns:a14="http://schemas.microsoft.com/office/drawing/2010/main">
-                  <a:solidFill>
-                    <a:srgbClr val="FFFFFF"/>
-                  </a:solidFill>
-                </a14:hiddenFill>
-              </a:ext>
-              <a:ext uri="{91240B29-F687-4F45-9708-019B960494DF}">
-                <a14:hiddenLine xmlns:a14="http://schemas.microsoft.com/office/drawing/2010/main" w="9525">
-                  <a:solidFill>
-                    <a:srgbClr val="000000"/>
-                  </a:solidFill>
-                  <a:miter lim="800000"/>
-                  <a:headEnd/>
-                  <a:tailEnd/>
-                </a14:hiddenLine>
-              </a:ext>
-            </a:extLst>
-          </p:spPr>
-          <p:txBody>
-            <a:bodyPr wrap="square">
-              <a:spAutoFit/>
-            </a:bodyPr>
-            <a:lstStyle>
-              <a:lvl1pPr>
-                <a:defRPr>
-                  <a:solidFill>
-                    <a:schemeClr val="tx1"/>
-                  </a:solidFill>
-                  <a:latin typeface="Calibri" panose="020F0502020204030204" pitchFamily="34" charset="0"/>
-                </a:defRPr>
-              </a:lvl1pPr>
-              <a:lvl2pPr marL="742950" indent="-285750">
-                <a:defRPr>
-                  <a:solidFill>
-                    <a:schemeClr val="tx1"/>
-                  </a:solidFill>
-                  <a:latin typeface="Calibri" panose="020F0502020204030204" pitchFamily="34" charset="0"/>
-                </a:defRPr>
-              </a:lvl2pPr>
-              <a:lvl3pPr marL="1143000" indent="-228600">
-                <a:defRPr>
-                  <a:solidFill>
-                    <a:schemeClr val="tx1"/>
-                  </a:solidFill>
-                  <a:latin typeface="Calibri" panose="020F0502020204030204" pitchFamily="34" charset="0"/>
-                </a:defRPr>
-              </a:lvl3pPr>
-              <a:lvl4pPr marL="1600200" indent="-228600">
-                <a:defRPr>
-                  <a:solidFill>
-                    <a:schemeClr val="tx1"/>
-                  </a:solidFill>
-                  <a:latin typeface="Calibri" panose="020F0502020204030204" pitchFamily="34" charset="0"/>
-                </a:defRPr>
-              </a:lvl4pPr>
-              <a:lvl5pPr marL="2057400" indent="-228600">
-                <a:defRPr>
-                  <a:solidFill>
-                    <a:schemeClr val="tx1"/>
-                  </a:solidFill>
-                  <a:latin typeface="Calibri" panose="020F0502020204030204" pitchFamily="34" charset="0"/>
-                </a:defRPr>
-              </a:lvl5pPr>
-              <a:lvl6pPr marL="2514600" indent="-228600" eaLnBrk="0" fontAlgn="base" hangingPunct="0">
-                <a:spcBef>
-                  <a:spcPct val="0"/>
-                </a:spcBef>
-                <a:spcAft>
-                  <a:spcPct val="0"/>
-                </a:spcAft>
-                <a:defRPr>
-                  <a:solidFill>
-                    <a:schemeClr val="tx1"/>
-                  </a:solidFill>
-                  <a:latin typeface="Calibri" panose="020F0502020204030204" pitchFamily="34" charset="0"/>
-                </a:defRPr>
-              </a:lvl6pPr>
-              <a:lvl7pPr marL="2971800" indent="-228600" eaLnBrk="0" fontAlgn="base" hangingPunct="0">
-                <a:spcBef>
-                  <a:spcPct val="0"/>
-                </a:spcBef>
-                <a:spcAft>
-                  <a:spcPct val="0"/>
-                </a:spcAft>
-                <a:defRPr>
-                  <a:solidFill>
-                    <a:schemeClr val="tx1"/>
-                  </a:solidFill>
-                  <a:latin typeface="Calibri" panose="020F0502020204030204" pitchFamily="34" charset="0"/>
-                </a:defRPr>
-              </a:lvl7pPr>
-              <a:lvl8pPr marL="3429000" indent="-228600" eaLnBrk="0" fontAlgn="base" hangingPunct="0">
-                <a:spcBef>
-                  <a:spcPct val="0"/>
-                </a:spcBef>
-                <a:spcAft>
-                  <a:spcPct val="0"/>
-                </a:spcAft>
-                <a:defRPr>
-                  <a:solidFill>
-                    <a:schemeClr val="tx1"/>
-                  </a:solidFill>
-                  <a:latin typeface="Calibri" panose="020F0502020204030204" pitchFamily="34" charset="0"/>
-                </a:defRPr>
-              </a:lvl8pPr>
-              <a:lvl9pPr marL="3886200" indent="-228600" eaLnBrk="0" fontAlgn="base" hangingPunct="0">
-                <a:spcBef>
-                  <a:spcPct val="0"/>
-                </a:spcBef>
-                <a:spcAft>
-                  <a:spcPct val="0"/>
-                </a:spcAft>
-                <a:defRPr>
-                  <a:solidFill>
-                    <a:schemeClr val="tx1"/>
-                  </a:solidFill>
-                  <a:latin typeface="Calibri" panose="020F0502020204030204" pitchFamily="34" charset="0"/>
-                </a:defRPr>
-              </a:lvl9pPr>
-            </a:lstStyle>
-            <a:p>
-              <a:pPr algn="ctr" eaLnBrk="1" hangingPunct="1"/>
-              <a:r>
-                <a:rPr lang="en-US" altLang="en-US" sz="900" dirty="0">
-                  <a:latin typeface="Amazon Ember" panose="020B0603020204020204" pitchFamily="34" charset="0"/>
-                  <a:ea typeface="Amazon Ember" panose="020B0603020204020204" pitchFamily="34" charset="0"/>
-                  <a:cs typeface="Amazon Ember" panose="020B0603020204020204" pitchFamily="34" charset="0"/>
-                </a:rPr>
-                <a:t>CSV files</a:t>
-              </a:r>
-            </a:p>
-          </p:txBody>
-        </p:sp>
-        <p:pic>
-          <p:nvPicPr>
-            <p:cNvPr id="99" name="Graphic 98">
-              <a:extLst>
-                <a:ext uri="{FF2B5EF4-FFF2-40B4-BE49-F238E27FC236}">
-                  <a16:creationId xmlns:a16="http://schemas.microsoft.com/office/drawing/2014/main" id="{4B6FC9D8-8ACE-99EE-1DE9-D50CC492C4F6}"/>
-                </a:ext>
-              </a:extLst>
-            </p:cNvPr>
-            <p:cNvPicPr>
-              <a:picLocks noChangeAspect="1"/>
-            </p:cNvPicPr>
-            <p:nvPr/>
-          </p:nvPicPr>
-          <p:blipFill>
-            <a:blip r:embed="rId9">
-              <a:extLst>
-                <a:ext uri="{96DAC541-7B7A-43D3-8B79-37D633B846F1}">
-                  <asvg:svgBlip xmlns:asvg="http://schemas.microsoft.com/office/drawing/2016/SVG/main" r:embed="rId10"/>
-                </a:ext>
-              </a:extLst>
-            </a:blip>
-            <a:srcRect/>
-            <a:stretch/>
-          </p:blipFill>
-          <p:spPr>
-            <a:xfrm>
-              <a:off x="1434622" y="1050206"/>
-              <a:ext cx="274320" cy="274320"/>
-            </a:xfrm>
-            <a:prstGeom prst="rect">
-              <a:avLst/>
-            </a:prstGeom>
-          </p:spPr>
-        </p:pic>
-        <p:pic>
-          <p:nvPicPr>
-            <p:cNvPr id="109" name="Graphic 8">
-              <a:extLst>
-                <a:ext uri="{FF2B5EF4-FFF2-40B4-BE49-F238E27FC236}">
-                  <a16:creationId xmlns:a16="http://schemas.microsoft.com/office/drawing/2014/main" id="{E1FF7F80-6CF8-716F-47AE-40755B1B79A1}"/>
-                </a:ext>
-              </a:extLst>
-            </p:cNvPr>
-            <p:cNvPicPr>
-              <a:picLocks noChangeAspect="1" noChangeArrowheads="1"/>
-            </p:cNvPicPr>
-            <p:nvPr/>
-          </p:nvPicPr>
-          <p:blipFill>
-            <a:blip r:embed="rId11">
-              <a:extLst>
-                <a:ext uri="{96DAC541-7B7A-43D3-8B79-37D633B846F1}">
-                  <asvg:svgBlip xmlns:asvg="http://schemas.microsoft.com/office/drawing/2016/SVG/main" r:embed="rId12"/>
-                </a:ext>
-              </a:extLst>
-            </a:blip>
-            <a:srcRect/>
-            <a:stretch/>
-          </p:blipFill>
-          <p:spPr bwMode="auto">
-            <a:xfrm>
-              <a:off x="2260333" y="1873754"/>
-              <a:ext cx="274320" cy="274320"/>
-            </a:xfrm>
-            <a:prstGeom prst="rect">
-              <a:avLst/>
-            </a:prstGeom>
-            <a:noFill/>
-            <a:ln>
-              <a:noFill/>
-            </a:ln>
-            <a:extLst>
-              <a:ext uri="{909E8E84-426E-40DD-AFC4-6F175D3DCCD1}">
-                <a14:hiddenFill xmlns:a14="http://schemas.microsoft.com/office/drawing/2010/main">
-                  <a:solidFill>
-                    <a:srgbClr val="FFFFFF"/>
-                  </a:solidFill>
-                </a14:hiddenFill>
-              </a:ext>
-              <a:ext uri="{91240B29-F687-4F45-9708-019B960494DF}">
-                <a14:hiddenLine xmlns:a14="http://schemas.microsoft.com/office/drawing/2010/main" w="9525">
-                  <a:solidFill>
-                    <a:srgbClr val="000000"/>
-                  </a:solidFill>
-                  <a:miter lim="800000"/>
-                  <a:headEnd/>
-                  <a:tailEnd/>
-                </a14:hiddenLine>
-              </a:ext>
-            </a:extLst>
-          </p:spPr>
-        </p:pic>
-      </p:grpSp>
-      <p:pic>
-        <p:nvPicPr>
-          <p:cNvPr id="6" name="Graphic 9">
-            <a:extLst>
-              <a:ext uri="{FF2B5EF4-FFF2-40B4-BE49-F238E27FC236}">
-                <a16:creationId xmlns:a16="http://schemas.microsoft.com/office/drawing/2014/main" id="{755D08C3-A029-31BE-7FD6-5164C7594F58}"/>
+                <a16:creationId xmlns:a16="http://schemas.microsoft.com/office/drawing/2014/main" id="{650B67E2-6F85-B1AD-7898-BF2564EFF900}"/>
               </a:ext>
             </a:extLst>
           </p:cNvPr>
@@ -5460,7 +4160,7 @@
           <p:nvPr/>
         </p:nvPicPr>
         <p:blipFill>
-          <a:blip r:embed="rId13">
+          <a:blip r:embed="rId6" cstate="print">
             <a:extLst>
               <a:ext uri="{28A0092B-C50C-407E-A947-70E740481C1C}">
                 <a14:useLocalDpi xmlns:a14="http://schemas.microsoft.com/office/drawing/2010/main" val="0"/>
@@ -5474,239 +4174,7 @@
         </p:blipFill>
         <p:spPr bwMode="auto">
           <a:xfrm>
-            <a:off x="4187452" y="2965272"/>
-            <a:ext cx="290019" cy="292594"/>
-          </a:xfrm>
-          <a:prstGeom prst="rect">
-            <a:avLst/>
-          </a:prstGeom>
-          <a:noFill/>
-          <a:ln>
-            <a:noFill/>
-          </a:ln>
-          <a:extLst>
-            <a:ext uri="{909E8E84-426E-40DD-AFC4-6F175D3DCCD1}">
-              <a14:hiddenFill xmlns:a14="http://schemas.microsoft.com/office/drawing/2010/main">
-                <a:solidFill>
-                  <a:srgbClr val="FFFFFF"/>
-                </a:solidFill>
-              </a14:hiddenFill>
-            </a:ext>
-            <a:ext uri="{91240B29-F687-4F45-9708-019B960494DF}">
-              <a14:hiddenLine xmlns:a14="http://schemas.microsoft.com/office/drawing/2010/main" w="9525">
-                <a:solidFill>
-                  <a:srgbClr val="000000"/>
-                </a:solidFill>
-                <a:miter lim="800000"/>
-                <a:headEnd/>
-                <a:tailEnd/>
-              </a14:hiddenLine>
-            </a:ext>
-          </a:extLst>
-        </p:spPr>
-      </p:pic>
-      <p:sp>
-        <p:nvSpPr>
-          <p:cNvPr id="8" name="TextBox 17">
-            <a:extLst>
-              <a:ext uri="{FF2B5EF4-FFF2-40B4-BE49-F238E27FC236}">
-                <a16:creationId xmlns:a16="http://schemas.microsoft.com/office/drawing/2014/main" id="{1AED17E9-9DC5-0D3A-50F5-A7F587E951F3}"/>
-              </a:ext>
-            </a:extLst>
-          </p:cNvPr>
-          <p:cNvSpPr txBox="1">
-            <a:spLocks noChangeArrowheads="1"/>
-          </p:cNvSpPr>
-          <p:nvPr/>
-        </p:nvSpPr>
-        <p:spPr bwMode="auto">
-          <a:xfrm>
-            <a:off x="3949865" y="3268321"/>
-            <a:ext cx="765192" cy="338554"/>
-          </a:xfrm>
-          <a:prstGeom prst="rect">
-            <a:avLst/>
-          </a:prstGeom>
-          <a:noFill/>
-          <a:ln>
-            <a:noFill/>
-          </a:ln>
-          <a:extLst>
-            <a:ext uri="{909E8E84-426E-40DD-AFC4-6F175D3DCCD1}">
-              <a14:hiddenFill xmlns:a14="http://schemas.microsoft.com/office/drawing/2010/main">
-                <a:solidFill>
-                  <a:srgbClr val="FFFFFF"/>
-                </a:solidFill>
-              </a14:hiddenFill>
-            </a:ext>
-            <a:ext uri="{91240B29-F687-4F45-9708-019B960494DF}">
-              <a14:hiddenLine xmlns:a14="http://schemas.microsoft.com/office/drawing/2010/main" w="9525">
-                <a:solidFill>
-                  <a:srgbClr val="000000"/>
-                </a:solidFill>
-                <a:miter lim="800000"/>
-                <a:headEnd/>
-                <a:tailEnd/>
-              </a14:hiddenLine>
-            </a:ext>
-          </a:extLst>
-        </p:spPr>
-        <p:txBody>
-          <a:bodyPr wrap="square">
-            <a:spAutoFit/>
-          </a:bodyPr>
-          <a:lstStyle>
-            <a:lvl1pPr>
-              <a:defRPr>
-                <a:solidFill>
-                  <a:schemeClr val="tx1"/>
-                </a:solidFill>
-                <a:latin typeface="Calibri" panose="020F0502020204030204" pitchFamily="34" charset="0"/>
-              </a:defRPr>
-            </a:lvl1pPr>
-            <a:lvl2pPr marL="742950" indent="-285750">
-              <a:defRPr>
-                <a:solidFill>
-                  <a:schemeClr val="tx1"/>
-                </a:solidFill>
-                <a:latin typeface="Calibri" panose="020F0502020204030204" pitchFamily="34" charset="0"/>
-              </a:defRPr>
-            </a:lvl2pPr>
-            <a:lvl3pPr marL="1143000" indent="-228600">
-              <a:defRPr>
-                <a:solidFill>
-                  <a:schemeClr val="tx1"/>
-                </a:solidFill>
-                <a:latin typeface="Calibri" panose="020F0502020204030204" pitchFamily="34" charset="0"/>
-              </a:defRPr>
-            </a:lvl3pPr>
-            <a:lvl4pPr marL="1600200" indent="-228600">
-              <a:defRPr>
-                <a:solidFill>
-                  <a:schemeClr val="tx1"/>
-                </a:solidFill>
-                <a:latin typeface="Calibri" panose="020F0502020204030204" pitchFamily="34" charset="0"/>
-              </a:defRPr>
-            </a:lvl4pPr>
-            <a:lvl5pPr marL="2057400" indent="-228600">
-              <a:defRPr>
-                <a:solidFill>
-                  <a:schemeClr val="tx1"/>
-                </a:solidFill>
-                <a:latin typeface="Calibri" panose="020F0502020204030204" pitchFamily="34" charset="0"/>
-              </a:defRPr>
-            </a:lvl5pPr>
-            <a:lvl6pPr marL="2514600" indent="-228600" eaLnBrk="0" fontAlgn="base" hangingPunct="0">
-              <a:spcBef>
-                <a:spcPct val="0"/>
-              </a:spcBef>
-              <a:spcAft>
-                <a:spcPct val="0"/>
-              </a:spcAft>
-              <a:defRPr>
-                <a:solidFill>
-                  <a:schemeClr val="tx1"/>
-                </a:solidFill>
-                <a:latin typeface="Calibri" panose="020F0502020204030204" pitchFamily="34" charset="0"/>
-              </a:defRPr>
-            </a:lvl6pPr>
-            <a:lvl7pPr marL="2971800" indent="-228600" eaLnBrk="0" fontAlgn="base" hangingPunct="0">
-              <a:spcBef>
-                <a:spcPct val="0"/>
-              </a:spcBef>
-              <a:spcAft>
-                <a:spcPct val="0"/>
-              </a:spcAft>
-              <a:defRPr>
-                <a:solidFill>
-                  <a:schemeClr val="tx1"/>
-                </a:solidFill>
-                <a:latin typeface="Calibri" panose="020F0502020204030204" pitchFamily="34" charset="0"/>
-              </a:defRPr>
-            </a:lvl7pPr>
-            <a:lvl8pPr marL="3429000" indent="-228600" eaLnBrk="0" fontAlgn="base" hangingPunct="0">
-              <a:spcBef>
-                <a:spcPct val="0"/>
-              </a:spcBef>
-              <a:spcAft>
-                <a:spcPct val="0"/>
-              </a:spcAft>
-              <a:defRPr>
-                <a:solidFill>
-                  <a:schemeClr val="tx1"/>
-                </a:solidFill>
-                <a:latin typeface="Calibri" panose="020F0502020204030204" pitchFamily="34" charset="0"/>
-              </a:defRPr>
-            </a:lvl8pPr>
-            <a:lvl9pPr marL="3886200" indent="-228600" eaLnBrk="0" fontAlgn="base" hangingPunct="0">
-              <a:spcBef>
-                <a:spcPct val="0"/>
-              </a:spcBef>
-              <a:spcAft>
-                <a:spcPct val="0"/>
-              </a:spcAft>
-              <a:defRPr>
-                <a:solidFill>
-                  <a:schemeClr val="tx1"/>
-                </a:solidFill>
-                <a:latin typeface="Calibri" panose="020F0502020204030204" pitchFamily="34" charset="0"/>
-              </a:defRPr>
-            </a:lvl9pPr>
-          </a:lstStyle>
-          <a:p>
-            <a:pPr algn="ctr" eaLnBrk="1" hangingPunct="1"/>
-            <a:r>
-              <a:rPr lang="en-US" altLang="en-US" sz="800" dirty="0">
-                <a:latin typeface="Amazon Ember" panose="020B0603020204020204" pitchFamily="34" charset="0"/>
-                <a:ea typeface="Amazon Ember" panose="020B0603020204020204" pitchFamily="34" charset="0"/>
-                <a:cs typeface="Amazon Ember" panose="020B0603020204020204" pitchFamily="34" charset="0"/>
-              </a:rPr>
-              <a:t>AWS Glue</a:t>
-            </a:r>
-          </a:p>
-          <a:p>
-            <a:pPr algn="ctr" eaLnBrk="1" hangingPunct="1"/>
-            <a:r>
-              <a:rPr lang="en-US" altLang="en-US" sz="800" dirty="0">
-                <a:latin typeface="Amazon Ember" panose="020B0603020204020204" pitchFamily="34" charset="0"/>
-                <a:ea typeface="Amazon Ember" panose="020B0603020204020204" pitchFamily="34" charset="0"/>
-                <a:cs typeface="Amazon Ember" panose="020B0603020204020204" pitchFamily="34" charset="0"/>
-              </a:rPr>
-              <a:t>Data Catalog</a:t>
-            </a:r>
-          </a:p>
-        </p:txBody>
-      </p:sp>
-      <p:pic>
-        <p:nvPicPr>
-          <p:cNvPr id="15" name="Graphic 7">
-            <a:extLst>
-              <a:ext uri="{FF2B5EF4-FFF2-40B4-BE49-F238E27FC236}">
-                <a16:creationId xmlns:a16="http://schemas.microsoft.com/office/drawing/2014/main" id="{650B67E2-6F85-B1AD-7898-BF2564EFF900}"/>
-              </a:ext>
-            </a:extLst>
-          </p:cNvPr>
-          <p:cNvPicPr>
-            <a:picLocks noChangeAspect="1" noChangeArrowheads="1"/>
-          </p:cNvPicPr>
-          <p:nvPr/>
-        </p:nvPicPr>
-        <p:blipFill>
-          <a:blip r:embed="rId14" cstate="print">
-            <a:extLst>
-              <a:ext uri="{28A0092B-C50C-407E-A947-70E740481C1C}">
-                <a14:useLocalDpi xmlns:a14="http://schemas.microsoft.com/office/drawing/2010/main" val="0"/>
-              </a:ext>
-            </a:extLst>
-          </a:blip>
-          <a:srcRect/>
-          <a:stretch>
-            <a:fillRect/>
-          </a:stretch>
-        </p:blipFill>
-        <p:spPr bwMode="auto">
-          <a:xfrm>
-            <a:off x="7873377" y="2119650"/>
+            <a:off x="8993064" y="5250939"/>
             <a:ext cx="290019" cy="292594"/>
           </a:xfrm>
           <a:prstGeom prst="rect">
@@ -5753,7 +4221,7 @@
         </p:nvSpPr>
         <p:spPr bwMode="auto">
           <a:xfrm>
-            <a:off x="7457554" y="2392133"/>
+            <a:off x="8577241" y="5523422"/>
             <a:ext cx="1194981" cy="229796"/>
           </a:xfrm>
           <a:prstGeom prst="rect">
@@ -5900,277 +4368,10 @@
       </p:sp>
       <p:pic>
         <p:nvPicPr>
-          <p:cNvPr id="17" name="Graphic 16" descr="Crawler resource icon for the AWS Glue service.">
+          <p:cNvPr id="57" name="Graphic 14">
             <a:extLst>
               <a:ext uri="{FF2B5EF4-FFF2-40B4-BE49-F238E27FC236}">
-                <a16:creationId xmlns:a16="http://schemas.microsoft.com/office/drawing/2014/main" id="{D9D7BDF0-825F-36E4-DA09-B493708AB1B4}"/>
-              </a:ext>
-            </a:extLst>
-          </p:cNvPr>
-          <p:cNvPicPr>
-            <a:picLocks noChangeAspect="1"/>
-          </p:cNvPicPr>
-          <p:nvPr/>
-        </p:nvPicPr>
-        <p:blipFill>
-          <a:blip r:embed="rId15">
-            <a:extLst>
-              <a:ext uri="{96DAC541-7B7A-43D3-8B79-37D633B846F1}">
-                <asvg:svgBlip xmlns:asvg="http://schemas.microsoft.com/office/drawing/2016/SVG/main" r:embed="rId16"/>
-              </a:ext>
-            </a:extLst>
-          </a:blip>
-          <a:stretch>
-            <a:fillRect/>
-          </a:stretch>
-        </p:blipFill>
-        <p:spPr>
-          <a:xfrm>
-            <a:off x="3389740" y="2956408"/>
-            <a:ext cx="303049" cy="303049"/>
-          </a:xfrm>
-          <a:prstGeom prst="rect">
-            <a:avLst/>
-          </a:prstGeom>
-        </p:spPr>
-      </p:pic>
-      <p:sp>
-        <p:nvSpPr>
-          <p:cNvPr id="23" name="TextBox 17">
-            <a:extLst>
-              <a:ext uri="{FF2B5EF4-FFF2-40B4-BE49-F238E27FC236}">
-                <a16:creationId xmlns:a16="http://schemas.microsoft.com/office/drawing/2014/main" id="{6E383336-8FD8-4BE7-06CB-59C79F503947}"/>
-              </a:ext>
-            </a:extLst>
-          </p:cNvPr>
-          <p:cNvSpPr txBox="1">
-            <a:spLocks noChangeArrowheads="1"/>
-          </p:cNvSpPr>
-          <p:nvPr/>
-        </p:nvSpPr>
-        <p:spPr bwMode="auto">
-          <a:xfrm>
-            <a:off x="3158668" y="3268321"/>
-            <a:ext cx="765192" cy="215444"/>
-          </a:xfrm>
-          <a:prstGeom prst="rect">
-            <a:avLst/>
-          </a:prstGeom>
-          <a:noFill/>
-          <a:ln>
-            <a:noFill/>
-          </a:ln>
-          <a:extLst>
-            <a:ext uri="{909E8E84-426E-40DD-AFC4-6F175D3DCCD1}">
-              <a14:hiddenFill xmlns:a14="http://schemas.microsoft.com/office/drawing/2010/main">
-                <a:solidFill>
-                  <a:srgbClr val="FFFFFF"/>
-                </a:solidFill>
-              </a14:hiddenFill>
-            </a:ext>
-            <a:ext uri="{91240B29-F687-4F45-9708-019B960494DF}">
-              <a14:hiddenLine xmlns:a14="http://schemas.microsoft.com/office/drawing/2010/main" w="9525">
-                <a:solidFill>
-                  <a:srgbClr val="000000"/>
-                </a:solidFill>
-                <a:miter lim="800000"/>
-                <a:headEnd/>
-                <a:tailEnd/>
-              </a14:hiddenLine>
-            </a:ext>
-          </a:extLst>
-        </p:spPr>
-        <p:txBody>
-          <a:bodyPr wrap="square">
-            <a:spAutoFit/>
-          </a:bodyPr>
-          <a:lstStyle>
-            <a:lvl1pPr>
-              <a:defRPr>
-                <a:solidFill>
-                  <a:schemeClr val="tx1"/>
-                </a:solidFill>
-                <a:latin typeface="Calibri" panose="020F0502020204030204" pitchFamily="34" charset="0"/>
-              </a:defRPr>
-            </a:lvl1pPr>
-            <a:lvl2pPr marL="742950" indent="-285750">
-              <a:defRPr>
-                <a:solidFill>
-                  <a:schemeClr val="tx1"/>
-                </a:solidFill>
-                <a:latin typeface="Calibri" panose="020F0502020204030204" pitchFamily="34" charset="0"/>
-              </a:defRPr>
-            </a:lvl2pPr>
-            <a:lvl3pPr marL="1143000" indent="-228600">
-              <a:defRPr>
-                <a:solidFill>
-                  <a:schemeClr val="tx1"/>
-                </a:solidFill>
-                <a:latin typeface="Calibri" panose="020F0502020204030204" pitchFamily="34" charset="0"/>
-              </a:defRPr>
-            </a:lvl3pPr>
-            <a:lvl4pPr marL="1600200" indent="-228600">
-              <a:defRPr>
-                <a:solidFill>
-                  <a:schemeClr val="tx1"/>
-                </a:solidFill>
-                <a:latin typeface="Calibri" panose="020F0502020204030204" pitchFamily="34" charset="0"/>
-              </a:defRPr>
-            </a:lvl4pPr>
-            <a:lvl5pPr marL="2057400" indent="-228600">
-              <a:defRPr>
-                <a:solidFill>
-                  <a:schemeClr val="tx1"/>
-                </a:solidFill>
-                <a:latin typeface="Calibri" panose="020F0502020204030204" pitchFamily="34" charset="0"/>
-              </a:defRPr>
-            </a:lvl5pPr>
-            <a:lvl6pPr marL="2514600" indent="-228600" eaLnBrk="0" fontAlgn="base" hangingPunct="0">
-              <a:spcBef>
-                <a:spcPct val="0"/>
-              </a:spcBef>
-              <a:spcAft>
-                <a:spcPct val="0"/>
-              </a:spcAft>
-              <a:defRPr>
-                <a:solidFill>
-                  <a:schemeClr val="tx1"/>
-                </a:solidFill>
-                <a:latin typeface="Calibri" panose="020F0502020204030204" pitchFamily="34" charset="0"/>
-              </a:defRPr>
-            </a:lvl6pPr>
-            <a:lvl7pPr marL="2971800" indent="-228600" eaLnBrk="0" fontAlgn="base" hangingPunct="0">
-              <a:spcBef>
-                <a:spcPct val="0"/>
-              </a:spcBef>
-              <a:spcAft>
-                <a:spcPct val="0"/>
-              </a:spcAft>
-              <a:defRPr>
-                <a:solidFill>
-                  <a:schemeClr val="tx1"/>
-                </a:solidFill>
-                <a:latin typeface="Calibri" panose="020F0502020204030204" pitchFamily="34" charset="0"/>
-              </a:defRPr>
-            </a:lvl7pPr>
-            <a:lvl8pPr marL="3429000" indent="-228600" eaLnBrk="0" fontAlgn="base" hangingPunct="0">
-              <a:spcBef>
-                <a:spcPct val="0"/>
-              </a:spcBef>
-              <a:spcAft>
-                <a:spcPct val="0"/>
-              </a:spcAft>
-              <a:defRPr>
-                <a:solidFill>
-                  <a:schemeClr val="tx1"/>
-                </a:solidFill>
-                <a:latin typeface="Calibri" panose="020F0502020204030204" pitchFamily="34" charset="0"/>
-              </a:defRPr>
-            </a:lvl8pPr>
-            <a:lvl9pPr marL="3886200" indent="-228600" eaLnBrk="0" fontAlgn="base" hangingPunct="0">
-              <a:spcBef>
-                <a:spcPct val="0"/>
-              </a:spcBef>
-              <a:spcAft>
-                <a:spcPct val="0"/>
-              </a:spcAft>
-              <a:defRPr>
-                <a:solidFill>
-                  <a:schemeClr val="tx1"/>
-                </a:solidFill>
-                <a:latin typeface="Calibri" panose="020F0502020204030204" pitchFamily="34" charset="0"/>
-              </a:defRPr>
-            </a:lvl9pPr>
-          </a:lstStyle>
-          <a:p>
-            <a:pPr algn="ctr" eaLnBrk="1" hangingPunct="1"/>
-            <a:r>
-              <a:rPr lang="en-US" altLang="en-US" sz="800" dirty="0">
-                <a:latin typeface="Amazon Ember" panose="020B0603020204020204" pitchFamily="34" charset="0"/>
-                <a:ea typeface="Amazon Ember" panose="020B0603020204020204" pitchFamily="34" charset="0"/>
-                <a:cs typeface="Amazon Ember" panose="020B0603020204020204" pitchFamily="34" charset="0"/>
-              </a:rPr>
-              <a:t>Crawler</a:t>
-            </a:r>
-          </a:p>
-        </p:txBody>
-      </p:sp>
-      <p:sp>
-        <p:nvSpPr>
-          <p:cNvPr id="37" name="Rectangle 36">
-            <a:extLst>
-              <a:ext uri="{FF2B5EF4-FFF2-40B4-BE49-F238E27FC236}">
-                <a16:creationId xmlns:a16="http://schemas.microsoft.com/office/drawing/2014/main" id="{279D3019-BF3E-E056-5F33-94D98AEBFE25}"/>
-              </a:ext>
-            </a:extLst>
-          </p:cNvPr>
-          <p:cNvSpPr/>
-          <p:nvPr/>
-        </p:nvSpPr>
-        <p:spPr>
-          <a:xfrm>
-            <a:off x="6967238" y="2914888"/>
-            <a:ext cx="2207494" cy="571217"/>
-          </a:xfrm>
-          <a:prstGeom prst="rect">
-            <a:avLst/>
-          </a:prstGeom>
-          <a:solidFill>
-            <a:srgbClr val="5A6B86">
-              <a:alpha val="9804"/>
-            </a:srgbClr>
-          </a:solidFill>
-          <a:ln w="12700">
-            <a:noFill/>
-            <a:prstDash val="dash"/>
-          </a:ln>
-        </p:spPr>
-        <p:style>
-          <a:lnRef idx="2">
-            <a:schemeClr val="accent1">
-              <a:shade val="50000"/>
-            </a:schemeClr>
-          </a:lnRef>
-          <a:fillRef idx="1">
-            <a:schemeClr val="accent1"/>
-          </a:fillRef>
-          <a:effectRef idx="0">
-            <a:schemeClr val="accent1"/>
-          </a:effectRef>
-          <a:fontRef idx="minor">
-            <a:schemeClr val="lt1"/>
-          </a:fontRef>
-        </p:style>
-        <p:txBody>
-          <a:bodyPr tIns="45720"/>
-          <a:lstStyle/>
-          <a:p>
-            <a:pPr algn="ctr" eaLnBrk="1" fontAlgn="auto" hangingPunct="1">
-              <a:spcBef>
-                <a:spcPts val="0"/>
-              </a:spcBef>
-              <a:spcAft>
-                <a:spcPts val="0"/>
-              </a:spcAft>
-              <a:defRPr/>
-            </a:pPr>
-            <a:endParaRPr lang="en-US" sz="1000" dirty="0">
-              <a:solidFill>
-                <a:schemeClr val="tx1"/>
-              </a:solidFill>
-              <a:latin typeface="Amazon Ember" panose="020B0603020204020204" pitchFamily="34" charset="0"/>
-              <a:ea typeface="Amazon Ember" panose="020B0603020204020204" pitchFamily="34" charset="0"/>
-              <a:cs typeface="Amazon Ember" panose="020B0603020204020204" pitchFamily="34" charset="0"/>
-            </a:endParaRPr>
-          </a:p>
-        </p:txBody>
-      </p:sp>
-      <p:pic>
-        <p:nvPicPr>
-          <p:cNvPr id="38" name="Graphic 22">
-            <a:extLst>
-              <a:ext uri="{FF2B5EF4-FFF2-40B4-BE49-F238E27FC236}">
-                <a16:creationId xmlns:a16="http://schemas.microsoft.com/office/drawing/2014/main" id="{9CB8F985-5376-7143-E4FC-1277FDF88A9C}"/>
+                <a16:creationId xmlns:a16="http://schemas.microsoft.com/office/drawing/2014/main" id="{BF25C720-9123-D82B-1F38-7BB21D83B437}"/>
               </a:ext>
             </a:extLst>
           </p:cNvPr>
@@ -6180,7 +4381,7 @@
           <p:nvPr/>
         </p:nvPicPr>
         <p:blipFill>
-          <a:blip r:embed="rId17" cstate="print">
+          <a:blip r:embed="rId7" cstate="print">
             <a:extLst>
               <a:ext uri="{28A0092B-C50C-407E-A947-70E740481C1C}">
                 <a14:useLocalDpi xmlns:a14="http://schemas.microsoft.com/office/drawing/2010/main" val="0"/>
@@ -6194,520 +4395,7 @@
         </p:blipFill>
         <p:spPr bwMode="auto">
           <a:xfrm>
-            <a:off x="7867072" y="2980065"/>
-            <a:ext cx="290019" cy="292594"/>
-          </a:xfrm>
-          <a:prstGeom prst="rect">
-            <a:avLst/>
-          </a:prstGeom>
-          <a:noFill/>
-          <a:ln>
-            <a:noFill/>
-          </a:ln>
-          <a:extLst>
-            <a:ext uri="{909E8E84-426E-40DD-AFC4-6F175D3DCCD1}">
-              <a14:hiddenFill xmlns:a14="http://schemas.microsoft.com/office/drawing/2010/main">
-                <a:solidFill>
-                  <a:srgbClr val="FFFFFF"/>
-                </a:solidFill>
-              </a14:hiddenFill>
-            </a:ext>
-            <a:ext uri="{91240B29-F687-4F45-9708-019B960494DF}">
-              <a14:hiddenLine xmlns:a14="http://schemas.microsoft.com/office/drawing/2010/main" w="9525">
-                <a:solidFill>
-                  <a:srgbClr val="000000"/>
-                </a:solidFill>
-                <a:miter lim="800000"/>
-                <a:headEnd/>
-                <a:tailEnd/>
-              </a14:hiddenLine>
-            </a:ext>
-          </a:extLst>
-        </p:spPr>
-      </p:pic>
-      <p:sp>
-        <p:nvSpPr>
-          <p:cNvPr id="39" name="TextBox 17">
-            <a:extLst>
-              <a:ext uri="{FF2B5EF4-FFF2-40B4-BE49-F238E27FC236}">
-                <a16:creationId xmlns:a16="http://schemas.microsoft.com/office/drawing/2014/main" id="{5A64AAD5-DF93-3536-F4FD-8787412A0A2A}"/>
-              </a:ext>
-            </a:extLst>
-          </p:cNvPr>
-          <p:cNvSpPr txBox="1">
-            <a:spLocks noChangeArrowheads="1"/>
-          </p:cNvSpPr>
-          <p:nvPr/>
-        </p:nvSpPr>
-        <p:spPr bwMode="auto">
-          <a:xfrm>
-            <a:off x="7358833" y="3272659"/>
-            <a:ext cx="1319622" cy="229796"/>
-          </a:xfrm>
-          <a:prstGeom prst="rect">
-            <a:avLst/>
-          </a:prstGeom>
-          <a:noFill/>
-          <a:ln>
-            <a:noFill/>
-          </a:ln>
-          <a:extLst>
-            <a:ext uri="{909E8E84-426E-40DD-AFC4-6F175D3DCCD1}">
-              <a14:hiddenFill xmlns:a14="http://schemas.microsoft.com/office/drawing/2010/main">
-                <a:solidFill>
-                  <a:srgbClr val="FFFFFF"/>
-                </a:solidFill>
-              </a14:hiddenFill>
-            </a:ext>
-            <a:ext uri="{91240B29-F687-4F45-9708-019B960494DF}">
-              <a14:hiddenLine xmlns:a14="http://schemas.microsoft.com/office/drawing/2010/main" w="9525">
-                <a:solidFill>
-                  <a:srgbClr val="000000"/>
-                </a:solidFill>
-                <a:miter lim="800000"/>
-                <a:headEnd/>
-                <a:tailEnd/>
-              </a14:hiddenLine>
-            </a:ext>
-          </a:extLst>
-        </p:spPr>
-        <p:txBody>
-          <a:bodyPr wrap="square">
-            <a:spAutoFit/>
-          </a:bodyPr>
-          <a:lstStyle>
-            <a:lvl1pPr>
-              <a:defRPr>
-                <a:solidFill>
-                  <a:schemeClr val="tx1"/>
-                </a:solidFill>
-                <a:latin typeface="Calibri" panose="020F0502020204030204" pitchFamily="34" charset="0"/>
-              </a:defRPr>
-            </a:lvl1pPr>
-            <a:lvl2pPr marL="742950" indent="-285750">
-              <a:defRPr>
-                <a:solidFill>
-                  <a:schemeClr val="tx1"/>
-                </a:solidFill>
-                <a:latin typeface="Calibri" panose="020F0502020204030204" pitchFamily="34" charset="0"/>
-              </a:defRPr>
-            </a:lvl2pPr>
-            <a:lvl3pPr marL="1143000" indent="-228600">
-              <a:defRPr>
-                <a:solidFill>
-                  <a:schemeClr val="tx1"/>
-                </a:solidFill>
-                <a:latin typeface="Calibri" panose="020F0502020204030204" pitchFamily="34" charset="0"/>
-              </a:defRPr>
-            </a:lvl3pPr>
-            <a:lvl4pPr marL="1600200" indent="-228600">
-              <a:defRPr>
-                <a:solidFill>
-                  <a:schemeClr val="tx1"/>
-                </a:solidFill>
-                <a:latin typeface="Calibri" panose="020F0502020204030204" pitchFamily="34" charset="0"/>
-              </a:defRPr>
-            </a:lvl4pPr>
-            <a:lvl5pPr marL="2057400" indent="-228600">
-              <a:defRPr>
-                <a:solidFill>
-                  <a:schemeClr val="tx1"/>
-                </a:solidFill>
-                <a:latin typeface="Calibri" panose="020F0502020204030204" pitchFamily="34" charset="0"/>
-              </a:defRPr>
-            </a:lvl5pPr>
-            <a:lvl6pPr marL="2514600" indent="-228600" eaLnBrk="0" fontAlgn="base" hangingPunct="0">
-              <a:spcBef>
-                <a:spcPct val="0"/>
-              </a:spcBef>
-              <a:spcAft>
-                <a:spcPct val="0"/>
-              </a:spcAft>
-              <a:defRPr>
-                <a:solidFill>
-                  <a:schemeClr val="tx1"/>
-                </a:solidFill>
-                <a:latin typeface="Calibri" panose="020F0502020204030204" pitchFamily="34" charset="0"/>
-              </a:defRPr>
-            </a:lvl6pPr>
-            <a:lvl7pPr marL="2971800" indent="-228600" eaLnBrk="0" fontAlgn="base" hangingPunct="0">
-              <a:spcBef>
-                <a:spcPct val="0"/>
-              </a:spcBef>
-              <a:spcAft>
-                <a:spcPct val="0"/>
-              </a:spcAft>
-              <a:defRPr>
-                <a:solidFill>
-                  <a:schemeClr val="tx1"/>
-                </a:solidFill>
-                <a:latin typeface="Calibri" panose="020F0502020204030204" pitchFamily="34" charset="0"/>
-              </a:defRPr>
-            </a:lvl7pPr>
-            <a:lvl8pPr marL="3429000" indent="-228600" eaLnBrk="0" fontAlgn="base" hangingPunct="0">
-              <a:spcBef>
-                <a:spcPct val="0"/>
-              </a:spcBef>
-              <a:spcAft>
-                <a:spcPct val="0"/>
-              </a:spcAft>
-              <a:defRPr>
-                <a:solidFill>
-                  <a:schemeClr val="tx1"/>
-                </a:solidFill>
-                <a:latin typeface="Calibri" panose="020F0502020204030204" pitchFamily="34" charset="0"/>
-              </a:defRPr>
-            </a:lvl8pPr>
-            <a:lvl9pPr marL="3886200" indent="-228600" eaLnBrk="0" fontAlgn="base" hangingPunct="0">
-              <a:spcBef>
-                <a:spcPct val="0"/>
-              </a:spcBef>
-              <a:spcAft>
-                <a:spcPct val="0"/>
-              </a:spcAft>
-              <a:defRPr>
-                <a:solidFill>
-                  <a:schemeClr val="tx1"/>
-                </a:solidFill>
-                <a:latin typeface="Calibri" panose="020F0502020204030204" pitchFamily="34" charset="0"/>
-              </a:defRPr>
-            </a:lvl9pPr>
-          </a:lstStyle>
-          <a:p>
-            <a:pPr algn="ctr" eaLnBrk="1" hangingPunct="1"/>
-            <a:r>
-              <a:rPr lang="en-US" altLang="en-US" sz="800" dirty="0">
-                <a:latin typeface="Amazon Ember" panose="020B0603020204020204" pitchFamily="34" charset="0"/>
-                <a:ea typeface="Amazon Ember" panose="020B0603020204020204" pitchFamily="34" charset="0"/>
-                <a:cs typeface="Amazon Ember" panose="020B0603020204020204" pitchFamily="34" charset="0"/>
-              </a:rPr>
-              <a:t>Amazon EMR</a:t>
-            </a:r>
-          </a:p>
-        </p:txBody>
-      </p:sp>
-      <p:sp>
-        <p:nvSpPr>
-          <p:cNvPr id="53" name="Rectangle 52">
-            <a:extLst>
-              <a:ext uri="{FF2B5EF4-FFF2-40B4-BE49-F238E27FC236}">
-                <a16:creationId xmlns:a16="http://schemas.microsoft.com/office/drawing/2014/main" id="{7211DBF9-67B7-C975-D75F-8AD6987D4B8C}"/>
-              </a:ext>
-            </a:extLst>
-          </p:cNvPr>
-          <p:cNvSpPr/>
-          <p:nvPr/>
-        </p:nvSpPr>
-        <p:spPr>
-          <a:xfrm>
-            <a:off x="6473802" y="4185634"/>
-            <a:ext cx="1019946" cy="1970868"/>
-          </a:xfrm>
-          <a:prstGeom prst="rect">
-            <a:avLst/>
-          </a:prstGeom>
-          <a:noFill/>
-          <a:ln w="12700">
-            <a:solidFill>
-              <a:schemeClr val="accent3">
-                <a:lumMod val="75000"/>
-              </a:schemeClr>
-            </a:solidFill>
-            <a:prstDash val="dash"/>
-          </a:ln>
-        </p:spPr>
-        <p:style>
-          <a:lnRef idx="2">
-            <a:schemeClr val="accent1">
-              <a:shade val="50000"/>
-            </a:schemeClr>
-          </a:lnRef>
-          <a:fillRef idx="1">
-            <a:schemeClr val="accent1"/>
-          </a:fillRef>
-          <a:effectRef idx="0">
-            <a:schemeClr val="accent1"/>
-          </a:effectRef>
-          <a:fontRef idx="minor">
-            <a:schemeClr val="lt1"/>
-          </a:fontRef>
-        </p:style>
-        <p:txBody>
-          <a:bodyPr tIns="91440"/>
-          <a:lstStyle/>
-          <a:p>
-            <a:pPr algn="ctr" eaLnBrk="1" fontAlgn="auto" hangingPunct="1">
-              <a:spcBef>
-                <a:spcPts val="0"/>
-              </a:spcBef>
-              <a:spcAft>
-                <a:spcPts val="0"/>
-              </a:spcAft>
-              <a:defRPr/>
-            </a:pPr>
-            <a:r>
-              <a:rPr lang="en-US" sz="900" dirty="0">
-                <a:solidFill>
-                  <a:schemeClr val="tx1"/>
-                </a:solidFill>
-                <a:latin typeface="Amazon Ember" panose="020B0603020204020204" pitchFamily="34" charset="0"/>
-                <a:ea typeface="Amazon Ember" panose="020B0603020204020204" pitchFamily="34" charset="0"/>
-                <a:cs typeface="Amazon Ember" panose="020B0603020204020204" pitchFamily="34" charset="0"/>
-              </a:rPr>
-              <a:t>logs</a:t>
-            </a:r>
-          </a:p>
-        </p:txBody>
-      </p:sp>
-      <p:pic>
-        <p:nvPicPr>
-          <p:cNvPr id="55" name="Graphic 17" descr="Amazon CloudWatch service icon.">
-            <a:extLst>
-              <a:ext uri="{FF2B5EF4-FFF2-40B4-BE49-F238E27FC236}">
-                <a16:creationId xmlns:a16="http://schemas.microsoft.com/office/drawing/2014/main" id="{625DDFA7-5E30-E5A9-BDDE-B56D11001AB3}"/>
-              </a:ext>
-            </a:extLst>
-          </p:cNvPr>
-          <p:cNvPicPr>
-            <a:picLocks noChangeAspect="1" noChangeArrowheads="1"/>
-          </p:cNvPicPr>
-          <p:nvPr/>
-        </p:nvPicPr>
-        <p:blipFill>
-          <a:blip r:embed="rId18">
-            <a:extLst>
-              <a:ext uri="{96DAC541-7B7A-43D3-8B79-37D633B846F1}">
-                <asvg:svgBlip xmlns:asvg="http://schemas.microsoft.com/office/drawing/2016/SVG/main" r:embed="rId19"/>
-              </a:ext>
-            </a:extLst>
-          </a:blip>
-          <a:srcRect/>
-          <a:stretch/>
-        </p:blipFill>
-        <p:spPr bwMode="auto">
-          <a:xfrm>
-            <a:off x="6837478" y="4588753"/>
-            <a:ext cx="292594" cy="292594"/>
-          </a:xfrm>
-          <a:prstGeom prst="rect">
-            <a:avLst/>
-          </a:prstGeom>
-          <a:noFill/>
-          <a:ln>
-            <a:noFill/>
-          </a:ln>
-          <a:extLst>
-            <a:ext uri="{909E8E84-426E-40DD-AFC4-6F175D3DCCD1}">
-              <a14:hiddenFill xmlns:a14="http://schemas.microsoft.com/office/drawing/2010/main">
-                <a:solidFill>
-                  <a:srgbClr val="FFFFFF"/>
-                </a:solidFill>
-              </a14:hiddenFill>
-            </a:ext>
-            <a:ext uri="{91240B29-F687-4F45-9708-019B960494DF}">
-              <a14:hiddenLine xmlns:a14="http://schemas.microsoft.com/office/drawing/2010/main" w="9525">
-                <a:solidFill>
-                  <a:srgbClr val="000000"/>
-                </a:solidFill>
-                <a:miter lim="800000"/>
-                <a:headEnd/>
-                <a:tailEnd/>
-              </a14:hiddenLine>
-            </a:ext>
-          </a:extLst>
-        </p:spPr>
-      </p:pic>
-      <p:sp>
-        <p:nvSpPr>
-          <p:cNvPr id="56" name="TextBox 17">
-            <a:extLst>
-              <a:ext uri="{FF2B5EF4-FFF2-40B4-BE49-F238E27FC236}">
-                <a16:creationId xmlns:a16="http://schemas.microsoft.com/office/drawing/2014/main" id="{D08B7E41-4018-3847-FAA3-1B2E817E4D55}"/>
-              </a:ext>
-            </a:extLst>
-          </p:cNvPr>
-          <p:cNvSpPr txBox="1">
-            <a:spLocks noChangeArrowheads="1"/>
-          </p:cNvSpPr>
-          <p:nvPr/>
-        </p:nvSpPr>
-        <p:spPr bwMode="auto">
-          <a:xfrm>
-            <a:off x="6601179" y="4872044"/>
-            <a:ext cx="765192" cy="338554"/>
-          </a:xfrm>
-          <a:prstGeom prst="rect">
-            <a:avLst/>
-          </a:prstGeom>
-          <a:noFill/>
-          <a:ln>
-            <a:noFill/>
-          </a:ln>
-          <a:extLst>
-            <a:ext uri="{909E8E84-426E-40DD-AFC4-6F175D3DCCD1}">
-              <a14:hiddenFill xmlns:a14="http://schemas.microsoft.com/office/drawing/2010/main">
-                <a:solidFill>
-                  <a:srgbClr val="FFFFFF"/>
-                </a:solidFill>
-              </a14:hiddenFill>
-            </a:ext>
-            <a:ext uri="{91240B29-F687-4F45-9708-019B960494DF}">
-              <a14:hiddenLine xmlns:a14="http://schemas.microsoft.com/office/drawing/2010/main" w="9525">
-                <a:solidFill>
-                  <a:srgbClr val="000000"/>
-                </a:solidFill>
-                <a:miter lim="800000"/>
-                <a:headEnd/>
-                <a:tailEnd/>
-              </a14:hiddenLine>
-            </a:ext>
-          </a:extLst>
-        </p:spPr>
-        <p:txBody>
-          <a:bodyPr wrap="square">
-            <a:spAutoFit/>
-          </a:bodyPr>
-          <a:lstStyle>
-            <a:lvl1pPr>
-              <a:defRPr>
-                <a:solidFill>
-                  <a:schemeClr val="tx1"/>
-                </a:solidFill>
-                <a:latin typeface="Calibri" panose="020F0502020204030204" pitchFamily="34" charset="0"/>
-              </a:defRPr>
-            </a:lvl1pPr>
-            <a:lvl2pPr marL="742950" indent="-285750">
-              <a:defRPr>
-                <a:solidFill>
-                  <a:schemeClr val="tx1"/>
-                </a:solidFill>
-                <a:latin typeface="Calibri" panose="020F0502020204030204" pitchFamily="34" charset="0"/>
-              </a:defRPr>
-            </a:lvl2pPr>
-            <a:lvl3pPr marL="1143000" indent="-228600">
-              <a:defRPr>
-                <a:solidFill>
-                  <a:schemeClr val="tx1"/>
-                </a:solidFill>
-                <a:latin typeface="Calibri" panose="020F0502020204030204" pitchFamily="34" charset="0"/>
-              </a:defRPr>
-            </a:lvl3pPr>
-            <a:lvl4pPr marL="1600200" indent="-228600">
-              <a:defRPr>
-                <a:solidFill>
-                  <a:schemeClr val="tx1"/>
-                </a:solidFill>
-                <a:latin typeface="Calibri" panose="020F0502020204030204" pitchFamily="34" charset="0"/>
-              </a:defRPr>
-            </a:lvl4pPr>
-            <a:lvl5pPr marL="2057400" indent="-228600">
-              <a:defRPr>
-                <a:solidFill>
-                  <a:schemeClr val="tx1"/>
-                </a:solidFill>
-                <a:latin typeface="Calibri" panose="020F0502020204030204" pitchFamily="34" charset="0"/>
-              </a:defRPr>
-            </a:lvl5pPr>
-            <a:lvl6pPr marL="2514600" indent="-228600" eaLnBrk="0" fontAlgn="base" hangingPunct="0">
-              <a:spcBef>
-                <a:spcPct val="0"/>
-              </a:spcBef>
-              <a:spcAft>
-                <a:spcPct val="0"/>
-              </a:spcAft>
-              <a:defRPr>
-                <a:solidFill>
-                  <a:schemeClr val="tx1"/>
-                </a:solidFill>
-                <a:latin typeface="Calibri" panose="020F0502020204030204" pitchFamily="34" charset="0"/>
-              </a:defRPr>
-            </a:lvl6pPr>
-            <a:lvl7pPr marL="2971800" indent="-228600" eaLnBrk="0" fontAlgn="base" hangingPunct="0">
-              <a:spcBef>
-                <a:spcPct val="0"/>
-              </a:spcBef>
-              <a:spcAft>
-                <a:spcPct val="0"/>
-              </a:spcAft>
-              <a:defRPr>
-                <a:solidFill>
-                  <a:schemeClr val="tx1"/>
-                </a:solidFill>
-                <a:latin typeface="Calibri" panose="020F0502020204030204" pitchFamily="34" charset="0"/>
-              </a:defRPr>
-            </a:lvl7pPr>
-            <a:lvl8pPr marL="3429000" indent="-228600" eaLnBrk="0" fontAlgn="base" hangingPunct="0">
-              <a:spcBef>
-                <a:spcPct val="0"/>
-              </a:spcBef>
-              <a:spcAft>
-                <a:spcPct val="0"/>
-              </a:spcAft>
-              <a:defRPr>
-                <a:solidFill>
-                  <a:schemeClr val="tx1"/>
-                </a:solidFill>
-                <a:latin typeface="Calibri" panose="020F0502020204030204" pitchFamily="34" charset="0"/>
-              </a:defRPr>
-            </a:lvl8pPr>
-            <a:lvl9pPr marL="3886200" indent="-228600" eaLnBrk="0" fontAlgn="base" hangingPunct="0">
-              <a:spcBef>
-                <a:spcPct val="0"/>
-              </a:spcBef>
-              <a:spcAft>
-                <a:spcPct val="0"/>
-              </a:spcAft>
-              <a:defRPr>
-                <a:solidFill>
-                  <a:schemeClr val="tx1"/>
-                </a:solidFill>
-                <a:latin typeface="Calibri" panose="020F0502020204030204" pitchFamily="34" charset="0"/>
-              </a:defRPr>
-            </a:lvl9pPr>
-          </a:lstStyle>
-          <a:p>
-            <a:pPr algn="ctr" eaLnBrk="1" hangingPunct="1"/>
-            <a:r>
-              <a:rPr lang="en-US" altLang="en-US" sz="800" dirty="0">
-                <a:latin typeface="Amazon Ember" panose="020B0603020204020204" pitchFamily="34" charset="0"/>
-                <a:ea typeface="Amazon Ember" panose="020B0603020204020204" pitchFamily="34" charset="0"/>
-                <a:cs typeface="Amazon Ember" panose="020B0603020204020204" pitchFamily="34" charset="0"/>
-              </a:rPr>
-              <a:t>Amazon CloudWatch</a:t>
-            </a:r>
-          </a:p>
-        </p:txBody>
-      </p:sp>
-      <p:pic>
-        <p:nvPicPr>
-          <p:cNvPr id="57" name="Graphic 14">
-            <a:extLst>
-              <a:ext uri="{FF2B5EF4-FFF2-40B4-BE49-F238E27FC236}">
-                <a16:creationId xmlns:a16="http://schemas.microsoft.com/office/drawing/2014/main" id="{BF25C720-9123-D82B-1F38-7BB21D83B437}"/>
-              </a:ext>
-            </a:extLst>
-          </p:cNvPr>
-          <p:cNvPicPr>
-            <a:picLocks noChangeAspect="1" noChangeArrowheads="1"/>
-          </p:cNvPicPr>
-          <p:nvPr/>
-        </p:nvPicPr>
-        <p:blipFill>
-          <a:blip r:embed="rId20" cstate="print">
-            <a:extLst>
-              <a:ext uri="{28A0092B-C50C-407E-A947-70E740481C1C}">
-                <a14:useLocalDpi xmlns:a14="http://schemas.microsoft.com/office/drawing/2010/main" val="0"/>
-              </a:ext>
-            </a:extLst>
-          </a:blip>
-          <a:srcRect/>
-          <a:stretch>
-            <a:fillRect/>
-          </a:stretch>
-        </p:blipFill>
-        <p:spPr bwMode="auto">
-          <a:xfrm>
-            <a:off x="9126694" y="4007010"/>
+            <a:off x="9218487" y="4394391"/>
             <a:ext cx="290019" cy="292594"/>
           </a:xfrm>
           <a:prstGeom prst="rect">
@@ -6754,7 +4442,7 @@
         </p:nvSpPr>
         <p:spPr bwMode="auto">
           <a:xfrm>
-            <a:off x="8765022" y="4309306"/>
+            <a:off x="8856815" y="4696687"/>
             <a:ext cx="1097447" cy="229796"/>
           </a:xfrm>
           <a:prstGeom prst="rect">
@@ -6913,7 +4601,7 @@
         </p:nvSpPr>
         <p:spPr>
           <a:xfrm>
-            <a:off x="9862801" y="3993317"/>
+            <a:off x="9954262" y="4368964"/>
             <a:ext cx="1289786" cy="430887"/>
           </a:xfrm>
           <a:prstGeom prst="rect">
@@ -6934,6 +4622,2413 @@
           </a:p>
         </p:txBody>
       </p:sp>
+      <p:grpSp>
+        <p:nvGrpSpPr>
+          <p:cNvPr id="91" name="Group 90">
+            <a:extLst>
+              <a:ext uri="{FF2B5EF4-FFF2-40B4-BE49-F238E27FC236}">
+                <a16:creationId xmlns:a16="http://schemas.microsoft.com/office/drawing/2014/main" id="{762E0703-60AA-A4F1-D536-6E9FB2FFA0DF}"/>
+              </a:ext>
+            </a:extLst>
+          </p:cNvPr>
+          <p:cNvGrpSpPr/>
+          <p:nvPr/>
+        </p:nvGrpSpPr>
+        <p:grpSpPr>
+          <a:xfrm>
+            <a:off x="1352190" y="1170959"/>
+            <a:ext cx="8011306" cy="2641472"/>
+            <a:chOff x="1271777" y="1262745"/>
+            <a:chExt cx="8011306" cy="2641472"/>
+          </a:xfrm>
+        </p:grpSpPr>
+        <p:pic>
+          <p:nvPicPr>
+            <p:cNvPr id="6" name="Graphic 9">
+              <a:extLst>
+                <a:ext uri="{FF2B5EF4-FFF2-40B4-BE49-F238E27FC236}">
+                  <a16:creationId xmlns:a16="http://schemas.microsoft.com/office/drawing/2014/main" id="{755D08C3-A029-31BE-7FD6-5164C7594F58}"/>
+                </a:ext>
+              </a:extLst>
+            </p:cNvPr>
+            <p:cNvPicPr>
+              <a:picLocks noChangeAspect="1" noChangeArrowheads="1"/>
+            </p:cNvPicPr>
+            <p:nvPr/>
+          </p:nvPicPr>
+          <p:blipFill>
+            <a:blip r:embed="rId8">
+              <a:extLst>
+                <a:ext uri="{28A0092B-C50C-407E-A947-70E740481C1C}">
+                  <a14:useLocalDpi xmlns:a14="http://schemas.microsoft.com/office/drawing/2010/main" val="0"/>
+                </a:ext>
+              </a:extLst>
+            </a:blip>
+            <a:srcRect/>
+            <a:stretch>
+              <a:fillRect/>
+            </a:stretch>
+          </p:blipFill>
+          <p:spPr bwMode="auto">
+            <a:xfrm>
+              <a:off x="3968133" y="2865853"/>
+              <a:ext cx="290019" cy="292594"/>
+            </a:xfrm>
+            <a:prstGeom prst="rect">
+              <a:avLst/>
+            </a:prstGeom>
+            <a:noFill/>
+            <a:ln>
+              <a:noFill/>
+            </a:ln>
+            <a:extLst>
+              <a:ext uri="{909E8E84-426E-40DD-AFC4-6F175D3DCCD1}">
+                <a14:hiddenFill xmlns:a14="http://schemas.microsoft.com/office/drawing/2010/main">
+                  <a:solidFill>
+                    <a:srgbClr val="FFFFFF"/>
+                  </a:solidFill>
+                </a14:hiddenFill>
+              </a:ext>
+              <a:ext uri="{91240B29-F687-4F45-9708-019B960494DF}">
+                <a14:hiddenLine xmlns:a14="http://schemas.microsoft.com/office/drawing/2010/main" w="9525">
+                  <a:solidFill>
+                    <a:srgbClr val="000000"/>
+                  </a:solidFill>
+                  <a:miter lim="800000"/>
+                  <a:headEnd/>
+                  <a:tailEnd/>
+                </a14:hiddenLine>
+              </a:ext>
+            </a:extLst>
+          </p:spPr>
+        </p:pic>
+        <p:sp>
+          <p:nvSpPr>
+            <p:cNvPr id="8" name="TextBox 17">
+              <a:extLst>
+                <a:ext uri="{FF2B5EF4-FFF2-40B4-BE49-F238E27FC236}">
+                  <a16:creationId xmlns:a16="http://schemas.microsoft.com/office/drawing/2014/main" id="{1AED17E9-9DC5-0D3A-50F5-A7F587E951F3}"/>
+                </a:ext>
+              </a:extLst>
+            </p:cNvPr>
+            <p:cNvSpPr txBox="1">
+              <a:spLocks noChangeArrowheads="1"/>
+            </p:cNvSpPr>
+            <p:nvPr/>
+          </p:nvSpPr>
+          <p:spPr bwMode="auto">
+            <a:xfrm>
+              <a:off x="3730546" y="3168902"/>
+              <a:ext cx="765192" cy="338554"/>
+            </a:xfrm>
+            <a:prstGeom prst="rect">
+              <a:avLst/>
+            </a:prstGeom>
+            <a:noFill/>
+            <a:ln>
+              <a:noFill/>
+            </a:ln>
+            <a:extLst>
+              <a:ext uri="{909E8E84-426E-40DD-AFC4-6F175D3DCCD1}">
+                <a14:hiddenFill xmlns:a14="http://schemas.microsoft.com/office/drawing/2010/main">
+                  <a:solidFill>
+                    <a:srgbClr val="FFFFFF"/>
+                  </a:solidFill>
+                </a14:hiddenFill>
+              </a:ext>
+              <a:ext uri="{91240B29-F687-4F45-9708-019B960494DF}">
+                <a14:hiddenLine xmlns:a14="http://schemas.microsoft.com/office/drawing/2010/main" w="9525">
+                  <a:solidFill>
+                    <a:srgbClr val="000000"/>
+                  </a:solidFill>
+                  <a:miter lim="800000"/>
+                  <a:headEnd/>
+                  <a:tailEnd/>
+                </a14:hiddenLine>
+              </a:ext>
+            </a:extLst>
+          </p:spPr>
+          <p:txBody>
+            <a:bodyPr wrap="square">
+              <a:spAutoFit/>
+            </a:bodyPr>
+            <a:lstStyle>
+              <a:lvl1pPr>
+                <a:defRPr>
+                  <a:solidFill>
+                    <a:schemeClr val="tx1"/>
+                  </a:solidFill>
+                  <a:latin typeface="Calibri" panose="020F0502020204030204" pitchFamily="34" charset="0"/>
+                </a:defRPr>
+              </a:lvl1pPr>
+              <a:lvl2pPr marL="742950" indent="-285750">
+                <a:defRPr>
+                  <a:solidFill>
+                    <a:schemeClr val="tx1"/>
+                  </a:solidFill>
+                  <a:latin typeface="Calibri" panose="020F0502020204030204" pitchFamily="34" charset="0"/>
+                </a:defRPr>
+              </a:lvl2pPr>
+              <a:lvl3pPr marL="1143000" indent="-228600">
+                <a:defRPr>
+                  <a:solidFill>
+                    <a:schemeClr val="tx1"/>
+                  </a:solidFill>
+                  <a:latin typeface="Calibri" panose="020F0502020204030204" pitchFamily="34" charset="0"/>
+                </a:defRPr>
+              </a:lvl3pPr>
+              <a:lvl4pPr marL="1600200" indent="-228600">
+                <a:defRPr>
+                  <a:solidFill>
+                    <a:schemeClr val="tx1"/>
+                  </a:solidFill>
+                  <a:latin typeface="Calibri" panose="020F0502020204030204" pitchFamily="34" charset="0"/>
+                </a:defRPr>
+              </a:lvl4pPr>
+              <a:lvl5pPr marL="2057400" indent="-228600">
+                <a:defRPr>
+                  <a:solidFill>
+                    <a:schemeClr val="tx1"/>
+                  </a:solidFill>
+                  <a:latin typeface="Calibri" panose="020F0502020204030204" pitchFamily="34" charset="0"/>
+                </a:defRPr>
+              </a:lvl5pPr>
+              <a:lvl6pPr marL="2514600" indent="-228600" eaLnBrk="0" fontAlgn="base" hangingPunct="0">
+                <a:spcBef>
+                  <a:spcPct val="0"/>
+                </a:spcBef>
+                <a:spcAft>
+                  <a:spcPct val="0"/>
+                </a:spcAft>
+                <a:defRPr>
+                  <a:solidFill>
+                    <a:schemeClr val="tx1"/>
+                  </a:solidFill>
+                  <a:latin typeface="Calibri" panose="020F0502020204030204" pitchFamily="34" charset="0"/>
+                </a:defRPr>
+              </a:lvl6pPr>
+              <a:lvl7pPr marL="2971800" indent="-228600" eaLnBrk="0" fontAlgn="base" hangingPunct="0">
+                <a:spcBef>
+                  <a:spcPct val="0"/>
+                </a:spcBef>
+                <a:spcAft>
+                  <a:spcPct val="0"/>
+                </a:spcAft>
+                <a:defRPr>
+                  <a:solidFill>
+                    <a:schemeClr val="tx1"/>
+                  </a:solidFill>
+                  <a:latin typeface="Calibri" panose="020F0502020204030204" pitchFamily="34" charset="0"/>
+                </a:defRPr>
+              </a:lvl7pPr>
+              <a:lvl8pPr marL="3429000" indent="-228600" eaLnBrk="0" fontAlgn="base" hangingPunct="0">
+                <a:spcBef>
+                  <a:spcPct val="0"/>
+                </a:spcBef>
+                <a:spcAft>
+                  <a:spcPct val="0"/>
+                </a:spcAft>
+                <a:defRPr>
+                  <a:solidFill>
+                    <a:schemeClr val="tx1"/>
+                  </a:solidFill>
+                  <a:latin typeface="Calibri" panose="020F0502020204030204" pitchFamily="34" charset="0"/>
+                </a:defRPr>
+              </a:lvl8pPr>
+              <a:lvl9pPr marL="3886200" indent="-228600" eaLnBrk="0" fontAlgn="base" hangingPunct="0">
+                <a:spcBef>
+                  <a:spcPct val="0"/>
+                </a:spcBef>
+                <a:spcAft>
+                  <a:spcPct val="0"/>
+                </a:spcAft>
+                <a:defRPr>
+                  <a:solidFill>
+                    <a:schemeClr val="tx1"/>
+                  </a:solidFill>
+                  <a:latin typeface="Calibri" panose="020F0502020204030204" pitchFamily="34" charset="0"/>
+                </a:defRPr>
+              </a:lvl9pPr>
+            </a:lstStyle>
+            <a:p>
+              <a:pPr algn="ctr" eaLnBrk="1" hangingPunct="1"/>
+              <a:r>
+                <a:rPr lang="en-US" altLang="en-US" sz="800" dirty="0">
+                  <a:latin typeface="Amazon Ember" panose="020B0603020204020204" pitchFamily="34" charset="0"/>
+                  <a:ea typeface="Amazon Ember" panose="020B0603020204020204" pitchFamily="34" charset="0"/>
+                  <a:cs typeface="Amazon Ember" panose="020B0603020204020204" pitchFamily="34" charset="0"/>
+                </a:rPr>
+                <a:t>AWS Glue</a:t>
+              </a:r>
+            </a:p>
+            <a:p>
+              <a:pPr algn="ctr" eaLnBrk="1" hangingPunct="1"/>
+              <a:r>
+                <a:rPr lang="en-US" altLang="en-US" sz="800" dirty="0">
+                  <a:latin typeface="Amazon Ember" panose="020B0603020204020204" pitchFamily="34" charset="0"/>
+                  <a:ea typeface="Amazon Ember" panose="020B0603020204020204" pitchFamily="34" charset="0"/>
+                  <a:cs typeface="Amazon Ember" panose="020B0603020204020204" pitchFamily="34" charset="0"/>
+                </a:rPr>
+                <a:t>Data Catalog</a:t>
+              </a:r>
+            </a:p>
+          </p:txBody>
+        </p:sp>
+        <p:pic>
+          <p:nvPicPr>
+            <p:cNvPr id="17" name="Graphic 16" descr="Crawler resource icon for the AWS Glue service.">
+              <a:extLst>
+                <a:ext uri="{FF2B5EF4-FFF2-40B4-BE49-F238E27FC236}">
+                  <a16:creationId xmlns:a16="http://schemas.microsoft.com/office/drawing/2014/main" id="{D9D7BDF0-825F-36E4-DA09-B493708AB1B4}"/>
+                </a:ext>
+              </a:extLst>
+            </p:cNvPr>
+            <p:cNvPicPr>
+              <a:picLocks noChangeAspect="1"/>
+            </p:cNvPicPr>
+            <p:nvPr/>
+          </p:nvPicPr>
+          <p:blipFill>
+            <a:blip r:embed="rId9">
+              <a:extLst>
+                <a:ext uri="{96DAC541-7B7A-43D3-8B79-37D633B846F1}">
+                  <asvg:svgBlip xmlns:asvg="http://schemas.microsoft.com/office/drawing/2016/SVG/main" r:embed="rId10"/>
+                </a:ext>
+              </a:extLst>
+            </a:blip>
+            <a:stretch>
+              <a:fillRect/>
+            </a:stretch>
+          </p:blipFill>
+          <p:spPr>
+            <a:xfrm>
+              <a:off x="3170421" y="2856989"/>
+              <a:ext cx="303049" cy="303049"/>
+            </a:xfrm>
+            <a:prstGeom prst="rect">
+              <a:avLst/>
+            </a:prstGeom>
+          </p:spPr>
+        </p:pic>
+        <p:sp>
+          <p:nvSpPr>
+            <p:cNvPr id="23" name="TextBox 17">
+              <a:extLst>
+                <a:ext uri="{FF2B5EF4-FFF2-40B4-BE49-F238E27FC236}">
+                  <a16:creationId xmlns:a16="http://schemas.microsoft.com/office/drawing/2014/main" id="{6E383336-8FD8-4BE7-06CB-59C79F503947}"/>
+                </a:ext>
+              </a:extLst>
+            </p:cNvPr>
+            <p:cNvSpPr txBox="1">
+              <a:spLocks noChangeArrowheads="1"/>
+            </p:cNvSpPr>
+            <p:nvPr/>
+          </p:nvSpPr>
+          <p:spPr bwMode="auto">
+            <a:xfrm>
+              <a:off x="2939349" y="3168902"/>
+              <a:ext cx="765192" cy="215444"/>
+            </a:xfrm>
+            <a:prstGeom prst="rect">
+              <a:avLst/>
+            </a:prstGeom>
+            <a:noFill/>
+            <a:ln>
+              <a:noFill/>
+            </a:ln>
+            <a:extLst>
+              <a:ext uri="{909E8E84-426E-40DD-AFC4-6F175D3DCCD1}">
+                <a14:hiddenFill xmlns:a14="http://schemas.microsoft.com/office/drawing/2010/main">
+                  <a:solidFill>
+                    <a:srgbClr val="FFFFFF"/>
+                  </a:solidFill>
+                </a14:hiddenFill>
+              </a:ext>
+              <a:ext uri="{91240B29-F687-4F45-9708-019B960494DF}">
+                <a14:hiddenLine xmlns:a14="http://schemas.microsoft.com/office/drawing/2010/main" w="9525">
+                  <a:solidFill>
+                    <a:srgbClr val="000000"/>
+                  </a:solidFill>
+                  <a:miter lim="800000"/>
+                  <a:headEnd/>
+                  <a:tailEnd/>
+                </a14:hiddenLine>
+              </a:ext>
+            </a:extLst>
+          </p:spPr>
+          <p:txBody>
+            <a:bodyPr wrap="square">
+              <a:spAutoFit/>
+            </a:bodyPr>
+            <a:lstStyle>
+              <a:lvl1pPr>
+                <a:defRPr>
+                  <a:solidFill>
+                    <a:schemeClr val="tx1"/>
+                  </a:solidFill>
+                  <a:latin typeface="Calibri" panose="020F0502020204030204" pitchFamily="34" charset="0"/>
+                </a:defRPr>
+              </a:lvl1pPr>
+              <a:lvl2pPr marL="742950" indent="-285750">
+                <a:defRPr>
+                  <a:solidFill>
+                    <a:schemeClr val="tx1"/>
+                  </a:solidFill>
+                  <a:latin typeface="Calibri" panose="020F0502020204030204" pitchFamily="34" charset="0"/>
+                </a:defRPr>
+              </a:lvl2pPr>
+              <a:lvl3pPr marL="1143000" indent="-228600">
+                <a:defRPr>
+                  <a:solidFill>
+                    <a:schemeClr val="tx1"/>
+                  </a:solidFill>
+                  <a:latin typeface="Calibri" panose="020F0502020204030204" pitchFamily="34" charset="0"/>
+                </a:defRPr>
+              </a:lvl3pPr>
+              <a:lvl4pPr marL="1600200" indent="-228600">
+                <a:defRPr>
+                  <a:solidFill>
+                    <a:schemeClr val="tx1"/>
+                  </a:solidFill>
+                  <a:latin typeface="Calibri" panose="020F0502020204030204" pitchFamily="34" charset="0"/>
+                </a:defRPr>
+              </a:lvl4pPr>
+              <a:lvl5pPr marL="2057400" indent="-228600">
+                <a:defRPr>
+                  <a:solidFill>
+                    <a:schemeClr val="tx1"/>
+                  </a:solidFill>
+                  <a:latin typeface="Calibri" panose="020F0502020204030204" pitchFamily="34" charset="0"/>
+                </a:defRPr>
+              </a:lvl5pPr>
+              <a:lvl6pPr marL="2514600" indent="-228600" eaLnBrk="0" fontAlgn="base" hangingPunct="0">
+                <a:spcBef>
+                  <a:spcPct val="0"/>
+                </a:spcBef>
+                <a:spcAft>
+                  <a:spcPct val="0"/>
+                </a:spcAft>
+                <a:defRPr>
+                  <a:solidFill>
+                    <a:schemeClr val="tx1"/>
+                  </a:solidFill>
+                  <a:latin typeface="Calibri" panose="020F0502020204030204" pitchFamily="34" charset="0"/>
+                </a:defRPr>
+              </a:lvl6pPr>
+              <a:lvl7pPr marL="2971800" indent="-228600" eaLnBrk="0" fontAlgn="base" hangingPunct="0">
+                <a:spcBef>
+                  <a:spcPct val="0"/>
+                </a:spcBef>
+                <a:spcAft>
+                  <a:spcPct val="0"/>
+                </a:spcAft>
+                <a:defRPr>
+                  <a:solidFill>
+                    <a:schemeClr val="tx1"/>
+                  </a:solidFill>
+                  <a:latin typeface="Calibri" panose="020F0502020204030204" pitchFamily="34" charset="0"/>
+                </a:defRPr>
+              </a:lvl7pPr>
+              <a:lvl8pPr marL="3429000" indent="-228600" eaLnBrk="0" fontAlgn="base" hangingPunct="0">
+                <a:spcBef>
+                  <a:spcPct val="0"/>
+                </a:spcBef>
+                <a:spcAft>
+                  <a:spcPct val="0"/>
+                </a:spcAft>
+                <a:defRPr>
+                  <a:solidFill>
+                    <a:schemeClr val="tx1"/>
+                  </a:solidFill>
+                  <a:latin typeface="Calibri" panose="020F0502020204030204" pitchFamily="34" charset="0"/>
+                </a:defRPr>
+              </a:lvl8pPr>
+              <a:lvl9pPr marL="3886200" indent="-228600" eaLnBrk="0" fontAlgn="base" hangingPunct="0">
+                <a:spcBef>
+                  <a:spcPct val="0"/>
+                </a:spcBef>
+                <a:spcAft>
+                  <a:spcPct val="0"/>
+                </a:spcAft>
+                <a:defRPr>
+                  <a:solidFill>
+                    <a:schemeClr val="tx1"/>
+                  </a:solidFill>
+                  <a:latin typeface="Calibri" panose="020F0502020204030204" pitchFamily="34" charset="0"/>
+                </a:defRPr>
+              </a:lvl9pPr>
+            </a:lstStyle>
+            <a:p>
+              <a:pPr algn="ctr" eaLnBrk="1" hangingPunct="1"/>
+              <a:r>
+                <a:rPr lang="en-US" altLang="en-US" sz="800" dirty="0">
+                  <a:latin typeface="Amazon Ember" panose="020B0603020204020204" pitchFamily="34" charset="0"/>
+                  <a:ea typeface="Amazon Ember" panose="020B0603020204020204" pitchFamily="34" charset="0"/>
+                  <a:cs typeface="Amazon Ember" panose="020B0603020204020204" pitchFamily="34" charset="0"/>
+                </a:rPr>
+                <a:t>Crawler</a:t>
+              </a:r>
+            </a:p>
+          </p:txBody>
+        </p:sp>
+        <p:sp>
+          <p:nvSpPr>
+            <p:cNvPr id="37" name="Rectangle 36">
+              <a:extLst>
+                <a:ext uri="{FF2B5EF4-FFF2-40B4-BE49-F238E27FC236}">
+                  <a16:creationId xmlns:a16="http://schemas.microsoft.com/office/drawing/2014/main" id="{279D3019-BF3E-E056-5F33-94D98AEBFE25}"/>
+                </a:ext>
+              </a:extLst>
+            </p:cNvPr>
+            <p:cNvSpPr/>
+            <p:nvPr/>
+          </p:nvSpPr>
+          <p:spPr>
+            <a:xfrm>
+              <a:off x="6747918" y="2042194"/>
+              <a:ext cx="2207494" cy="571217"/>
+            </a:xfrm>
+            <a:prstGeom prst="rect">
+              <a:avLst/>
+            </a:prstGeom>
+            <a:solidFill>
+              <a:srgbClr val="5A6B86">
+                <a:alpha val="9804"/>
+              </a:srgbClr>
+            </a:solidFill>
+            <a:ln w="12700">
+              <a:noFill/>
+              <a:prstDash val="dash"/>
+            </a:ln>
+          </p:spPr>
+          <p:style>
+            <a:lnRef idx="2">
+              <a:schemeClr val="accent1">
+                <a:shade val="50000"/>
+              </a:schemeClr>
+            </a:lnRef>
+            <a:fillRef idx="1">
+              <a:schemeClr val="accent1"/>
+            </a:fillRef>
+            <a:effectRef idx="0">
+              <a:schemeClr val="accent1"/>
+            </a:effectRef>
+            <a:fontRef idx="minor">
+              <a:schemeClr val="lt1"/>
+            </a:fontRef>
+          </p:style>
+          <p:txBody>
+            <a:bodyPr tIns="45720"/>
+            <a:lstStyle/>
+            <a:p>
+              <a:pPr algn="ctr" eaLnBrk="1" fontAlgn="auto" hangingPunct="1">
+                <a:spcBef>
+                  <a:spcPts val="0"/>
+                </a:spcBef>
+                <a:spcAft>
+                  <a:spcPts val="0"/>
+                </a:spcAft>
+                <a:defRPr/>
+              </a:pPr>
+              <a:endParaRPr lang="en-US" sz="1000" dirty="0">
+                <a:solidFill>
+                  <a:schemeClr val="tx1"/>
+                </a:solidFill>
+                <a:latin typeface="Amazon Ember" panose="020B0603020204020204" pitchFamily="34" charset="0"/>
+                <a:ea typeface="Amazon Ember" panose="020B0603020204020204" pitchFamily="34" charset="0"/>
+                <a:cs typeface="Amazon Ember" panose="020B0603020204020204" pitchFamily="34" charset="0"/>
+              </a:endParaRPr>
+            </a:p>
+          </p:txBody>
+        </p:sp>
+        <p:pic>
+          <p:nvPicPr>
+            <p:cNvPr id="38" name="Graphic 22">
+              <a:extLst>
+                <a:ext uri="{FF2B5EF4-FFF2-40B4-BE49-F238E27FC236}">
+                  <a16:creationId xmlns:a16="http://schemas.microsoft.com/office/drawing/2014/main" id="{9CB8F985-5376-7143-E4FC-1277FDF88A9C}"/>
+                </a:ext>
+              </a:extLst>
+            </p:cNvPr>
+            <p:cNvPicPr>
+              <a:picLocks noChangeAspect="1" noChangeArrowheads="1"/>
+            </p:cNvPicPr>
+            <p:nvPr/>
+          </p:nvPicPr>
+          <p:blipFill>
+            <a:blip r:embed="rId11" cstate="print">
+              <a:extLst>
+                <a:ext uri="{28A0092B-C50C-407E-A947-70E740481C1C}">
+                  <a14:useLocalDpi xmlns:a14="http://schemas.microsoft.com/office/drawing/2010/main" val="0"/>
+                </a:ext>
+              </a:extLst>
+            </a:blip>
+            <a:srcRect/>
+            <a:stretch>
+              <a:fillRect/>
+            </a:stretch>
+          </p:blipFill>
+          <p:spPr bwMode="auto">
+            <a:xfrm>
+              <a:off x="7734320" y="2112149"/>
+              <a:ext cx="290019" cy="292594"/>
+            </a:xfrm>
+            <a:prstGeom prst="rect">
+              <a:avLst/>
+            </a:prstGeom>
+            <a:noFill/>
+            <a:ln>
+              <a:noFill/>
+            </a:ln>
+            <a:extLst>
+              <a:ext uri="{909E8E84-426E-40DD-AFC4-6F175D3DCCD1}">
+                <a14:hiddenFill xmlns:a14="http://schemas.microsoft.com/office/drawing/2010/main">
+                  <a:solidFill>
+                    <a:srgbClr val="FFFFFF"/>
+                  </a:solidFill>
+                </a14:hiddenFill>
+              </a:ext>
+              <a:ext uri="{91240B29-F687-4F45-9708-019B960494DF}">
+                <a14:hiddenLine xmlns:a14="http://schemas.microsoft.com/office/drawing/2010/main" w="9525">
+                  <a:solidFill>
+                    <a:srgbClr val="000000"/>
+                  </a:solidFill>
+                  <a:miter lim="800000"/>
+                  <a:headEnd/>
+                  <a:tailEnd/>
+                </a14:hiddenLine>
+              </a:ext>
+            </a:extLst>
+          </p:spPr>
+        </p:pic>
+        <p:sp>
+          <p:nvSpPr>
+            <p:cNvPr id="39" name="TextBox 17">
+              <a:extLst>
+                <a:ext uri="{FF2B5EF4-FFF2-40B4-BE49-F238E27FC236}">
+                  <a16:creationId xmlns:a16="http://schemas.microsoft.com/office/drawing/2014/main" id="{5A64AAD5-DF93-3536-F4FD-8787412A0A2A}"/>
+                </a:ext>
+              </a:extLst>
+            </p:cNvPr>
+            <p:cNvSpPr txBox="1">
+              <a:spLocks noChangeArrowheads="1"/>
+            </p:cNvSpPr>
+            <p:nvPr/>
+          </p:nvSpPr>
+          <p:spPr bwMode="auto">
+            <a:xfrm>
+              <a:off x="7226081" y="2404743"/>
+              <a:ext cx="1319622" cy="229796"/>
+            </a:xfrm>
+            <a:prstGeom prst="rect">
+              <a:avLst/>
+            </a:prstGeom>
+            <a:noFill/>
+            <a:ln>
+              <a:noFill/>
+            </a:ln>
+            <a:extLst>
+              <a:ext uri="{909E8E84-426E-40DD-AFC4-6F175D3DCCD1}">
+                <a14:hiddenFill xmlns:a14="http://schemas.microsoft.com/office/drawing/2010/main">
+                  <a:solidFill>
+                    <a:srgbClr val="FFFFFF"/>
+                  </a:solidFill>
+                </a14:hiddenFill>
+              </a:ext>
+              <a:ext uri="{91240B29-F687-4F45-9708-019B960494DF}">
+                <a14:hiddenLine xmlns:a14="http://schemas.microsoft.com/office/drawing/2010/main" w="9525">
+                  <a:solidFill>
+                    <a:srgbClr val="000000"/>
+                  </a:solidFill>
+                  <a:miter lim="800000"/>
+                  <a:headEnd/>
+                  <a:tailEnd/>
+                </a14:hiddenLine>
+              </a:ext>
+            </a:extLst>
+          </p:spPr>
+          <p:txBody>
+            <a:bodyPr wrap="square">
+              <a:spAutoFit/>
+            </a:bodyPr>
+            <a:lstStyle>
+              <a:lvl1pPr>
+                <a:defRPr>
+                  <a:solidFill>
+                    <a:schemeClr val="tx1"/>
+                  </a:solidFill>
+                  <a:latin typeface="Calibri" panose="020F0502020204030204" pitchFamily="34" charset="0"/>
+                </a:defRPr>
+              </a:lvl1pPr>
+              <a:lvl2pPr marL="742950" indent="-285750">
+                <a:defRPr>
+                  <a:solidFill>
+                    <a:schemeClr val="tx1"/>
+                  </a:solidFill>
+                  <a:latin typeface="Calibri" panose="020F0502020204030204" pitchFamily="34" charset="0"/>
+                </a:defRPr>
+              </a:lvl2pPr>
+              <a:lvl3pPr marL="1143000" indent="-228600">
+                <a:defRPr>
+                  <a:solidFill>
+                    <a:schemeClr val="tx1"/>
+                  </a:solidFill>
+                  <a:latin typeface="Calibri" panose="020F0502020204030204" pitchFamily="34" charset="0"/>
+                </a:defRPr>
+              </a:lvl3pPr>
+              <a:lvl4pPr marL="1600200" indent="-228600">
+                <a:defRPr>
+                  <a:solidFill>
+                    <a:schemeClr val="tx1"/>
+                  </a:solidFill>
+                  <a:latin typeface="Calibri" panose="020F0502020204030204" pitchFamily="34" charset="0"/>
+                </a:defRPr>
+              </a:lvl4pPr>
+              <a:lvl5pPr marL="2057400" indent="-228600">
+                <a:defRPr>
+                  <a:solidFill>
+                    <a:schemeClr val="tx1"/>
+                  </a:solidFill>
+                  <a:latin typeface="Calibri" panose="020F0502020204030204" pitchFamily="34" charset="0"/>
+                </a:defRPr>
+              </a:lvl5pPr>
+              <a:lvl6pPr marL="2514600" indent="-228600" eaLnBrk="0" fontAlgn="base" hangingPunct="0">
+                <a:spcBef>
+                  <a:spcPct val="0"/>
+                </a:spcBef>
+                <a:spcAft>
+                  <a:spcPct val="0"/>
+                </a:spcAft>
+                <a:defRPr>
+                  <a:solidFill>
+                    <a:schemeClr val="tx1"/>
+                  </a:solidFill>
+                  <a:latin typeface="Calibri" panose="020F0502020204030204" pitchFamily="34" charset="0"/>
+                </a:defRPr>
+              </a:lvl6pPr>
+              <a:lvl7pPr marL="2971800" indent="-228600" eaLnBrk="0" fontAlgn="base" hangingPunct="0">
+                <a:spcBef>
+                  <a:spcPct val="0"/>
+                </a:spcBef>
+                <a:spcAft>
+                  <a:spcPct val="0"/>
+                </a:spcAft>
+                <a:defRPr>
+                  <a:solidFill>
+                    <a:schemeClr val="tx1"/>
+                  </a:solidFill>
+                  <a:latin typeface="Calibri" panose="020F0502020204030204" pitchFamily="34" charset="0"/>
+                </a:defRPr>
+              </a:lvl7pPr>
+              <a:lvl8pPr marL="3429000" indent="-228600" eaLnBrk="0" fontAlgn="base" hangingPunct="0">
+                <a:spcBef>
+                  <a:spcPct val="0"/>
+                </a:spcBef>
+                <a:spcAft>
+                  <a:spcPct val="0"/>
+                </a:spcAft>
+                <a:defRPr>
+                  <a:solidFill>
+                    <a:schemeClr val="tx1"/>
+                  </a:solidFill>
+                  <a:latin typeface="Calibri" panose="020F0502020204030204" pitchFamily="34" charset="0"/>
+                </a:defRPr>
+              </a:lvl8pPr>
+              <a:lvl9pPr marL="3886200" indent="-228600" eaLnBrk="0" fontAlgn="base" hangingPunct="0">
+                <a:spcBef>
+                  <a:spcPct val="0"/>
+                </a:spcBef>
+                <a:spcAft>
+                  <a:spcPct val="0"/>
+                </a:spcAft>
+                <a:defRPr>
+                  <a:solidFill>
+                    <a:schemeClr val="tx1"/>
+                  </a:solidFill>
+                  <a:latin typeface="Calibri" panose="020F0502020204030204" pitchFamily="34" charset="0"/>
+                </a:defRPr>
+              </a:lvl9pPr>
+            </a:lstStyle>
+            <a:p>
+              <a:pPr algn="ctr" eaLnBrk="1" hangingPunct="1"/>
+              <a:r>
+                <a:rPr lang="en-US" altLang="en-US" sz="800" dirty="0">
+                  <a:latin typeface="Amazon Ember" panose="020B0603020204020204" pitchFamily="34" charset="0"/>
+                  <a:ea typeface="Amazon Ember" panose="020B0603020204020204" pitchFamily="34" charset="0"/>
+                  <a:cs typeface="Amazon Ember" panose="020B0603020204020204" pitchFamily="34" charset="0"/>
+                </a:rPr>
+                <a:t>Amazon EMR</a:t>
+              </a:r>
+            </a:p>
+          </p:txBody>
+        </p:sp>
+        <p:grpSp>
+          <p:nvGrpSpPr>
+            <p:cNvPr id="86" name="Group 85">
+              <a:extLst>
+                <a:ext uri="{FF2B5EF4-FFF2-40B4-BE49-F238E27FC236}">
+                  <a16:creationId xmlns:a16="http://schemas.microsoft.com/office/drawing/2014/main" id="{658550BF-6559-6F9E-3A83-5E0B6D267CBD}"/>
+                </a:ext>
+              </a:extLst>
+            </p:cNvPr>
+            <p:cNvGrpSpPr/>
+            <p:nvPr/>
+          </p:nvGrpSpPr>
+          <p:grpSpPr>
+            <a:xfrm>
+              <a:off x="1271777" y="1262745"/>
+              <a:ext cx="8011306" cy="2641472"/>
+              <a:chOff x="1520391" y="1334579"/>
+              <a:chExt cx="8011306" cy="2641472"/>
+            </a:xfrm>
+          </p:grpSpPr>
+          <p:sp>
+            <p:nvSpPr>
+              <p:cNvPr id="13" name="Rectangle 12">
+                <a:extLst>
+                  <a:ext uri="{FF2B5EF4-FFF2-40B4-BE49-F238E27FC236}">
+                    <a16:creationId xmlns:a16="http://schemas.microsoft.com/office/drawing/2014/main" id="{A04280E4-1B7C-58FB-54D7-DED6762DBC62}"/>
+                  </a:ext>
+                </a:extLst>
+              </p:cNvPr>
+              <p:cNvSpPr/>
+              <p:nvPr/>
+            </p:nvSpPr>
+            <p:spPr>
+              <a:xfrm>
+                <a:off x="3064134" y="1716550"/>
+                <a:ext cx="1744873" cy="2114306"/>
+              </a:xfrm>
+              <a:prstGeom prst="rect">
+                <a:avLst/>
+              </a:prstGeom>
+              <a:noFill/>
+              <a:ln w="12700">
+                <a:solidFill>
+                  <a:schemeClr val="accent3">
+                    <a:lumMod val="75000"/>
+                  </a:schemeClr>
+                </a:solidFill>
+                <a:prstDash val="dash"/>
+              </a:ln>
+            </p:spPr>
+            <p:style>
+              <a:lnRef idx="2">
+                <a:schemeClr val="accent1">
+                  <a:shade val="50000"/>
+                </a:schemeClr>
+              </a:lnRef>
+              <a:fillRef idx="1">
+                <a:schemeClr val="accent1"/>
+              </a:fillRef>
+              <a:effectRef idx="0">
+                <a:schemeClr val="accent1"/>
+              </a:effectRef>
+              <a:fontRef idx="minor">
+                <a:schemeClr val="lt1"/>
+              </a:fontRef>
+            </p:style>
+            <p:txBody>
+              <a:bodyPr tIns="91440"/>
+              <a:lstStyle/>
+              <a:p>
+                <a:pPr algn="ctr">
+                  <a:defRPr/>
+                </a:pPr>
+                <a:r>
+                  <a:rPr lang="en-US" sz="900" dirty="0">
+                    <a:solidFill>
+                      <a:schemeClr val="tx1"/>
+                    </a:solidFill>
+                    <a:latin typeface="Amazon Ember" panose="020B0603020204020204" pitchFamily="34" charset="0"/>
+                    <a:ea typeface="Amazon Ember" panose="020B0603020204020204" pitchFamily="34" charset="0"/>
+                    <a:cs typeface="Amazon Ember" panose="020B0603020204020204" pitchFamily="34" charset="0"/>
+                  </a:rPr>
+                  <a:t>scalable </a:t>
+                </a:r>
+              </a:p>
+              <a:p>
+                <a:pPr algn="ctr">
+                  <a:defRPr/>
+                </a:pPr>
+                <a:r>
+                  <a:rPr lang="en-US" sz="900" dirty="0">
+                    <a:solidFill>
+                      <a:schemeClr val="tx1"/>
+                    </a:solidFill>
+                    <a:latin typeface="Amazon Ember" panose="020B0603020204020204" pitchFamily="34" charset="0"/>
+                    <a:ea typeface="Amazon Ember" panose="020B0603020204020204" pitchFamily="34" charset="0"/>
+                    <a:cs typeface="Amazon Ember" panose="020B0603020204020204" pitchFamily="34" charset="0"/>
+                  </a:rPr>
+                  <a:t>data lake</a:t>
+                </a:r>
+              </a:p>
+            </p:txBody>
+          </p:sp>
+          <p:sp>
+            <p:nvSpPr>
+              <p:cNvPr id="14" name="Rectangle 13">
+                <a:extLst>
+                  <a:ext uri="{FF2B5EF4-FFF2-40B4-BE49-F238E27FC236}">
+                    <a16:creationId xmlns:a16="http://schemas.microsoft.com/office/drawing/2014/main" id="{37B57971-04E0-4589-AAFC-18A1E49CAA0E}"/>
+                  </a:ext>
+                </a:extLst>
+              </p:cNvPr>
+              <p:cNvSpPr/>
+              <p:nvPr/>
+            </p:nvSpPr>
+            <p:spPr>
+              <a:xfrm>
+                <a:off x="2912498" y="1334579"/>
+                <a:ext cx="6619199" cy="2641472"/>
+              </a:xfrm>
+              <a:prstGeom prst="rect">
+                <a:avLst/>
+              </a:prstGeom>
+              <a:noFill/>
+              <a:ln w="12700">
+                <a:solidFill>
+                  <a:srgbClr val="141B23"/>
+                </a:solidFill>
+              </a:ln>
+            </p:spPr>
+            <p:style>
+              <a:lnRef idx="2">
+                <a:schemeClr val="accent1">
+                  <a:shade val="50000"/>
+                </a:schemeClr>
+              </a:lnRef>
+              <a:fillRef idx="1">
+                <a:schemeClr val="accent1"/>
+              </a:fillRef>
+              <a:effectRef idx="0">
+                <a:schemeClr val="accent1"/>
+              </a:effectRef>
+              <a:fontRef idx="minor">
+                <a:schemeClr val="lt1"/>
+              </a:fontRef>
+            </p:style>
+            <p:txBody>
+              <a:bodyPr rot="0" spcFirstLastPara="0" vertOverflow="overflow" horzOverflow="overflow" vert="horz" wrap="square" lIns="457200" tIns="91440" rIns="91440" bIns="45720" numCol="1" spcCol="0" rtlCol="0" fromWordArt="0" anchor="t" anchorCtr="0" forceAA="0" compatLnSpc="1">
+                <a:prstTxWarp prst="textNoShape">
+                  <a:avLst/>
+                </a:prstTxWarp>
+                <a:noAutofit/>
+              </a:bodyPr>
+              <a:lstStyle/>
+              <a:p>
+                <a:pPr algn="l"/>
+                <a:r>
+                  <a:rPr lang="en-US" sz="900" dirty="0">
+                    <a:solidFill>
+                      <a:schemeClr val="tx1"/>
+                    </a:solidFill>
+                    <a:latin typeface="Amazon Ember" panose="020B0603020204020204" pitchFamily="34" charset="0"/>
+                    <a:ea typeface="Amazon Ember" panose="020B0603020204020204" pitchFamily="34" charset="0"/>
+                    <a:cs typeface="Amazon Ember" panose="020B0603020204020204" pitchFamily="34" charset="0"/>
+                  </a:rPr>
+                  <a:t>AWS Cloud</a:t>
+                </a:r>
+              </a:p>
+            </p:txBody>
+          </p:sp>
+          <p:sp>
+            <p:nvSpPr>
+              <p:cNvPr id="33" name="Rectangle 32">
+                <a:extLst>
+                  <a:ext uri="{FF2B5EF4-FFF2-40B4-BE49-F238E27FC236}">
+                    <a16:creationId xmlns:a16="http://schemas.microsoft.com/office/drawing/2014/main" id="{327F8349-42CA-3946-16D2-0C29B797B554}"/>
+                  </a:ext>
+                </a:extLst>
+              </p:cNvPr>
+              <p:cNvSpPr/>
+              <p:nvPr/>
+            </p:nvSpPr>
+            <p:spPr>
+              <a:xfrm>
+                <a:off x="1520391" y="1716551"/>
+                <a:ext cx="1210312" cy="1174141"/>
+              </a:xfrm>
+              <a:prstGeom prst="rect">
+                <a:avLst/>
+              </a:prstGeom>
+              <a:noFill/>
+              <a:ln w="12700">
+                <a:solidFill>
+                  <a:srgbClr val="8FA7C4"/>
+                </a:solidFill>
+                <a:prstDash val="dash"/>
+              </a:ln>
+            </p:spPr>
+            <p:style>
+              <a:lnRef idx="2">
+                <a:schemeClr val="accent1">
+                  <a:shade val="50000"/>
+                </a:schemeClr>
+              </a:lnRef>
+              <a:fillRef idx="1">
+                <a:schemeClr val="accent1"/>
+              </a:fillRef>
+              <a:effectRef idx="0">
+                <a:schemeClr val="accent1"/>
+              </a:effectRef>
+              <a:fontRef idx="minor">
+                <a:schemeClr val="lt1"/>
+              </a:fontRef>
+            </p:style>
+            <p:txBody>
+              <a:bodyPr tIns="91440"/>
+              <a:lstStyle/>
+              <a:p>
+                <a:pPr algn="ctr" eaLnBrk="1" fontAlgn="auto" hangingPunct="1">
+                  <a:spcBef>
+                    <a:spcPts val="0"/>
+                  </a:spcBef>
+                  <a:spcAft>
+                    <a:spcPts val="0"/>
+                  </a:spcAft>
+                  <a:defRPr/>
+                </a:pPr>
+                <a:r>
+                  <a:rPr lang="en-US" sz="900" dirty="0">
+                    <a:solidFill>
+                      <a:schemeClr val="tx1"/>
+                    </a:solidFill>
+                    <a:latin typeface="Amazon Ember" panose="020B0603020204020204" pitchFamily="34" charset="0"/>
+                    <a:ea typeface="Amazon Ember" panose="020B0603020204020204" pitchFamily="34" charset="0"/>
+                    <a:cs typeface="Amazon Ember" panose="020B0603020204020204" pitchFamily="34" charset="0"/>
+                  </a:rPr>
+                  <a:t>data sources</a:t>
+                </a:r>
+              </a:p>
+            </p:txBody>
+          </p:sp>
+          <p:sp>
+            <p:nvSpPr>
+              <p:cNvPr id="43" name="TextBox 9">
+                <a:extLst>
+                  <a:ext uri="{FF2B5EF4-FFF2-40B4-BE49-F238E27FC236}">
+                    <a16:creationId xmlns:a16="http://schemas.microsoft.com/office/drawing/2014/main" id="{A4ABF5A5-07FD-B70E-628F-E29BDAAC2BAA}"/>
+                  </a:ext>
+                </a:extLst>
+              </p:cNvPr>
+              <p:cNvSpPr txBox="1">
+                <a:spLocks noChangeArrowheads="1"/>
+              </p:cNvSpPr>
+              <p:nvPr/>
+            </p:nvSpPr>
+            <p:spPr bwMode="auto">
+              <a:xfrm>
+                <a:off x="3259912" y="2510102"/>
+                <a:ext cx="1348796" cy="338554"/>
+              </a:xfrm>
+              <a:prstGeom prst="rect">
+                <a:avLst/>
+              </a:prstGeom>
+              <a:noFill/>
+              <a:ln>
+                <a:noFill/>
+              </a:ln>
+              <a:extLst>
+                <a:ext uri="{909E8E84-426E-40DD-AFC4-6F175D3DCCD1}">
+                  <a14:hiddenFill xmlns:a14="http://schemas.microsoft.com/office/drawing/2010/main">
+                    <a:solidFill>
+                      <a:srgbClr val="FFFFFF"/>
+                    </a:solidFill>
+                  </a14:hiddenFill>
+                </a:ext>
+                <a:ext uri="{91240B29-F687-4F45-9708-019B960494DF}">
+                  <a14:hiddenLine xmlns:a14="http://schemas.microsoft.com/office/drawing/2010/main" w="9525">
+                    <a:solidFill>
+                      <a:srgbClr val="000000"/>
+                    </a:solidFill>
+                    <a:miter lim="800000"/>
+                    <a:headEnd/>
+                    <a:tailEnd/>
+                  </a14:hiddenLine>
+                </a:ext>
+              </a:extLst>
+            </p:spPr>
+            <p:txBody>
+              <a:bodyPr wrap="square">
+                <a:spAutoFit/>
+              </a:bodyPr>
+              <a:lstStyle>
+                <a:lvl1pPr>
+                  <a:defRPr>
+                    <a:solidFill>
+                      <a:schemeClr val="tx1"/>
+                    </a:solidFill>
+                    <a:latin typeface="Calibri" panose="020F0502020204030204" pitchFamily="34" charset="0"/>
+                  </a:defRPr>
+                </a:lvl1pPr>
+                <a:lvl2pPr marL="742950" indent="-285750">
+                  <a:defRPr>
+                    <a:solidFill>
+                      <a:schemeClr val="tx1"/>
+                    </a:solidFill>
+                    <a:latin typeface="Calibri" panose="020F0502020204030204" pitchFamily="34" charset="0"/>
+                  </a:defRPr>
+                </a:lvl2pPr>
+                <a:lvl3pPr marL="1143000" indent="-228600">
+                  <a:defRPr>
+                    <a:solidFill>
+                      <a:schemeClr val="tx1"/>
+                    </a:solidFill>
+                    <a:latin typeface="Calibri" panose="020F0502020204030204" pitchFamily="34" charset="0"/>
+                  </a:defRPr>
+                </a:lvl3pPr>
+                <a:lvl4pPr marL="1600200" indent="-228600">
+                  <a:defRPr>
+                    <a:solidFill>
+                      <a:schemeClr val="tx1"/>
+                    </a:solidFill>
+                    <a:latin typeface="Calibri" panose="020F0502020204030204" pitchFamily="34" charset="0"/>
+                  </a:defRPr>
+                </a:lvl4pPr>
+                <a:lvl5pPr marL="2057400" indent="-228600">
+                  <a:defRPr>
+                    <a:solidFill>
+                      <a:schemeClr val="tx1"/>
+                    </a:solidFill>
+                    <a:latin typeface="Calibri" panose="020F0502020204030204" pitchFamily="34" charset="0"/>
+                  </a:defRPr>
+                </a:lvl5pPr>
+                <a:lvl6pPr marL="2514600" indent="-228600" eaLnBrk="0" fontAlgn="base" hangingPunct="0">
+                  <a:spcBef>
+                    <a:spcPct val="0"/>
+                  </a:spcBef>
+                  <a:spcAft>
+                    <a:spcPct val="0"/>
+                  </a:spcAft>
+                  <a:defRPr>
+                    <a:solidFill>
+                      <a:schemeClr val="tx1"/>
+                    </a:solidFill>
+                    <a:latin typeface="Calibri" panose="020F0502020204030204" pitchFamily="34" charset="0"/>
+                  </a:defRPr>
+                </a:lvl6pPr>
+                <a:lvl7pPr marL="2971800" indent="-228600" eaLnBrk="0" fontAlgn="base" hangingPunct="0">
+                  <a:spcBef>
+                    <a:spcPct val="0"/>
+                  </a:spcBef>
+                  <a:spcAft>
+                    <a:spcPct val="0"/>
+                  </a:spcAft>
+                  <a:defRPr>
+                    <a:solidFill>
+                      <a:schemeClr val="tx1"/>
+                    </a:solidFill>
+                    <a:latin typeface="Calibri" panose="020F0502020204030204" pitchFamily="34" charset="0"/>
+                  </a:defRPr>
+                </a:lvl7pPr>
+                <a:lvl8pPr marL="3429000" indent="-228600" eaLnBrk="0" fontAlgn="base" hangingPunct="0">
+                  <a:spcBef>
+                    <a:spcPct val="0"/>
+                  </a:spcBef>
+                  <a:spcAft>
+                    <a:spcPct val="0"/>
+                  </a:spcAft>
+                  <a:defRPr>
+                    <a:solidFill>
+                      <a:schemeClr val="tx1"/>
+                    </a:solidFill>
+                    <a:latin typeface="Calibri" panose="020F0502020204030204" pitchFamily="34" charset="0"/>
+                  </a:defRPr>
+                </a:lvl8pPr>
+                <a:lvl9pPr marL="3886200" indent="-228600" eaLnBrk="0" fontAlgn="base" hangingPunct="0">
+                  <a:spcBef>
+                    <a:spcPct val="0"/>
+                  </a:spcBef>
+                  <a:spcAft>
+                    <a:spcPct val="0"/>
+                  </a:spcAft>
+                  <a:defRPr>
+                    <a:solidFill>
+                      <a:schemeClr val="tx1"/>
+                    </a:solidFill>
+                    <a:latin typeface="Calibri" panose="020F0502020204030204" pitchFamily="34" charset="0"/>
+                  </a:defRPr>
+                </a:lvl9pPr>
+              </a:lstStyle>
+              <a:p>
+                <a:pPr algn="ctr" eaLnBrk="1" hangingPunct="1"/>
+                <a:r>
+                  <a:rPr lang="en-US" altLang="en-US" sz="800" dirty="0">
+                    <a:latin typeface="Amazon Ember" panose="020B0603020204020204" pitchFamily="34" charset="0"/>
+                    <a:ea typeface="Amazon Ember" panose="020B0603020204020204" pitchFamily="34" charset="0"/>
+                    <a:cs typeface="Amazon Ember" panose="020B0603020204020204" pitchFamily="34" charset="0"/>
+                  </a:rPr>
+                  <a:t>Amazon Simple Storage Service (Amazon S3)</a:t>
+                </a:r>
+              </a:p>
+            </p:txBody>
+          </p:sp>
+          <p:sp>
+            <p:nvSpPr>
+              <p:cNvPr id="49" name="Rectangle 48">
+                <a:extLst>
+                  <a:ext uri="{FF2B5EF4-FFF2-40B4-BE49-F238E27FC236}">
+                    <a16:creationId xmlns:a16="http://schemas.microsoft.com/office/drawing/2014/main" id="{83715A85-D193-DFF0-4F16-1C08AB61D9EA}"/>
+                  </a:ext>
+                </a:extLst>
+              </p:cNvPr>
+              <p:cNvSpPr/>
+              <p:nvPr/>
+            </p:nvSpPr>
+            <p:spPr>
+              <a:xfrm>
+                <a:off x="6815546" y="1716550"/>
+                <a:ext cx="2589994" cy="1057152"/>
+              </a:xfrm>
+              <a:prstGeom prst="rect">
+                <a:avLst/>
+              </a:prstGeom>
+              <a:noFill/>
+              <a:ln w="12700">
+                <a:solidFill>
+                  <a:schemeClr val="accent3">
+                    <a:lumMod val="75000"/>
+                  </a:schemeClr>
+                </a:solidFill>
+                <a:prstDash val="dash"/>
+              </a:ln>
+            </p:spPr>
+            <p:style>
+              <a:lnRef idx="2">
+                <a:schemeClr val="accent1">
+                  <a:shade val="50000"/>
+                </a:schemeClr>
+              </a:lnRef>
+              <a:fillRef idx="1">
+                <a:schemeClr val="accent1"/>
+              </a:fillRef>
+              <a:effectRef idx="0">
+                <a:schemeClr val="accent1"/>
+              </a:effectRef>
+              <a:fontRef idx="minor">
+                <a:schemeClr val="lt1"/>
+              </a:fontRef>
+            </p:style>
+            <p:txBody>
+              <a:bodyPr tIns="91440"/>
+              <a:lstStyle/>
+              <a:p>
+                <a:pPr eaLnBrk="1" fontAlgn="auto" hangingPunct="1">
+                  <a:spcBef>
+                    <a:spcPts val="0"/>
+                  </a:spcBef>
+                  <a:spcAft>
+                    <a:spcPts val="0"/>
+                  </a:spcAft>
+                  <a:defRPr/>
+                </a:pPr>
+                <a:r>
+                  <a:rPr lang="en-US" sz="900" dirty="0">
+                    <a:solidFill>
+                      <a:schemeClr val="tx1"/>
+                    </a:solidFill>
+                    <a:latin typeface="Amazon Ember" panose="020B0603020204020204" pitchFamily="34" charset="0"/>
+                    <a:ea typeface="Amazon Ember" panose="020B0603020204020204" pitchFamily="34" charset="0"/>
+                    <a:cs typeface="Amazon Ember" panose="020B0603020204020204" pitchFamily="34" charset="0"/>
+                  </a:rPr>
+                  <a:t>     purpose-built analytics and </a:t>
+                </a:r>
+                <a:r>
+                  <a:rPr lang="en-US" sz="900" dirty="0" err="1">
+                    <a:solidFill>
+                      <a:schemeClr val="tx1"/>
+                    </a:solidFill>
+                    <a:latin typeface="Amazon Ember" panose="020B0603020204020204" pitchFamily="34" charset="0"/>
+                    <a:ea typeface="Amazon Ember" panose="020B0603020204020204" pitchFamily="34" charset="0"/>
+                    <a:cs typeface="Amazon Ember" panose="020B0603020204020204" pitchFamily="34" charset="0"/>
+                  </a:rPr>
+                  <a:t>visualisation</a:t>
+                </a:r>
+                <a:endParaRPr lang="en-US" sz="900" dirty="0">
+                  <a:solidFill>
+                    <a:schemeClr val="tx1"/>
+                  </a:solidFill>
+                  <a:latin typeface="Amazon Ember" panose="020B0603020204020204" pitchFamily="34" charset="0"/>
+                  <a:ea typeface="Amazon Ember" panose="020B0603020204020204" pitchFamily="34" charset="0"/>
+                  <a:cs typeface="Amazon Ember" panose="020B0603020204020204" pitchFamily="34" charset="0"/>
+                </a:endParaRPr>
+              </a:p>
+            </p:txBody>
+          </p:sp>
+          <p:cxnSp>
+            <p:nvCxnSpPr>
+              <p:cNvPr id="52" name="Straight Arrow Connector 51">
+                <a:extLst>
+                  <a:ext uri="{FF2B5EF4-FFF2-40B4-BE49-F238E27FC236}">
+                    <a16:creationId xmlns:a16="http://schemas.microsoft.com/office/drawing/2014/main" id="{C7AD2974-66CC-6B4C-35C0-B9330367E896}"/>
+                  </a:ext>
+                </a:extLst>
+              </p:cNvPr>
+              <p:cNvCxnSpPr>
+                <a:cxnSpLocks/>
+                <a:stCxn id="63" idx="3"/>
+                <a:endCxn id="49" idx="1"/>
+              </p:cNvCxnSpPr>
+              <p:nvPr/>
+            </p:nvCxnSpPr>
+            <p:spPr>
+              <a:xfrm flipV="1">
+                <a:off x="6319269" y="2245127"/>
+                <a:ext cx="496277" cy="1"/>
+              </a:xfrm>
+              <a:prstGeom prst="straightConnector1">
+                <a:avLst/>
+              </a:prstGeom>
+              <a:ln w="12700" cap="flat" cmpd="sng" algn="ctr">
+                <a:solidFill>
+                  <a:schemeClr val="dk1"/>
+                </a:solidFill>
+                <a:prstDash val="solid"/>
+                <a:round/>
+                <a:headEnd type="arrow" w="med" len="med"/>
+                <a:tailEnd type="arrow" w="med" len="med"/>
+              </a:ln>
+            </p:spPr>
+            <p:style>
+              <a:lnRef idx="0">
+                <a:scrgbClr r="0" g="0" b="0"/>
+              </a:lnRef>
+              <a:fillRef idx="0">
+                <a:scrgbClr r="0" g="0" b="0"/>
+              </a:fillRef>
+              <a:effectRef idx="0">
+                <a:scrgbClr r="0" g="0" b="0"/>
+              </a:effectRef>
+              <a:fontRef idx="minor">
+                <a:schemeClr val="tx1"/>
+              </a:fontRef>
+            </p:style>
+          </p:cxnSp>
+          <p:cxnSp>
+            <p:nvCxnSpPr>
+              <p:cNvPr id="60" name="Straight Arrow Connector 59">
+                <a:extLst>
+                  <a:ext uri="{FF2B5EF4-FFF2-40B4-BE49-F238E27FC236}">
+                    <a16:creationId xmlns:a16="http://schemas.microsoft.com/office/drawing/2014/main" id="{D2482826-1086-33CB-8C2A-019A61D1D4BB}"/>
+                  </a:ext>
+                </a:extLst>
+              </p:cNvPr>
+              <p:cNvCxnSpPr>
+                <a:cxnSpLocks/>
+                <a:stCxn id="89" idx="3"/>
+                <a:endCxn id="109" idx="1"/>
+              </p:cNvCxnSpPr>
+              <p:nvPr/>
+            </p:nvCxnSpPr>
+            <p:spPr>
+              <a:xfrm>
+                <a:off x="2253612" y="2357865"/>
+                <a:ext cx="1535689" cy="4131"/>
+              </a:xfrm>
+              <a:prstGeom prst="straightConnector1">
+                <a:avLst/>
+              </a:prstGeom>
+              <a:ln w="12700" cap="flat" cmpd="sng" algn="ctr">
+                <a:solidFill>
+                  <a:schemeClr val="dk1"/>
+                </a:solidFill>
+                <a:prstDash val="solid"/>
+                <a:round/>
+                <a:headEnd type="none" w="med" len="med"/>
+                <a:tailEnd type="arrow" w="med" len="med"/>
+              </a:ln>
+            </p:spPr>
+            <p:style>
+              <a:lnRef idx="0">
+                <a:scrgbClr r="0" g="0" b="0"/>
+              </a:lnRef>
+              <a:fillRef idx="0">
+                <a:scrgbClr r="0" g="0" b="0"/>
+              </a:fillRef>
+              <a:effectRef idx="0">
+                <a:scrgbClr r="0" g="0" b="0"/>
+              </a:effectRef>
+              <a:fontRef idx="minor">
+                <a:schemeClr val="tx1"/>
+              </a:fontRef>
+            </p:style>
+          </p:cxnSp>
+          <p:pic>
+            <p:nvPicPr>
+              <p:cNvPr id="61" name="Graphic 6">
+                <a:extLst>
+                  <a:ext uri="{FF2B5EF4-FFF2-40B4-BE49-F238E27FC236}">
+                    <a16:creationId xmlns:a16="http://schemas.microsoft.com/office/drawing/2014/main" id="{FA1705E6-6CB0-C057-9709-08D4E7AF513B}"/>
+                  </a:ext>
+                </a:extLst>
+              </p:cNvPr>
+              <p:cNvPicPr>
+                <a:picLocks noChangeAspect="1" noChangeArrowheads="1"/>
+              </p:cNvPicPr>
+              <p:nvPr/>
+            </p:nvPicPr>
+            <p:blipFill>
+              <a:blip r:embed="rId12" cstate="print">
+                <a:extLst>
+                  <a:ext uri="{28A0092B-C50C-407E-A947-70E740481C1C}">
+                    <a14:useLocalDpi xmlns:a14="http://schemas.microsoft.com/office/drawing/2010/main" val="0"/>
+                  </a:ext>
+                </a:extLst>
+              </a:blip>
+              <a:srcRect/>
+              <a:stretch>
+                <a:fillRect/>
+              </a:stretch>
+            </p:blipFill>
+            <p:spPr bwMode="auto">
+              <a:xfrm>
+                <a:off x="5660480" y="2219082"/>
+                <a:ext cx="290019" cy="292594"/>
+              </a:xfrm>
+              <a:prstGeom prst="rect">
+                <a:avLst/>
+              </a:prstGeom>
+              <a:noFill/>
+              <a:ln>
+                <a:noFill/>
+              </a:ln>
+              <a:extLst>
+                <a:ext uri="{909E8E84-426E-40DD-AFC4-6F175D3DCCD1}">
+                  <a14:hiddenFill xmlns:a14="http://schemas.microsoft.com/office/drawing/2010/main">
+                    <a:solidFill>
+                      <a:srgbClr val="FFFFFF"/>
+                    </a:solidFill>
+                  </a14:hiddenFill>
+                </a:ext>
+                <a:ext uri="{91240B29-F687-4F45-9708-019B960494DF}">
+                  <a14:hiddenLine xmlns:a14="http://schemas.microsoft.com/office/drawing/2010/main" w="9525">
+                    <a:solidFill>
+                      <a:srgbClr val="000000"/>
+                    </a:solidFill>
+                    <a:miter lim="800000"/>
+                    <a:headEnd/>
+                    <a:tailEnd/>
+                  </a14:hiddenLine>
+                </a:ext>
+              </a:extLst>
+            </p:spPr>
+          </p:pic>
+          <p:sp>
+            <p:nvSpPr>
+              <p:cNvPr id="62" name="TextBox 10">
+                <a:extLst>
+                  <a:ext uri="{FF2B5EF4-FFF2-40B4-BE49-F238E27FC236}">
+                    <a16:creationId xmlns:a16="http://schemas.microsoft.com/office/drawing/2014/main" id="{C5D98B8D-10A1-7DCA-38BB-B22989A9FCA8}"/>
+                  </a:ext>
+                </a:extLst>
+              </p:cNvPr>
+              <p:cNvSpPr txBox="1">
+                <a:spLocks noChangeArrowheads="1"/>
+              </p:cNvSpPr>
+              <p:nvPr/>
+            </p:nvSpPr>
+            <p:spPr bwMode="auto">
+              <a:xfrm>
+                <a:off x="5349606" y="2548362"/>
+                <a:ext cx="922790" cy="229796"/>
+              </a:xfrm>
+              <a:prstGeom prst="rect">
+                <a:avLst/>
+              </a:prstGeom>
+              <a:noFill/>
+              <a:ln>
+                <a:noFill/>
+              </a:ln>
+              <a:extLst>
+                <a:ext uri="{909E8E84-426E-40DD-AFC4-6F175D3DCCD1}">
+                  <a14:hiddenFill xmlns:a14="http://schemas.microsoft.com/office/drawing/2010/main">
+                    <a:solidFill>
+                      <a:srgbClr val="FFFFFF"/>
+                    </a:solidFill>
+                  </a14:hiddenFill>
+                </a:ext>
+                <a:ext uri="{91240B29-F687-4F45-9708-019B960494DF}">
+                  <a14:hiddenLine xmlns:a14="http://schemas.microsoft.com/office/drawing/2010/main" w="9525">
+                    <a:solidFill>
+                      <a:srgbClr val="000000"/>
+                    </a:solidFill>
+                    <a:miter lim="800000"/>
+                    <a:headEnd/>
+                    <a:tailEnd/>
+                  </a14:hiddenLine>
+                </a:ext>
+              </a:extLst>
+            </p:spPr>
+            <p:txBody>
+              <a:bodyPr wrap="square">
+                <a:spAutoFit/>
+              </a:bodyPr>
+              <a:lstStyle>
+                <a:lvl1pPr>
+                  <a:defRPr>
+                    <a:solidFill>
+                      <a:schemeClr val="tx1"/>
+                    </a:solidFill>
+                    <a:latin typeface="Calibri" panose="020F0502020204030204" pitchFamily="34" charset="0"/>
+                  </a:defRPr>
+                </a:lvl1pPr>
+                <a:lvl2pPr marL="742950" indent="-285750">
+                  <a:defRPr>
+                    <a:solidFill>
+                      <a:schemeClr val="tx1"/>
+                    </a:solidFill>
+                    <a:latin typeface="Calibri" panose="020F0502020204030204" pitchFamily="34" charset="0"/>
+                  </a:defRPr>
+                </a:lvl2pPr>
+                <a:lvl3pPr marL="1143000" indent="-228600">
+                  <a:defRPr>
+                    <a:solidFill>
+                      <a:schemeClr val="tx1"/>
+                    </a:solidFill>
+                    <a:latin typeface="Calibri" panose="020F0502020204030204" pitchFamily="34" charset="0"/>
+                  </a:defRPr>
+                </a:lvl3pPr>
+                <a:lvl4pPr marL="1600200" indent="-228600">
+                  <a:defRPr>
+                    <a:solidFill>
+                      <a:schemeClr val="tx1"/>
+                    </a:solidFill>
+                    <a:latin typeface="Calibri" panose="020F0502020204030204" pitchFamily="34" charset="0"/>
+                  </a:defRPr>
+                </a:lvl4pPr>
+                <a:lvl5pPr marL="2057400" indent="-228600">
+                  <a:defRPr>
+                    <a:solidFill>
+                      <a:schemeClr val="tx1"/>
+                    </a:solidFill>
+                    <a:latin typeface="Calibri" panose="020F0502020204030204" pitchFamily="34" charset="0"/>
+                  </a:defRPr>
+                </a:lvl5pPr>
+                <a:lvl6pPr marL="2514600" indent="-228600" eaLnBrk="0" fontAlgn="base" hangingPunct="0">
+                  <a:spcBef>
+                    <a:spcPct val="0"/>
+                  </a:spcBef>
+                  <a:spcAft>
+                    <a:spcPct val="0"/>
+                  </a:spcAft>
+                  <a:defRPr>
+                    <a:solidFill>
+                      <a:schemeClr val="tx1"/>
+                    </a:solidFill>
+                    <a:latin typeface="Calibri" panose="020F0502020204030204" pitchFamily="34" charset="0"/>
+                  </a:defRPr>
+                </a:lvl6pPr>
+                <a:lvl7pPr marL="2971800" indent="-228600" eaLnBrk="0" fontAlgn="base" hangingPunct="0">
+                  <a:spcBef>
+                    <a:spcPct val="0"/>
+                  </a:spcBef>
+                  <a:spcAft>
+                    <a:spcPct val="0"/>
+                  </a:spcAft>
+                  <a:defRPr>
+                    <a:solidFill>
+                      <a:schemeClr val="tx1"/>
+                    </a:solidFill>
+                    <a:latin typeface="Calibri" panose="020F0502020204030204" pitchFamily="34" charset="0"/>
+                  </a:defRPr>
+                </a:lvl7pPr>
+                <a:lvl8pPr marL="3429000" indent="-228600" eaLnBrk="0" fontAlgn="base" hangingPunct="0">
+                  <a:spcBef>
+                    <a:spcPct val="0"/>
+                  </a:spcBef>
+                  <a:spcAft>
+                    <a:spcPct val="0"/>
+                  </a:spcAft>
+                  <a:defRPr>
+                    <a:solidFill>
+                      <a:schemeClr val="tx1"/>
+                    </a:solidFill>
+                    <a:latin typeface="Calibri" panose="020F0502020204030204" pitchFamily="34" charset="0"/>
+                  </a:defRPr>
+                </a:lvl8pPr>
+                <a:lvl9pPr marL="3886200" indent="-228600" eaLnBrk="0" fontAlgn="base" hangingPunct="0">
+                  <a:spcBef>
+                    <a:spcPct val="0"/>
+                  </a:spcBef>
+                  <a:spcAft>
+                    <a:spcPct val="0"/>
+                  </a:spcAft>
+                  <a:defRPr>
+                    <a:solidFill>
+                      <a:schemeClr val="tx1"/>
+                    </a:solidFill>
+                    <a:latin typeface="Calibri" panose="020F0502020204030204" pitchFamily="34" charset="0"/>
+                  </a:defRPr>
+                </a:lvl9pPr>
+              </a:lstStyle>
+              <a:p>
+                <a:pPr algn="ctr" eaLnBrk="1" hangingPunct="1"/>
+                <a:r>
+                  <a:rPr lang="en-US" altLang="en-US" sz="800" dirty="0">
+                    <a:latin typeface="Amazon Ember" panose="020B0603020204020204" pitchFamily="34" charset="0"/>
+                    <a:ea typeface="Amazon Ember" panose="020B0603020204020204" pitchFamily="34" charset="0"/>
+                    <a:cs typeface="Amazon Ember" panose="020B0603020204020204" pitchFamily="34" charset="0"/>
+                  </a:rPr>
+                  <a:t>AWS Glue</a:t>
+                </a:r>
+              </a:p>
+            </p:txBody>
+          </p:sp>
+          <p:sp>
+            <p:nvSpPr>
+              <p:cNvPr id="63" name="Rectangle 62">
+                <a:extLst>
+                  <a:ext uri="{FF2B5EF4-FFF2-40B4-BE49-F238E27FC236}">
+                    <a16:creationId xmlns:a16="http://schemas.microsoft.com/office/drawing/2014/main" id="{FBA1EA38-0E44-CCFD-3F57-100384F93C01}"/>
+                  </a:ext>
+                </a:extLst>
+              </p:cNvPr>
+              <p:cNvSpPr/>
+              <p:nvPr/>
+            </p:nvSpPr>
+            <p:spPr>
+              <a:xfrm>
+                <a:off x="5299323" y="1716551"/>
+                <a:ext cx="1019946" cy="1057152"/>
+              </a:xfrm>
+              <a:prstGeom prst="rect">
+                <a:avLst/>
+              </a:prstGeom>
+              <a:noFill/>
+              <a:ln w="12700">
+                <a:solidFill>
+                  <a:schemeClr val="accent3">
+                    <a:lumMod val="75000"/>
+                  </a:schemeClr>
+                </a:solidFill>
+                <a:prstDash val="dash"/>
+              </a:ln>
+            </p:spPr>
+            <p:style>
+              <a:lnRef idx="2">
+                <a:schemeClr val="accent1">
+                  <a:shade val="50000"/>
+                </a:schemeClr>
+              </a:lnRef>
+              <a:fillRef idx="1">
+                <a:schemeClr val="accent1"/>
+              </a:fillRef>
+              <a:effectRef idx="0">
+                <a:schemeClr val="accent1"/>
+              </a:effectRef>
+              <a:fontRef idx="minor">
+                <a:schemeClr val="lt1"/>
+              </a:fontRef>
+            </p:style>
+            <p:txBody>
+              <a:bodyPr tIns="91440"/>
+              <a:lstStyle/>
+              <a:p>
+                <a:pPr algn="ctr" eaLnBrk="1" fontAlgn="auto" hangingPunct="1">
+                  <a:spcBef>
+                    <a:spcPts val="0"/>
+                  </a:spcBef>
+                  <a:spcAft>
+                    <a:spcPts val="0"/>
+                  </a:spcAft>
+                  <a:defRPr/>
+                </a:pPr>
+                <a:r>
+                  <a:rPr lang="en-US" sz="900" dirty="0">
+                    <a:solidFill>
+                      <a:schemeClr val="tx1"/>
+                    </a:solidFill>
+                    <a:latin typeface="Amazon Ember" panose="020B0603020204020204" pitchFamily="34" charset="0"/>
+                    <a:ea typeface="Amazon Ember" panose="020B0603020204020204" pitchFamily="34" charset="0"/>
+                    <a:cs typeface="Amazon Ember" panose="020B0603020204020204" pitchFamily="34" charset="0"/>
+                  </a:rPr>
+                  <a:t>seamless data movement</a:t>
+                </a:r>
+              </a:p>
+            </p:txBody>
+          </p:sp>
+          <p:cxnSp>
+            <p:nvCxnSpPr>
+              <p:cNvPr id="88" name="Straight Arrow Connector 87">
+                <a:extLst>
+                  <a:ext uri="{FF2B5EF4-FFF2-40B4-BE49-F238E27FC236}">
+                    <a16:creationId xmlns:a16="http://schemas.microsoft.com/office/drawing/2014/main" id="{9DBE6A20-92E5-5285-C66F-B0ED51ADA7E0}"/>
+                  </a:ext>
+                </a:extLst>
+              </p:cNvPr>
+              <p:cNvCxnSpPr>
+                <a:cxnSpLocks/>
+                <a:stCxn id="13" idx="3"/>
+                <a:endCxn id="63" idx="1"/>
+              </p:cNvCxnSpPr>
+              <p:nvPr/>
+            </p:nvCxnSpPr>
+            <p:spPr>
+              <a:xfrm flipV="1">
+                <a:off x="4809007" y="2245128"/>
+                <a:ext cx="490316" cy="528575"/>
+              </a:xfrm>
+              <a:prstGeom prst="straightConnector1">
+                <a:avLst/>
+              </a:prstGeom>
+              <a:ln w="12700" cap="flat" cmpd="sng" algn="ctr">
+                <a:solidFill>
+                  <a:schemeClr val="dk1"/>
+                </a:solidFill>
+                <a:prstDash val="solid"/>
+                <a:round/>
+                <a:headEnd type="arrow" w="med" len="med"/>
+                <a:tailEnd type="arrow" w="med" len="med"/>
+              </a:ln>
+            </p:spPr>
+            <p:style>
+              <a:lnRef idx="0">
+                <a:scrgbClr r="0" g="0" b="0"/>
+              </a:lnRef>
+              <a:fillRef idx="0">
+                <a:scrgbClr r="0" g="0" b="0"/>
+              </a:fillRef>
+              <a:effectRef idx="0">
+                <a:scrgbClr r="0" g="0" b="0"/>
+              </a:effectRef>
+              <a:fontRef idx="minor">
+                <a:schemeClr val="tx1"/>
+              </a:fontRef>
+            </p:style>
+          </p:cxnSp>
+          <p:pic>
+            <p:nvPicPr>
+              <p:cNvPr id="89" name="Graphic 88" descr="Document">
+                <a:extLst>
+                  <a:ext uri="{FF2B5EF4-FFF2-40B4-BE49-F238E27FC236}">
+                    <a16:creationId xmlns:a16="http://schemas.microsoft.com/office/drawing/2014/main" id="{B2B4B710-8B4C-A073-9822-A887B633A992}"/>
+                  </a:ext>
+                </a:extLst>
+              </p:cNvPr>
+              <p:cNvPicPr>
+                <a:picLocks noChangeAspect="1"/>
+              </p:cNvPicPr>
+              <p:nvPr/>
+            </p:nvPicPr>
+            <p:blipFill>
+              <a:blip r:embed="rId13">
+                <a:extLst>
+                  <a:ext uri="{28A0092B-C50C-407E-A947-70E740481C1C}">
+                    <a14:useLocalDpi xmlns:a14="http://schemas.microsoft.com/office/drawing/2010/main" val="0"/>
+                  </a:ext>
+                  <a:ext uri="{96DAC541-7B7A-43D3-8B79-37D633B846F1}">
+                    <asvg:svgBlip xmlns:asvg="http://schemas.microsoft.com/office/drawing/2016/SVG/main" r:embed="rId14"/>
+                  </a:ext>
+                </a:extLst>
+              </a:blip>
+              <a:stretch>
+                <a:fillRect/>
+              </a:stretch>
+            </p:blipFill>
+            <p:spPr>
+              <a:xfrm>
+                <a:off x="1963593" y="2211569"/>
+                <a:ext cx="290019" cy="292594"/>
+              </a:xfrm>
+              <a:prstGeom prst="rect">
+                <a:avLst/>
+              </a:prstGeom>
+            </p:spPr>
+          </p:pic>
+          <p:sp>
+            <p:nvSpPr>
+              <p:cNvPr id="90" name="TextBox 30">
+                <a:extLst>
+                  <a:ext uri="{FF2B5EF4-FFF2-40B4-BE49-F238E27FC236}">
+                    <a16:creationId xmlns:a16="http://schemas.microsoft.com/office/drawing/2014/main" id="{D03C1D07-EF7D-8B98-DBF7-9757331F7AC9}"/>
+                  </a:ext>
+                </a:extLst>
+              </p:cNvPr>
+              <p:cNvSpPr txBox="1">
+                <a:spLocks noChangeArrowheads="1"/>
+              </p:cNvSpPr>
+              <p:nvPr/>
+            </p:nvSpPr>
+            <p:spPr bwMode="auto">
+              <a:xfrm>
+                <a:off x="1675269" y="2489356"/>
+                <a:ext cx="866669" cy="230832"/>
+              </a:xfrm>
+              <a:prstGeom prst="rect">
+                <a:avLst/>
+              </a:prstGeom>
+              <a:noFill/>
+              <a:ln>
+                <a:noFill/>
+              </a:ln>
+              <a:extLst>
+                <a:ext uri="{909E8E84-426E-40DD-AFC4-6F175D3DCCD1}">
+                  <a14:hiddenFill xmlns:a14="http://schemas.microsoft.com/office/drawing/2010/main">
+                    <a:solidFill>
+                      <a:srgbClr val="FFFFFF"/>
+                    </a:solidFill>
+                  </a14:hiddenFill>
+                </a:ext>
+                <a:ext uri="{91240B29-F687-4F45-9708-019B960494DF}">
+                  <a14:hiddenLine xmlns:a14="http://schemas.microsoft.com/office/drawing/2010/main" w="9525">
+                    <a:solidFill>
+                      <a:srgbClr val="000000"/>
+                    </a:solidFill>
+                    <a:miter lim="800000"/>
+                    <a:headEnd/>
+                    <a:tailEnd/>
+                  </a14:hiddenLine>
+                </a:ext>
+              </a:extLst>
+            </p:spPr>
+            <p:txBody>
+              <a:bodyPr wrap="square">
+                <a:spAutoFit/>
+              </a:bodyPr>
+              <a:lstStyle>
+                <a:lvl1pPr>
+                  <a:defRPr>
+                    <a:solidFill>
+                      <a:schemeClr val="tx1"/>
+                    </a:solidFill>
+                    <a:latin typeface="Calibri" panose="020F0502020204030204" pitchFamily="34" charset="0"/>
+                  </a:defRPr>
+                </a:lvl1pPr>
+                <a:lvl2pPr marL="742950" indent="-285750">
+                  <a:defRPr>
+                    <a:solidFill>
+                      <a:schemeClr val="tx1"/>
+                    </a:solidFill>
+                    <a:latin typeface="Calibri" panose="020F0502020204030204" pitchFamily="34" charset="0"/>
+                  </a:defRPr>
+                </a:lvl2pPr>
+                <a:lvl3pPr marL="1143000" indent="-228600">
+                  <a:defRPr>
+                    <a:solidFill>
+                      <a:schemeClr val="tx1"/>
+                    </a:solidFill>
+                    <a:latin typeface="Calibri" panose="020F0502020204030204" pitchFamily="34" charset="0"/>
+                  </a:defRPr>
+                </a:lvl3pPr>
+                <a:lvl4pPr marL="1600200" indent="-228600">
+                  <a:defRPr>
+                    <a:solidFill>
+                      <a:schemeClr val="tx1"/>
+                    </a:solidFill>
+                    <a:latin typeface="Calibri" panose="020F0502020204030204" pitchFamily="34" charset="0"/>
+                  </a:defRPr>
+                </a:lvl4pPr>
+                <a:lvl5pPr marL="2057400" indent="-228600">
+                  <a:defRPr>
+                    <a:solidFill>
+                      <a:schemeClr val="tx1"/>
+                    </a:solidFill>
+                    <a:latin typeface="Calibri" panose="020F0502020204030204" pitchFamily="34" charset="0"/>
+                  </a:defRPr>
+                </a:lvl5pPr>
+                <a:lvl6pPr marL="2514600" indent="-228600" eaLnBrk="0" fontAlgn="base" hangingPunct="0">
+                  <a:spcBef>
+                    <a:spcPct val="0"/>
+                  </a:spcBef>
+                  <a:spcAft>
+                    <a:spcPct val="0"/>
+                  </a:spcAft>
+                  <a:defRPr>
+                    <a:solidFill>
+                      <a:schemeClr val="tx1"/>
+                    </a:solidFill>
+                    <a:latin typeface="Calibri" panose="020F0502020204030204" pitchFamily="34" charset="0"/>
+                  </a:defRPr>
+                </a:lvl6pPr>
+                <a:lvl7pPr marL="2971800" indent="-228600" eaLnBrk="0" fontAlgn="base" hangingPunct="0">
+                  <a:spcBef>
+                    <a:spcPct val="0"/>
+                  </a:spcBef>
+                  <a:spcAft>
+                    <a:spcPct val="0"/>
+                  </a:spcAft>
+                  <a:defRPr>
+                    <a:solidFill>
+                      <a:schemeClr val="tx1"/>
+                    </a:solidFill>
+                    <a:latin typeface="Calibri" panose="020F0502020204030204" pitchFamily="34" charset="0"/>
+                  </a:defRPr>
+                </a:lvl7pPr>
+                <a:lvl8pPr marL="3429000" indent="-228600" eaLnBrk="0" fontAlgn="base" hangingPunct="0">
+                  <a:spcBef>
+                    <a:spcPct val="0"/>
+                  </a:spcBef>
+                  <a:spcAft>
+                    <a:spcPct val="0"/>
+                  </a:spcAft>
+                  <a:defRPr>
+                    <a:solidFill>
+                      <a:schemeClr val="tx1"/>
+                    </a:solidFill>
+                    <a:latin typeface="Calibri" panose="020F0502020204030204" pitchFamily="34" charset="0"/>
+                  </a:defRPr>
+                </a:lvl8pPr>
+                <a:lvl9pPr marL="3886200" indent="-228600" eaLnBrk="0" fontAlgn="base" hangingPunct="0">
+                  <a:spcBef>
+                    <a:spcPct val="0"/>
+                  </a:spcBef>
+                  <a:spcAft>
+                    <a:spcPct val="0"/>
+                  </a:spcAft>
+                  <a:defRPr>
+                    <a:solidFill>
+                      <a:schemeClr val="tx1"/>
+                    </a:solidFill>
+                    <a:latin typeface="Calibri" panose="020F0502020204030204" pitchFamily="34" charset="0"/>
+                  </a:defRPr>
+                </a:lvl9pPr>
+              </a:lstStyle>
+              <a:p>
+                <a:pPr algn="ctr" eaLnBrk="1" hangingPunct="1"/>
+                <a:r>
+                  <a:rPr lang="en-US" altLang="en-US" sz="900" dirty="0">
+                    <a:latin typeface="Amazon Ember" panose="020B0603020204020204" pitchFamily="34" charset="0"/>
+                    <a:ea typeface="Amazon Ember" panose="020B0603020204020204" pitchFamily="34" charset="0"/>
+                    <a:cs typeface="Amazon Ember" panose="020B0603020204020204" pitchFamily="34" charset="0"/>
+                  </a:rPr>
+                  <a:t>CSV files</a:t>
+                </a:r>
+              </a:p>
+            </p:txBody>
+          </p:sp>
+          <p:pic>
+            <p:nvPicPr>
+              <p:cNvPr id="99" name="Graphic 98">
+                <a:extLst>
+                  <a:ext uri="{FF2B5EF4-FFF2-40B4-BE49-F238E27FC236}">
+                    <a16:creationId xmlns:a16="http://schemas.microsoft.com/office/drawing/2014/main" id="{4B6FC9D8-8ACE-99EE-1DE9-D50CC492C4F6}"/>
+                  </a:ext>
+                </a:extLst>
+              </p:cNvPr>
+              <p:cNvPicPr>
+                <a:picLocks noChangeAspect="1"/>
+              </p:cNvPicPr>
+              <p:nvPr/>
+            </p:nvPicPr>
+            <p:blipFill>
+              <a:blip r:embed="rId15">
+                <a:extLst>
+                  <a:ext uri="{96DAC541-7B7A-43D3-8B79-37D633B846F1}">
+                    <asvg:svgBlip xmlns:asvg="http://schemas.microsoft.com/office/drawing/2016/SVG/main" r:embed="rId16"/>
+                  </a:ext>
+                </a:extLst>
+              </a:blip>
+              <a:srcRect/>
+              <a:stretch/>
+            </p:blipFill>
+            <p:spPr>
+              <a:xfrm>
+                <a:off x="2916335" y="1337290"/>
+                <a:ext cx="290019" cy="292594"/>
+              </a:xfrm>
+              <a:prstGeom prst="rect">
+                <a:avLst/>
+              </a:prstGeom>
+            </p:spPr>
+          </p:pic>
+          <p:pic>
+            <p:nvPicPr>
+              <p:cNvPr id="109" name="Graphic 8">
+                <a:extLst>
+                  <a:ext uri="{FF2B5EF4-FFF2-40B4-BE49-F238E27FC236}">
+                    <a16:creationId xmlns:a16="http://schemas.microsoft.com/office/drawing/2014/main" id="{E1FF7F80-6CF8-716F-47AE-40755B1B79A1}"/>
+                  </a:ext>
+                </a:extLst>
+              </p:cNvPr>
+              <p:cNvPicPr>
+                <a:picLocks noChangeAspect="1" noChangeArrowheads="1"/>
+              </p:cNvPicPr>
+              <p:nvPr/>
+            </p:nvPicPr>
+            <p:blipFill>
+              <a:blip r:embed="rId17">
+                <a:extLst>
+                  <a:ext uri="{96DAC541-7B7A-43D3-8B79-37D633B846F1}">
+                    <asvg:svgBlip xmlns:asvg="http://schemas.microsoft.com/office/drawing/2016/SVG/main" r:embed="rId18"/>
+                  </a:ext>
+                </a:extLst>
+              </a:blip>
+              <a:srcRect/>
+              <a:stretch/>
+            </p:blipFill>
+            <p:spPr bwMode="auto">
+              <a:xfrm>
+                <a:off x="3789301" y="2215700"/>
+                <a:ext cx="290019" cy="292594"/>
+              </a:xfrm>
+              <a:prstGeom prst="rect">
+                <a:avLst/>
+              </a:prstGeom>
+              <a:noFill/>
+              <a:ln>
+                <a:noFill/>
+              </a:ln>
+              <a:extLst>
+                <a:ext uri="{909E8E84-426E-40DD-AFC4-6F175D3DCCD1}">
+                  <a14:hiddenFill xmlns:a14="http://schemas.microsoft.com/office/drawing/2010/main">
+                    <a:solidFill>
+                      <a:srgbClr val="FFFFFF"/>
+                    </a:solidFill>
+                  </a14:hiddenFill>
+                </a:ext>
+                <a:ext uri="{91240B29-F687-4F45-9708-019B960494DF}">
+                  <a14:hiddenLine xmlns:a14="http://schemas.microsoft.com/office/drawing/2010/main" w="9525">
+                    <a:solidFill>
+                      <a:srgbClr val="000000"/>
+                    </a:solidFill>
+                    <a:miter lim="800000"/>
+                    <a:headEnd/>
+                    <a:tailEnd/>
+                  </a14:hiddenLine>
+                </a:ext>
+              </a:extLst>
+            </p:spPr>
+          </p:pic>
+          <p:sp>
+            <p:nvSpPr>
+              <p:cNvPr id="53" name="Rectangle 52">
+                <a:extLst>
+                  <a:ext uri="{FF2B5EF4-FFF2-40B4-BE49-F238E27FC236}">
+                    <a16:creationId xmlns:a16="http://schemas.microsoft.com/office/drawing/2014/main" id="{7211DBF9-67B7-C975-D75F-8AD6987D4B8C}"/>
+                  </a:ext>
+                </a:extLst>
+              </p:cNvPr>
+              <p:cNvSpPr/>
+              <p:nvPr/>
+            </p:nvSpPr>
+            <p:spPr>
+              <a:xfrm>
+                <a:off x="5307392" y="3007883"/>
+                <a:ext cx="4098147" cy="820398"/>
+              </a:xfrm>
+              <a:prstGeom prst="rect">
+                <a:avLst/>
+              </a:prstGeom>
+              <a:noFill/>
+              <a:ln w="12700">
+                <a:solidFill>
+                  <a:schemeClr val="accent3">
+                    <a:lumMod val="75000"/>
+                  </a:schemeClr>
+                </a:solidFill>
+                <a:prstDash val="dash"/>
+              </a:ln>
+            </p:spPr>
+            <p:style>
+              <a:lnRef idx="2">
+                <a:schemeClr val="accent1">
+                  <a:shade val="50000"/>
+                </a:schemeClr>
+              </a:lnRef>
+              <a:fillRef idx="1">
+                <a:schemeClr val="accent1"/>
+              </a:fillRef>
+              <a:effectRef idx="0">
+                <a:schemeClr val="accent1"/>
+              </a:effectRef>
+              <a:fontRef idx="minor">
+                <a:schemeClr val="lt1"/>
+              </a:fontRef>
+            </p:style>
+            <p:txBody>
+              <a:bodyPr tIns="91440"/>
+              <a:lstStyle/>
+              <a:p>
+                <a:pPr eaLnBrk="1" fontAlgn="auto" hangingPunct="1">
+                  <a:spcBef>
+                    <a:spcPts val="0"/>
+                  </a:spcBef>
+                  <a:spcAft>
+                    <a:spcPts val="0"/>
+                  </a:spcAft>
+                  <a:defRPr/>
+                </a:pPr>
+                <a:r>
+                  <a:rPr lang="en-US" sz="900" dirty="0">
+                    <a:solidFill>
+                      <a:schemeClr val="tx1"/>
+                    </a:solidFill>
+                    <a:latin typeface="Amazon Ember" panose="020B0603020204020204" pitchFamily="34" charset="0"/>
+                    <a:ea typeface="Amazon Ember" panose="020B0603020204020204" pitchFamily="34" charset="0"/>
+                    <a:cs typeface="Amazon Ember" panose="020B0603020204020204" pitchFamily="34" charset="0"/>
+                  </a:rPr>
+                  <a:t>logs</a:t>
+                </a:r>
+              </a:p>
+            </p:txBody>
+          </p:sp>
+          <p:pic>
+            <p:nvPicPr>
+              <p:cNvPr id="55" name="Graphic 17" descr="Amazon CloudWatch service icon.">
+                <a:extLst>
+                  <a:ext uri="{FF2B5EF4-FFF2-40B4-BE49-F238E27FC236}">
+                    <a16:creationId xmlns:a16="http://schemas.microsoft.com/office/drawing/2014/main" id="{625DDFA7-5E30-E5A9-BDDE-B56D11001AB3}"/>
+                  </a:ext>
+                </a:extLst>
+              </p:cNvPr>
+              <p:cNvPicPr>
+                <a:picLocks noChangeAspect="1" noChangeArrowheads="1"/>
+              </p:cNvPicPr>
+              <p:nvPr/>
+            </p:nvPicPr>
+            <p:blipFill>
+              <a:blip r:embed="rId19">
+                <a:extLst>
+                  <a:ext uri="{96DAC541-7B7A-43D3-8B79-37D633B846F1}">
+                    <asvg:svgBlip xmlns:asvg="http://schemas.microsoft.com/office/drawing/2016/SVG/main" r:embed="rId20"/>
+                  </a:ext>
+                </a:extLst>
+              </a:blip>
+              <a:srcRect/>
+              <a:stretch/>
+            </p:blipFill>
+            <p:spPr bwMode="auto">
+              <a:xfrm>
+                <a:off x="7203536" y="3145709"/>
+                <a:ext cx="292594" cy="292594"/>
+              </a:xfrm>
+              <a:prstGeom prst="rect">
+                <a:avLst/>
+              </a:prstGeom>
+              <a:noFill/>
+              <a:ln>
+                <a:noFill/>
+              </a:ln>
+              <a:extLst>
+                <a:ext uri="{909E8E84-426E-40DD-AFC4-6F175D3DCCD1}">
+                  <a14:hiddenFill xmlns:a14="http://schemas.microsoft.com/office/drawing/2010/main">
+                    <a:solidFill>
+                      <a:srgbClr val="FFFFFF"/>
+                    </a:solidFill>
+                  </a14:hiddenFill>
+                </a:ext>
+                <a:ext uri="{91240B29-F687-4F45-9708-019B960494DF}">
+                  <a14:hiddenLine xmlns:a14="http://schemas.microsoft.com/office/drawing/2010/main" w="9525">
+                    <a:solidFill>
+                      <a:srgbClr val="000000"/>
+                    </a:solidFill>
+                    <a:miter lim="800000"/>
+                    <a:headEnd/>
+                    <a:tailEnd/>
+                  </a14:hiddenLine>
+                </a:ext>
+              </a:extLst>
+            </p:spPr>
+          </p:pic>
+          <p:sp>
+            <p:nvSpPr>
+              <p:cNvPr id="56" name="TextBox 17">
+                <a:extLst>
+                  <a:ext uri="{FF2B5EF4-FFF2-40B4-BE49-F238E27FC236}">
+                    <a16:creationId xmlns:a16="http://schemas.microsoft.com/office/drawing/2014/main" id="{D08B7E41-4018-3847-FAA3-1B2E817E4D55}"/>
+                  </a:ext>
+                </a:extLst>
+              </p:cNvPr>
+              <p:cNvSpPr txBox="1">
+                <a:spLocks noChangeArrowheads="1"/>
+              </p:cNvSpPr>
+              <p:nvPr/>
+            </p:nvSpPr>
+            <p:spPr bwMode="auto">
+              <a:xfrm>
+                <a:off x="6967237" y="3429000"/>
+                <a:ext cx="765192" cy="338554"/>
+              </a:xfrm>
+              <a:prstGeom prst="rect">
+                <a:avLst/>
+              </a:prstGeom>
+              <a:noFill/>
+              <a:ln>
+                <a:noFill/>
+              </a:ln>
+              <a:extLst>
+                <a:ext uri="{909E8E84-426E-40DD-AFC4-6F175D3DCCD1}">
+                  <a14:hiddenFill xmlns:a14="http://schemas.microsoft.com/office/drawing/2010/main">
+                    <a:solidFill>
+                      <a:srgbClr val="FFFFFF"/>
+                    </a:solidFill>
+                  </a14:hiddenFill>
+                </a:ext>
+                <a:ext uri="{91240B29-F687-4F45-9708-019B960494DF}">
+                  <a14:hiddenLine xmlns:a14="http://schemas.microsoft.com/office/drawing/2010/main" w="9525">
+                    <a:solidFill>
+                      <a:srgbClr val="000000"/>
+                    </a:solidFill>
+                    <a:miter lim="800000"/>
+                    <a:headEnd/>
+                    <a:tailEnd/>
+                  </a14:hiddenLine>
+                </a:ext>
+              </a:extLst>
+            </p:spPr>
+            <p:txBody>
+              <a:bodyPr wrap="square">
+                <a:spAutoFit/>
+              </a:bodyPr>
+              <a:lstStyle>
+                <a:lvl1pPr>
+                  <a:defRPr>
+                    <a:solidFill>
+                      <a:schemeClr val="tx1"/>
+                    </a:solidFill>
+                    <a:latin typeface="Calibri" panose="020F0502020204030204" pitchFamily="34" charset="0"/>
+                  </a:defRPr>
+                </a:lvl1pPr>
+                <a:lvl2pPr marL="742950" indent="-285750">
+                  <a:defRPr>
+                    <a:solidFill>
+                      <a:schemeClr val="tx1"/>
+                    </a:solidFill>
+                    <a:latin typeface="Calibri" panose="020F0502020204030204" pitchFamily="34" charset="0"/>
+                  </a:defRPr>
+                </a:lvl2pPr>
+                <a:lvl3pPr marL="1143000" indent="-228600">
+                  <a:defRPr>
+                    <a:solidFill>
+                      <a:schemeClr val="tx1"/>
+                    </a:solidFill>
+                    <a:latin typeface="Calibri" panose="020F0502020204030204" pitchFamily="34" charset="0"/>
+                  </a:defRPr>
+                </a:lvl3pPr>
+                <a:lvl4pPr marL="1600200" indent="-228600">
+                  <a:defRPr>
+                    <a:solidFill>
+                      <a:schemeClr val="tx1"/>
+                    </a:solidFill>
+                    <a:latin typeface="Calibri" panose="020F0502020204030204" pitchFamily="34" charset="0"/>
+                  </a:defRPr>
+                </a:lvl4pPr>
+                <a:lvl5pPr marL="2057400" indent="-228600">
+                  <a:defRPr>
+                    <a:solidFill>
+                      <a:schemeClr val="tx1"/>
+                    </a:solidFill>
+                    <a:latin typeface="Calibri" panose="020F0502020204030204" pitchFamily="34" charset="0"/>
+                  </a:defRPr>
+                </a:lvl5pPr>
+                <a:lvl6pPr marL="2514600" indent="-228600" eaLnBrk="0" fontAlgn="base" hangingPunct="0">
+                  <a:spcBef>
+                    <a:spcPct val="0"/>
+                  </a:spcBef>
+                  <a:spcAft>
+                    <a:spcPct val="0"/>
+                  </a:spcAft>
+                  <a:defRPr>
+                    <a:solidFill>
+                      <a:schemeClr val="tx1"/>
+                    </a:solidFill>
+                    <a:latin typeface="Calibri" panose="020F0502020204030204" pitchFamily="34" charset="0"/>
+                  </a:defRPr>
+                </a:lvl6pPr>
+                <a:lvl7pPr marL="2971800" indent="-228600" eaLnBrk="0" fontAlgn="base" hangingPunct="0">
+                  <a:spcBef>
+                    <a:spcPct val="0"/>
+                  </a:spcBef>
+                  <a:spcAft>
+                    <a:spcPct val="0"/>
+                  </a:spcAft>
+                  <a:defRPr>
+                    <a:solidFill>
+                      <a:schemeClr val="tx1"/>
+                    </a:solidFill>
+                    <a:latin typeface="Calibri" panose="020F0502020204030204" pitchFamily="34" charset="0"/>
+                  </a:defRPr>
+                </a:lvl7pPr>
+                <a:lvl8pPr marL="3429000" indent="-228600" eaLnBrk="0" fontAlgn="base" hangingPunct="0">
+                  <a:spcBef>
+                    <a:spcPct val="0"/>
+                  </a:spcBef>
+                  <a:spcAft>
+                    <a:spcPct val="0"/>
+                  </a:spcAft>
+                  <a:defRPr>
+                    <a:solidFill>
+                      <a:schemeClr val="tx1"/>
+                    </a:solidFill>
+                    <a:latin typeface="Calibri" panose="020F0502020204030204" pitchFamily="34" charset="0"/>
+                  </a:defRPr>
+                </a:lvl8pPr>
+                <a:lvl9pPr marL="3886200" indent="-228600" eaLnBrk="0" fontAlgn="base" hangingPunct="0">
+                  <a:spcBef>
+                    <a:spcPct val="0"/>
+                  </a:spcBef>
+                  <a:spcAft>
+                    <a:spcPct val="0"/>
+                  </a:spcAft>
+                  <a:defRPr>
+                    <a:solidFill>
+                      <a:schemeClr val="tx1"/>
+                    </a:solidFill>
+                    <a:latin typeface="Calibri" panose="020F0502020204030204" pitchFamily="34" charset="0"/>
+                  </a:defRPr>
+                </a:lvl9pPr>
+              </a:lstStyle>
+              <a:p>
+                <a:pPr algn="ctr" eaLnBrk="1" hangingPunct="1"/>
+                <a:r>
+                  <a:rPr lang="en-US" altLang="en-US" sz="800" dirty="0">
+                    <a:latin typeface="Amazon Ember" panose="020B0603020204020204" pitchFamily="34" charset="0"/>
+                    <a:ea typeface="Amazon Ember" panose="020B0603020204020204" pitchFamily="34" charset="0"/>
+                    <a:cs typeface="Amazon Ember" panose="020B0603020204020204" pitchFamily="34" charset="0"/>
+                  </a:rPr>
+                  <a:t>Amazon CloudWatch</a:t>
+                </a:r>
+              </a:p>
+            </p:txBody>
+          </p:sp>
+          <p:cxnSp>
+            <p:nvCxnSpPr>
+              <p:cNvPr id="71" name="Straight Arrow Connector 70">
+                <a:extLst>
+                  <a:ext uri="{FF2B5EF4-FFF2-40B4-BE49-F238E27FC236}">
+                    <a16:creationId xmlns:a16="http://schemas.microsoft.com/office/drawing/2014/main" id="{FD20DC40-B89A-125F-1033-4B34AEBC4D2F}"/>
+                  </a:ext>
+                </a:extLst>
+              </p:cNvPr>
+              <p:cNvCxnSpPr>
+                <a:cxnSpLocks/>
+                <a:stCxn id="13" idx="3"/>
+                <a:endCxn id="53" idx="1"/>
+              </p:cNvCxnSpPr>
+              <p:nvPr/>
+            </p:nvCxnSpPr>
+            <p:spPr>
+              <a:xfrm>
+                <a:off x="4809007" y="2773702"/>
+                <a:ext cx="498385" cy="644380"/>
+              </a:xfrm>
+              <a:prstGeom prst="straightConnector1">
+                <a:avLst/>
+              </a:prstGeom>
+              <a:ln w="12700" cap="flat" cmpd="sng" algn="ctr">
+                <a:solidFill>
+                  <a:schemeClr val="dk1"/>
+                </a:solidFill>
+                <a:prstDash val="solid"/>
+                <a:round/>
+                <a:headEnd type="arrow" w="med" len="med"/>
+                <a:tailEnd type="arrow" w="med" len="med"/>
+              </a:ln>
+            </p:spPr>
+            <p:style>
+              <a:lnRef idx="0">
+                <a:scrgbClr r="0" g="0" b="0"/>
+              </a:lnRef>
+              <a:fillRef idx="0">
+                <a:scrgbClr r="0" g="0" b="0"/>
+              </a:fillRef>
+              <a:effectRef idx="0">
+                <a:scrgbClr r="0" g="0" b="0"/>
+              </a:effectRef>
+              <a:fontRef idx="minor">
+                <a:schemeClr val="tx1"/>
+              </a:fontRef>
+            </p:style>
+          </p:cxnSp>
+          <p:cxnSp>
+            <p:nvCxnSpPr>
+              <p:cNvPr id="75" name="Straight Arrow Connector 74">
+                <a:extLst>
+                  <a:ext uri="{FF2B5EF4-FFF2-40B4-BE49-F238E27FC236}">
+                    <a16:creationId xmlns:a16="http://schemas.microsoft.com/office/drawing/2014/main" id="{ABE43872-A8F6-00E4-B4A2-9D8A8E5089A2}"/>
+                  </a:ext>
+                </a:extLst>
+              </p:cNvPr>
+              <p:cNvCxnSpPr>
+                <a:cxnSpLocks/>
+                <a:stCxn id="49" idx="2"/>
+              </p:cNvCxnSpPr>
+              <p:nvPr/>
+            </p:nvCxnSpPr>
+            <p:spPr>
+              <a:xfrm>
+                <a:off x="8110543" y="2773702"/>
+                <a:ext cx="0" cy="234181"/>
+              </a:xfrm>
+              <a:prstGeom prst="straightConnector1">
+                <a:avLst/>
+              </a:prstGeom>
+              <a:ln w="12700" cap="flat" cmpd="sng" algn="ctr">
+                <a:solidFill>
+                  <a:schemeClr val="dk1"/>
+                </a:solidFill>
+                <a:prstDash val="solid"/>
+                <a:round/>
+                <a:headEnd type="arrow" w="med" len="med"/>
+                <a:tailEnd type="arrow" w="med" len="med"/>
+              </a:ln>
+            </p:spPr>
+            <p:style>
+              <a:lnRef idx="0">
+                <a:scrgbClr r="0" g="0" b="0"/>
+              </a:lnRef>
+              <a:fillRef idx="0">
+                <a:scrgbClr r="0" g="0" b="0"/>
+              </a:fillRef>
+              <a:effectRef idx="0">
+                <a:scrgbClr r="0" g="0" b="0"/>
+              </a:effectRef>
+              <a:fontRef idx="minor">
+                <a:schemeClr val="tx1"/>
+              </a:fontRef>
+            </p:style>
+          </p:cxnSp>
+          <p:cxnSp>
+            <p:nvCxnSpPr>
+              <p:cNvPr id="83" name="Straight Arrow Connector 82">
+                <a:extLst>
+                  <a:ext uri="{FF2B5EF4-FFF2-40B4-BE49-F238E27FC236}">
+                    <a16:creationId xmlns:a16="http://schemas.microsoft.com/office/drawing/2014/main" id="{C40F5704-EFF7-B049-B5A4-55087BF7C484}"/>
+                  </a:ext>
+                </a:extLst>
+              </p:cNvPr>
+              <p:cNvCxnSpPr>
+                <a:cxnSpLocks/>
+                <a:stCxn id="63" idx="2"/>
+              </p:cNvCxnSpPr>
+              <p:nvPr/>
+            </p:nvCxnSpPr>
+            <p:spPr>
+              <a:xfrm>
+                <a:off x="5809296" y="2773703"/>
+                <a:ext cx="0" cy="238634"/>
+              </a:xfrm>
+              <a:prstGeom prst="straightConnector1">
+                <a:avLst/>
+              </a:prstGeom>
+              <a:ln w="12700" cap="flat" cmpd="sng" algn="ctr">
+                <a:solidFill>
+                  <a:schemeClr val="dk1"/>
+                </a:solidFill>
+                <a:prstDash val="solid"/>
+                <a:round/>
+                <a:headEnd type="arrow" w="med" len="med"/>
+                <a:tailEnd type="arrow" w="med" len="med"/>
+              </a:ln>
+            </p:spPr>
+            <p:style>
+              <a:lnRef idx="0">
+                <a:scrgbClr r="0" g="0" b="0"/>
+              </a:lnRef>
+              <a:fillRef idx="0">
+                <a:scrgbClr r="0" g="0" b="0"/>
+              </a:fillRef>
+              <a:effectRef idx="0">
+                <a:scrgbClr r="0" g="0" b="0"/>
+              </a:effectRef>
+              <a:fontRef idx="minor">
+                <a:schemeClr val="tx1"/>
+              </a:fontRef>
+            </p:style>
+          </p:cxnSp>
+        </p:grpSp>
+      </p:grpSp>
     </p:spTree>
     <p:extLst>
       <p:ext uri="{BB962C8B-B14F-4D97-AF65-F5344CB8AC3E}">
@@ -6948,86 +7043,6 @@
 </file>
 
 <file path=ppt/slides/slide2.xml><?xml version="1.0" encoding="utf-8"?>
-<p:sld xmlns:a="http://schemas.openxmlformats.org/drawingml/2006/main" xmlns:r="http://schemas.openxmlformats.org/officeDocument/2006/relationships" xmlns:p="http://schemas.openxmlformats.org/presentationml/2006/main">
-  <p:cSld>
-    <p:spTree>
-      <p:nvGrpSpPr>
-        <p:cNvPr id="1" name=""/>
-        <p:cNvGrpSpPr/>
-        <p:nvPr/>
-      </p:nvGrpSpPr>
-      <p:grpSpPr>
-        <a:xfrm>
-          <a:off x="0" y="0"/>
-          <a:ext cx="0" cy="0"/>
-          <a:chOff x="0" y="0"/>
-          <a:chExt cx="0" cy="0"/>
-        </a:xfrm>
-      </p:grpSpPr>
-      <p:sp>
-        <p:nvSpPr>
-          <p:cNvPr id="2" name="Title 1">
-            <a:extLst>
-              <a:ext uri="{FF2B5EF4-FFF2-40B4-BE49-F238E27FC236}">
-                <a16:creationId xmlns:a16="http://schemas.microsoft.com/office/drawing/2014/main" id="{38DFF2C3-50DD-C033-AB59-0DF78DAC25DE}"/>
-              </a:ext>
-            </a:extLst>
-          </p:cNvPr>
-          <p:cNvSpPr>
-            <a:spLocks noGrp="1"/>
-          </p:cNvSpPr>
-          <p:nvPr>
-            <p:ph type="title"/>
-          </p:nvPr>
-        </p:nvSpPr>
-        <p:spPr/>
-        <p:txBody>
-          <a:bodyPr/>
-          <a:lstStyle/>
-          <a:p>
-            <a:endParaRPr lang="en-GB"/>
-          </a:p>
-        </p:txBody>
-      </p:sp>
-      <p:sp>
-        <p:nvSpPr>
-          <p:cNvPr id="3" name="Content Placeholder 2">
-            <a:extLst>
-              <a:ext uri="{FF2B5EF4-FFF2-40B4-BE49-F238E27FC236}">
-                <a16:creationId xmlns:a16="http://schemas.microsoft.com/office/drawing/2014/main" id="{232CD70E-B29B-DA97-7A44-F75343EFF565}"/>
-              </a:ext>
-            </a:extLst>
-          </p:cNvPr>
-          <p:cNvSpPr>
-            <a:spLocks noGrp="1"/>
-          </p:cNvSpPr>
-          <p:nvPr>
-            <p:ph idx="1"/>
-          </p:nvPr>
-        </p:nvSpPr>
-        <p:spPr/>
-        <p:txBody>
-          <a:bodyPr/>
-          <a:lstStyle/>
-          <a:p>
-            <a:endParaRPr lang="en-GB"/>
-          </a:p>
-        </p:txBody>
-      </p:sp>
-    </p:spTree>
-    <p:extLst>
-      <p:ext uri="{BB962C8B-B14F-4D97-AF65-F5344CB8AC3E}">
-        <p14:creationId xmlns:p14="http://schemas.microsoft.com/office/powerpoint/2010/main" val="1387548981"/>
-      </p:ext>
-    </p:extLst>
-  </p:cSld>
-  <p:clrMapOvr>
-    <a:masterClrMapping/>
-  </p:clrMapOvr>
-</p:sld>
-</file>
-
-<file path=ppt/slides/slide3.xml><?xml version="1.0" encoding="utf-8"?>
 <p:sld xmlns:a="http://schemas.openxmlformats.org/drawingml/2006/main" xmlns:r="http://schemas.openxmlformats.org/officeDocument/2006/relationships" xmlns:p="http://schemas.openxmlformats.org/presentationml/2006/main">
   <p:cSld>
     <p:spTree>
@@ -16689,7 +16704,7 @@
 </p:sld>
 </file>
 
-<file path=ppt/slides/slide4.xml><?xml version="1.0" encoding="utf-8"?>
+<file path=ppt/slides/slide3.xml><?xml version="1.0" encoding="utf-8"?>
 <p:sld xmlns:a="http://schemas.openxmlformats.org/drawingml/2006/main" xmlns:r="http://schemas.openxmlformats.org/officeDocument/2006/relationships" xmlns:p="http://schemas.openxmlformats.org/presentationml/2006/main">
   <p:cSld>
     <p:spTree>

</xml_diff>